<commit_message>
Updated comments and made changes to the ppt
</commit_message>
<xml_diff>
--- a/ZennialPro_Project_PPT.pptx
+++ b/ZennialPro_Project_PPT.pptx
@@ -5,7 +5,7 @@
     <p:sldMasterId id="2147483648" r:id="rId1"/>
   </p:sldMasterIdLst>
   <p:notesMasterIdLst>
-    <p:notesMasterId r:id="rId14"/>
+    <p:notesMasterId r:id="rId16"/>
   </p:notesMasterIdLst>
   <p:sldIdLst>
     <p:sldId id="256" r:id="rId2"/>
@@ -17,9 +17,11 @@
     <p:sldId id="263" r:id="rId8"/>
     <p:sldId id="264" r:id="rId9"/>
     <p:sldId id="265" r:id="rId10"/>
-    <p:sldId id="267" r:id="rId11"/>
-    <p:sldId id="268" r:id="rId12"/>
-    <p:sldId id="258" r:id="rId13"/>
+    <p:sldId id="269" r:id="rId11"/>
+    <p:sldId id="267" r:id="rId12"/>
+    <p:sldId id="268" r:id="rId13"/>
+    <p:sldId id="270" r:id="rId14"/>
+    <p:sldId id="258" r:id="rId15"/>
   </p:sldIdLst>
   <p:sldSz cx="12192000" cy="6858000"/>
   <p:notesSz cx="6858000" cy="9144000"/>
@@ -221,7 +223,7 @@
           <a:p>
             <a:fld id="{BD8DE5F0-F600-46C3-AE4D-5148C69FFBAD}" type="datetimeFigureOut">
               <a:rPr lang="en-US" smtClean="0"/>
-              <a:t>9/5/2025</a:t>
+              <a:t>9/9/2025</a:t>
             </a:fld>
             <a:endParaRPr lang="en-US"/>
           </a:p>
@@ -803,7 +805,7 @@
           <a:p>
             <a:fld id="{8CFBE4D0-E68C-4FB2-8B3A-AA41DAF039F9}" type="datetimeFigureOut">
               <a:rPr lang="en-US" smtClean="0"/>
-              <a:t>9/5/2025</a:t>
+              <a:t>9/9/2025</a:t>
             </a:fld>
             <a:endParaRPr lang="en-US"/>
           </a:p>
@@ -1001,7 +1003,7 @@
           <a:p>
             <a:fld id="{8CFBE4D0-E68C-4FB2-8B3A-AA41DAF039F9}" type="datetimeFigureOut">
               <a:rPr lang="en-US" smtClean="0"/>
-              <a:t>9/5/2025</a:t>
+              <a:t>9/9/2025</a:t>
             </a:fld>
             <a:endParaRPr lang="en-US"/>
           </a:p>
@@ -1209,7 +1211,7 @@
           <a:p>
             <a:fld id="{8CFBE4D0-E68C-4FB2-8B3A-AA41DAF039F9}" type="datetimeFigureOut">
               <a:rPr lang="en-US" smtClean="0"/>
-              <a:t>9/5/2025</a:t>
+              <a:t>9/9/2025</a:t>
             </a:fld>
             <a:endParaRPr lang="en-US"/>
           </a:p>
@@ -1407,7 +1409,7 @@
           <a:p>
             <a:fld id="{8CFBE4D0-E68C-4FB2-8B3A-AA41DAF039F9}" type="datetimeFigureOut">
               <a:rPr lang="en-US" smtClean="0"/>
-              <a:t>9/5/2025</a:t>
+              <a:t>9/9/2025</a:t>
             </a:fld>
             <a:endParaRPr lang="en-US"/>
           </a:p>
@@ -1682,7 +1684,7 @@
           <a:p>
             <a:fld id="{8CFBE4D0-E68C-4FB2-8B3A-AA41DAF039F9}" type="datetimeFigureOut">
               <a:rPr lang="en-US" smtClean="0"/>
-              <a:t>9/5/2025</a:t>
+              <a:t>9/9/2025</a:t>
             </a:fld>
             <a:endParaRPr lang="en-US"/>
           </a:p>
@@ -1947,7 +1949,7 @@
           <a:p>
             <a:fld id="{8CFBE4D0-E68C-4FB2-8B3A-AA41DAF039F9}" type="datetimeFigureOut">
               <a:rPr lang="en-US" smtClean="0"/>
-              <a:t>9/5/2025</a:t>
+              <a:t>9/9/2025</a:t>
             </a:fld>
             <a:endParaRPr lang="en-US"/>
           </a:p>
@@ -2359,7 +2361,7 @@
           <a:p>
             <a:fld id="{8CFBE4D0-E68C-4FB2-8B3A-AA41DAF039F9}" type="datetimeFigureOut">
               <a:rPr lang="en-US" smtClean="0"/>
-              <a:t>9/5/2025</a:t>
+              <a:t>9/9/2025</a:t>
             </a:fld>
             <a:endParaRPr lang="en-US"/>
           </a:p>
@@ -2500,7 +2502,7 @@
           <a:p>
             <a:fld id="{8CFBE4D0-E68C-4FB2-8B3A-AA41DAF039F9}" type="datetimeFigureOut">
               <a:rPr lang="en-US" smtClean="0"/>
-              <a:t>9/5/2025</a:t>
+              <a:t>9/9/2025</a:t>
             </a:fld>
             <a:endParaRPr lang="en-US"/>
           </a:p>
@@ -2613,7 +2615,7 @@
           <a:p>
             <a:fld id="{8CFBE4D0-E68C-4FB2-8B3A-AA41DAF039F9}" type="datetimeFigureOut">
               <a:rPr lang="en-US" smtClean="0"/>
-              <a:t>9/5/2025</a:t>
+              <a:t>9/9/2025</a:t>
             </a:fld>
             <a:endParaRPr lang="en-US"/>
           </a:p>
@@ -2924,7 +2926,7 @@
           <a:p>
             <a:fld id="{8CFBE4D0-E68C-4FB2-8B3A-AA41DAF039F9}" type="datetimeFigureOut">
               <a:rPr lang="en-US" smtClean="0"/>
-              <a:t>9/5/2025</a:t>
+              <a:t>9/9/2025</a:t>
             </a:fld>
             <a:endParaRPr lang="en-US"/>
           </a:p>
@@ -3212,7 +3214,7 @@
           <a:p>
             <a:fld id="{8CFBE4D0-E68C-4FB2-8B3A-AA41DAF039F9}" type="datetimeFigureOut">
               <a:rPr lang="en-US" smtClean="0"/>
-              <a:t>9/5/2025</a:t>
+              <a:t>9/9/2025</a:t>
             </a:fld>
             <a:endParaRPr lang="en-US"/>
           </a:p>
@@ -3453,7 +3455,7 @@
           <a:p>
             <a:fld id="{8CFBE4D0-E68C-4FB2-8B3A-AA41DAF039F9}" type="datetimeFigureOut">
               <a:rPr lang="en-US" smtClean="0"/>
-              <a:t>9/5/2025</a:t>
+              <a:t>9/9/2025</a:t>
             </a:fld>
             <a:endParaRPr lang="en-US"/>
           </a:p>
@@ -4297,10 +4299,703 @@
       </p:grpSpPr>
       <p:sp>
         <p:nvSpPr>
-          <p:cNvPr id="2" name="Title 1">
-            <a:extLst>
-              <a:ext uri="{FF2B5EF4-FFF2-40B4-BE49-F238E27FC236}">
-                <a16:creationId xmlns:a16="http://schemas.microsoft.com/office/drawing/2014/main" id="{E3189B1D-8484-5ABE-E5AA-FA98DC3DE89A}"/>
+          <p:cNvPr id="4" name="Rectangle 3">
+            <a:extLst>
+              <a:ext uri="{FF2B5EF4-FFF2-40B4-BE49-F238E27FC236}">
+                <a16:creationId xmlns:a16="http://schemas.microsoft.com/office/drawing/2014/main" id="{5457E003-7F94-6064-B6D1-DD0533232B25}"/>
+              </a:ext>
+            </a:extLst>
+          </p:cNvPr>
+          <p:cNvSpPr/>
+          <p:nvPr/>
+        </p:nvSpPr>
+        <p:spPr>
+          <a:xfrm>
+            <a:off x="0" y="0"/>
+            <a:ext cx="542925" cy="1647826"/>
+          </a:xfrm>
+          <a:prstGeom prst="rect">
+            <a:avLst/>
+          </a:prstGeom>
+          <a:solidFill>
+            <a:srgbClr val="23AAAD"/>
+          </a:solidFill>
+          <a:ln>
+            <a:noFill/>
+          </a:ln>
+        </p:spPr>
+        <p:style>
+          <a:lnRef idx="2">
+            <a:schemeClr val="accent1">
+              <a:shade val="15000"/>
+            </a:schemeClr>
+          </a:lnRef>
+          <a:fillRef idx="1">
+            <a:schemeClr val="accent1"/>
+          </a:fillRef>
+          <a:effectRef idx="0">
+            <a:schemeClr val="accent1"/>
+          </a:effectRef>
+          <a:fontRef idx="minor">
+            <a:schemeClr val="lt1"/>
+          </a:fontRef>
+        </p:style>
+        <p:txBody>
+          <a:bodyPr rtlCol="0" anchor="ctr"/>
+          <a:lstStyle/>
+          <a:p>
+            <a:pPr algn="ctr"/>
+            <a:endParaRPr lang="en-US"/>
+          </a:p>
+        </p:txBody>
+      </p:sp>
+      <p:sp>
+        <p:nvSpPr>
+          <p:cNvPr id="5" name="Rectangle 4">
+            <a:extLst>
+              <a:ext uri="{FF2B5EF4-FFF2-40B4-BE49-F238E27FC236}">
+                <a16:creationId xmlns:a16="http://schemas.microsoft.com/office/drawing/2014/main" id="{866757FA-A5F4-DCCA-CD61-275E6876B05D}"/>
+              </a:ext>
+            </a:extLst>
+          </p:cNvPr>
+          <p:cNvSpPr/>
+          <p:nvPr/>
+        </p:nvSpPr>
+        <p:spPr>
+          <a:xfrm>
+            <a:off x="11610752" y="4914900"/>
+            <a:ext cx="581247" cy="1943100"/>
+          </a:xfrm>
+          <a:prstGeom prst="rect">
+            <a:avLst/>
+          </a:prstGeom>
+          <a:solidFill>
+            <a:srgbClr val="F39E34"/>
+          </a:solidFill>
+          <a:ln>
+            <a:noFill/>
+          </a:ln>
+        </p:spPr>
+        <p:style>
+          <a:lnRef idx="2">
+            <a:schemeClr val="accent1">
+              <a:shade val="15000"/>
+            </a:schemeClr>
+          </a:lnRef>
+          <a:fillRef idx="1">
+            <a:schemeClr val="accent1"/>
+          </a:fillRef>
+          <a:effectRef idx="0">
+            <a:schemeClr val="accent1"/>
+          </a:effectRef>
+          <a:fontRef idx="minor">
+            <a:schemeClr val="lt1"/>
+          </a:fontRef>
+        </p:style>
+        <p:txBody>
+          <a:bodyPr rtlCol="0" anchor="ctr"/>
+          <a:lstStyle/>
+          <a:p>
+            <a:pPr algn="ctr"/>
+            <a:endParaRPr lang="en-US"/>
+          </a:p>
+        </p:txBody>
+      </p:sp>
+      <p:graphicFrame>
+        <p:nvGraphicFramePr>
+          <p:cNvPr id="9" name="Table 8">
+            <a:extLst>
+              <a:ext uri="{FF2B5EF4-FFF2-40B4-BE49-F238E27FC236}">
+                <a16:creationId xmlns:a16="http://schemas.microsoft.com/office/drawing/2014/main" id="{49EC4730-AB94-32F3-CE57-DF93F6C016FC}"/>
+              </a:ext>
+            </a:extLst>
+          </p:cNvPr>
+          <p:cNvGraphicFramePr>
+            <a:graphicFrameLocks noGrp="1"/>
+          </p:cNvGraphicFramePr>
+          <p:nvPr>
+            <p:extLst>
+              <p:ext uri="{D42A27DB-BD31-4B8C-83A1-F6EECF244321}">
+                <p14:modId xmlns:p14="http://schemas.microsoft.com/office/powerpoint/2010/main" val="3461231432"/>
+              </p:ext>
+            </p:extLst>
+          </p:nvPr>
+        </p:nvGraphicFramePr>
+        <p:xfrm>
+          <a:off x="1286539" y="1647826"/>
+          <a:ext cx="9441711" cy="4112556"/>
+        </p:xfrm>
+        <a:graphic>
+          <a:graphicData uri="http://schemas.openxmlformats.org/drawingml/2006/table">
+            <a:tbl>
+              <a:tblPr firstRow="1" bandRow="1">
+                <a:tableStyleId>{5C22544A-7EE6-4342-B048-85BDC9FD1C3A}</a:tableStyleId>
+              </a:tblPr>
+              <a:tblGrid>
+                <a:gridCol w="3147237">
+                  <a:extLst>
+                    <a:ext uri="{9D8B030D-6E8A-4147-A177-3AD203B41FA5}">
+                      <a16:colId xmlns:a16="http://schemas.microsoft.com/office/drawing/2014/main" val="2957631624"/>
+                    </a:ext>
+                  </a:extLst>
+                </a:gridCol>
+                <a:gridCol w="3147237">
+                  <a:extLst>
+                    <a:ext uri="{9D8B030D-6E8A-4147-A177-3AD203B41FA5}">
+                      <a16:colId xmlns:a16="http://schemas.microsoft.com/office/drawing/2014/main" val="2810421749"/>
+                    </a:ext>
+                  </a:extLst>
+                </a:gridCol>
+                <a:gridCol w="3147237">
+                  <a:extLst>
+                    <a:ext uri="{9D8B030D-6E8A-4147-A177-3AD203B41FA5}">
+                      <a16:colId xmlns:a16="http://schemas.microsoft.com/office/drawing/2014/main" val="1122984036"/>
+                    </a:ext>
+                  </a:extLst>
+                </a:gridCol>
+              </a:tblGrid>
+              <a:tr h="578746">
+                <a:tc>
+                  <a:txBody>
+                    <a:bodyPr/>
+                    <a:lstStyle/>
+                    <a:p>
+                      <a:pPr algn="ctr"/>
+                      <a:r>
+                        <a:rPr lang="en-US" dirty="0"/>
+                        <a:t>Module</a:t>
+                      </a:r>
+                      <a:endParaRPr lang="en-IN" dirty="0"/>
+                    </a:p>
+                  </a:txBody>
+                  <a:tcPr anchor="ctr">
+                    <a:solidFill>
+                      <a:schemeClr val="accent2"/>
+                    </a:solidFill>
+                  </a:tcPr>
+                </a:tc>
+                <a:tc>
+                  <a:txBody>
+                    <a:bodyPr/>
+                    <a:lstStyle/>
+                    <a:p>
+                      <a:pPr algn="ctr"/>
+                      <a:r>
+                        <a:rPr lang="en-US" dirty="0"/>
+                        <a:t>Key Endpoints</a:t>
+                      </a:r>
+                      <a:endParaRPr lang="en-IN" dirty="0"/>
+                    </a:p>
+                  </a:txBody>
+                  <a:tcPr anchor="ctr">
+                    <a:solidFill>
+                      <a:srgbClr val="23AAAD"/>
+                    </a:solidFill>
+                  </a:tcPr>
+                </a:tc>
+                <a:tc>
+                  <a:txBody>
+                    <a:bodyPr/>
+                    <a:lstStyle/>
+                    <a:p>
+                      <a:pPr algn="ctr"/>
+                      <a:r>
+                        <a:rPr lang="en-US" dirty="0"/>
+                        <a:t>Purpose</a:t>
+                      </a:r>
+                      <a:endParaRPr lang="en-IN" dirty="0"/>
+                    </a:p>
+                  </a:txBody>
+                  <a:tcPr anchor="ctr">
+                    <a:solidFill>
+                      <a:schemeClr val="accent2"/>
+                    </a:solidFill>
+                  </a:tcPr>
+                </a:tc>
+                <a:extLst>
+                  <a:ext uri="{0D108BD9-81ED-4DB2-BD59-A6C34878D82A}">
+                    <a16:rowId xmlns:a16="http://schemas.microsoft.com/office/drawing/2014/main" val="964485011"/>
+                  </a:ext>
+                </a:extLst>
+              </a:tr>
+              <a:tr h="578746">
+                <a:tc>
+                  <a:txBody>
+                    <a:bodyPr/>
+                    <a:lstStyle/>
+                    <a:p>
+                      <a:pPr algn="ctr"/>
+                      <a:r>
+                        <a:rPr lang="en-US" dirty="0"/>
+                        <a:t>Auth</a:t>
+                      </a:r>
+                      <a:endParaRPr lang="en-IN" dirty="0"/>
+                    </a:p>
+                  </a:txBody>
+                  <a:tcPr anchor="ctr">
+                    <a:solidFill>
+                      <a:schemeClr val="accent2">
+                        <a:lumMod val="20000"/>
+                        <a:lumOff val="80000"/>
+                      </a:schemeClr>
+                    </a:solidFill>
+                  </a:tcPr>
+                </a:tc>
+                <a:tc>
+                  <a:txBody>
+                    <a:bodyPr/>
+                    <a:lstStyle/>
+                    <a:p>
+                      <a:pPr algn="ctr"/>
+                      <a:r>
+                        <a:rPr lang="en-US" dirty="0">
+                          <a:solidFill>
+                            <a:schemeClr val="tx1"/>
+                          </a:solidFill>
+                        </a:rPr>
+                        <a:t>Register, Login, Logout</a:t>
+                      </a:r>
+                      <a:endParaRPr lang="en-IN" dirty="0">
+                        <a:solidFill>
+                          <a:schemeClr val="tx1"/>
+                        </a:solidFill>
+                      </a:endParaRPr>
+                    </a:p>
+                  </a:txBody>
+                  <a:tcPr anchor="ctr">
+                    <a:solidFill>
+                      <a:srgbClr val="96E8EA"/>
+                    </a:solidFill>
+                  </a:tcPr>
+                </a:tc>
+                <a:tc>
+                  <a:txBody>
+                    <a:bodyPr/>
+                    <a:lstStyle/>
+                    <a:p>
+                      <a:pPr algn="ctr"/>
+                      <a:r>
+                        <a:rPr lang="en-US" dirty="0"/>
+                        <a:t>User Authentication</a:t>
+                      </a:r>
+                      <a:endParaRPr lang="en-IN" dirty="0"/>
+                    </a:p>
+                  </a:txBody>
+                  <a:tcPr anchor="ctr">
+                    <a:solidFill>
+                      <a:schemeClr val="accent2">
+                        <a:lumMod val="20000"/>
+                        <a:lumOff val="80000"/>
+                      </a:schemeClr>
+                    </a:solidFill>
+                  </a:tcPr>
+                </a:tc>
+                <a:extLst>
+                  <a:ext uri="{0D108BD9-81ED-4DB2-BD59-A6C34878D82A}">
+                    <a16:rowId xmlns:a16="http://schemas.microsoft.com/office/drawing/2014/main" val="919741337"/>
+                  </a:ext>
+                </a:extLst>
+              </a:tr>
+              <a:tr h="578746">
+                <a:tc>
+                  <a:txBody>
+                    <a:bodyPr/>
+                    <a:lstStyle/>
+                    <a:p>
+                      <a:pPr algn="ctr"/>
+                      <a:r>
+                        <a:rPr lang="en-US" dirty="0"/>
+                        <a:t>Users</a:t>
+                      </a:r>
+                      <a:endParaRPr lang="en-IN" dirty="0"/>
+                    </a:p>
+                  </a:txBody>
+                  <a:tcPr anchor="ctr">
+                    <a:solidFill>
+                      <a:schemeClr val="accent2">
+                        <a:lumMod val="20000"/>
+                        <a:lumOff val="80000"/>
+                      </a:schemeClr>
+                    </a:solidFill>
+                  </a:tcPr>
+                </a:tc>
+                <a:tc>
+                  <a:txBody>
+                    <a:bodyPr/>
+                    <a:lstStyle/>
+                    <a:p>
+                      <a:pPr algn="ctr"/>
+                      <a:r>
+                        <a:rPr lang="en-US" dirty="0">
+                          <a:solidFill>
+                            <a:schemeClr val="tx1"/>
+                          </a:solidFill>
+                        </a:rPr>
+                        <a:t>Profile, Update, Change password</a:t>
+                      </a:r>
+                      <a:endParaRPr lang="en-IN" dirty="0">
+                        <a:solidFill>
+                          <a:schemeClr val="tx1"/>
+                        </a:solidFill>
+                      </a:endParaRPr>
+                    </a:p>
+                  </a:txBody>
+                  <a:tcPr anchor="ctr">
+                    <a:solidFill>
+                      <a:srgbClr val="96E8EA"/>
+                    </a:solidFill>
+                  </a:tcPr>
+                </a:tc>
+                <a:tc>
+                  <a:txBody>
+                    <a:bodyPr/>
+                    <a:lstStyle/>
+                    <a:p>
+                      <a:pPr algn="ctr"/>
+                      <a:r>
+                        <a:rPr lang="en-US" dirty="0"/>
+                        <a:t>Manage User Info</a:t>
+                      </a:r>
+                      <a:endParaRPr lang="en-IN" dirty="0"/>
+                    </a:p>
+                  </a:txBody>
+                  <a:tcPr anchor="ctr">
+                    <a:solidFill>
+                      <a:schemeClr val="accent2">
+                        <a:lumMod val="20000"/>
+                        <a:lumOff val="80000"/>
+                      </a:schemeClr>
+                    </a:solidFill>
+                  </a:tcPr>
+                </a:tc>
+                <a:extLst>
+                  <a:ext uri="{0D108BD9-81ED-4DB2-BD59-A6C34878D82A}">
+                    <a16:rowId xmlns:a16="http://schemas.microsoft.com/office/drawing/2014/main" val="4237443637"/>
+                  </a:ext>
+                </a:extLst>
+              </a:tr>
+              <a:tr h="578746">
+                <a:tc>
+                  <a:txBody>
+                    <a:bodyPr/>
+                    <a:lstStyle/>
+                    <a:p>
+                      <a:pPr algn="ctr"/>
+                      <a:r>
+                        <a:rPr lang="en-US" dirty="0"/>
+                        <a:t>Habits</a:t>
+                      </a:r>
+                      <a:endParaRPr lang="en-IN" dirty="0"/>
+                    </a:p>
+                  </a:txBody>
+                  <a:tcPr anchor="ctr">
+                    <a:solidFill>
+                      <a:schemeClr val="accent2">
+                        <a:lumMod val="20000"/>
+                        <a:lumOff val="80000"/>
+                      </a:schemeClr>
+                    </a:solidFill>
+                  </a:tcPr>
+                </a:tc>
+                <a:tc>
+                  <a:txBody>
+                    <a:bodyPr/>
+                    <a:lstStyle/>
+                    <a:p>
+                      <a:pPr algn="ctr"/>
+                      <a:r>
+                        <a:rPr lang="en-US" dirty="0">
+                          <a:solidFill>
+                            <a:schemeClr val="tx1"/>
+                          </a:solidFill>
+                        </a:rPr>
+                        <a:t>CRUD + Logging</a:t>
+                      </a:r>
+                      <a:endParaRPr lang="en-IN" dirty="0">
+                        <a:solidFill>
+                          <a:schemeClr val="tx1"/>
+                        </a:solidFill>
+                      </a:endParaRPr>
+                    </a:p>
+                  </a:txBody>
+                  <a:tcPr anchor="ctr">
+                    <a:solidFill>
+                      <a:srgbClr val="96E8EA"/>
+                    </a:solidFill>
+                  </a:tcPr>
+                </a:tc>
+                <a:tc>
+                  <a:txBody>
+                    <a:bodyPr/>
+                    <a:lstStyle/>
+                    <a:p>
+                      <a:pPr algn="ctr"/>
+                      <a:r>
+                        <a:rPr lang="en-US" dirty="0"/>
+                        <a:t>Track Habits</a:t>
+                      </a:r>
+                      <a:endParaRPr lang="en-IN" dirty="0"/>
+                    </a:p>
+                  </a:txBody>
+                  <a:tcPr anchor="ctr">
+                    <a:solidFill>
+                      <a:schemeClr val="accent2">
+                        <a:lumMod val="20000"/>
+                        <a:lumOff val="80000"/>
+                      </a:schemeClr>
+                    </a:solidFill>
+                  </a:tcPr>
+                </a:tc>
+                <a:extLst>
+                  <a:ext uri="{0D108BD9-81ED-4DB2-BD59-A6C34878D82A}">
+                    <a16:rowId xmlns:a16="http://schemas.microsoft.com/office/drawing/2014/main" val="1268335042"/>
+                  </a:ext>
+                </a:extLst>
+              </a:tr>
+              <a:tr h="578746">
+                <a:tc>
+                  <a:txBody>
+                    <a:bodyPr/>
+                    <a:lstStyle/>
+                    <a:p>
+                      <a:pPr algn="ctr"/>
+                      <a:r>
+                        <a:rPr lang="en-US" dirty="0"/>
+                        <a:t>Wellness</a:t>
+                      </a:r>
+                      <a:endParaRPr lang="en-IN" dirty="0"/>
+                    </a:p>
+                  </a:txBody>
+                  <a:tcPr anchor="ctr">
+                    <a:solidFill>
+                      <a:schemeClr val="accent2">
+                        <a:lumMod val="20000"/>
+                        <a:lumOff val="80000"/>
+                      </a:schemeClr>
+                    </a:solidFill>
+                  </a:tcPr>
+                </a:tc>
+                <a:tc>
+                  <a:txBody>
+                    <a:bodyPr/>
+                    <a:lstStyle/>
+                    <a:p>
+                      <a:pPr algn="ctr"/>
+                      <a:r>
+                        <a:rPr lang="en-US" dirty="0">
+                          <a:solidFill>
+                            <a:schemeClr val="tx1"/>
+                          </a:solidFill>
+                        </a:rPr>
+                        <a:t>CRUD</a:t>
+                      </a:r>
+                      <a:endParaRPr lang="en-IN" dirty="0">
+                        <a:solidFill>
+                          <a:schemeClr val="tx1"/>
+                        </a:solidFill>
+                      </a:endParaRPr>
+                    </a:p>
+                  </a:txBody>
+                  <a:tcPr anchor="ctr">
+                    <a:solidFill>
+                      <a:srgbClr val="96E8EA"/>
+                    </a:solidFill>
+                  </a:tcPr>
+                </a:tc>
+                <a:tc>
+                  <a:txBody>
+                    <a:bodyPr/>
+                    <a:lstStyle/>
+                    <a:p>
+                      <a:pPr algn="ctr"/>
+                      <a:r>
+                        <a:rPr lang="en-US" dirty="0"/>
+                        <a:t>Log Wellness Metrics</a:t>
+                      </a:r>
+                      <a:endParaRPr lang="en-IN" dirty="0"/>
+                    </a:p>
+                  </a:txBody>
+                  <a:tcPr anchor="ctr">
+                    <a:solidFill>
+                      <a:schemeClr val="accent2">
+                        <a:lumMod val="20000"/>
+                        <a:lumOff val="80000"/>
+                      </a:schemeClr>
+                    </a:solidFill>
+                  </a:tcPr>
+                </a:tc>
+                <a:extLst>
+                  <a:ext uri="{0D108BD9-81ED-4DB2-BD59-A6C34878D82A}">
+                    <a16:rowId xmlns:a16="http://schemas.microsoft.com/office/drawing/2014/main" val="1367315170"/>
+                  </a:ext>
+                </a:extLst>
+              </a:tr>
+              <a:tr h="578746">
+                <a:tc>
+                  <a:txBody>
+                    <a:bodyPr/>
+                    <a:lstStyle/>
+                    <a:p>
+                      <a:pPr algn="ctr"/>
+                      <a:r>
+                        <a:rPr lang="en-US" dirty="0"/>
+                        <a:t>Reminders</a:t>
+                      </a:r>
+                      <a:endParaRPr lang="en-IN" dirty="0"/>
+                    </a:p>
+                  </a:txBody>
+                  <a:tcPr anchor="ctr">
+                    <a:solidFill>
+                      <a:schemeClr val="accent2">
+                        <a:lumMod val="20000"/>
+                        <a:lumOff val="80000"/>
+                      </a:schemeClr>
+                    </a:solidFill>
+                  </a:tcPr>
+                </a:tc>
+                <a:tc>
+                  <a:txBody>
+                    <a:bodyPr/>
+                    <a:lstStyle/>
+                    <a:p>
+                      <a:pPr algn="ctr"/>
+                      <a:r>
+                        <a:rPr lang="en-US" dirty="0">
+                          <a:solidFill>
+                            <a:schemeClr val="tx1"/>
+                          </a:solidFill>
+                        </a:rPr>
+                        <a:t>CRUD</a:t>
+                      </a:r>
+                      <a:endParaRPr lang="en-IN" dirty="0">
+                        <a:solidFill>
+                          <a:schemeClr val="tx1"/>
+                        </a:solidFill>
+                      </a:endParaRPr>
+                    </a:p>
+                  </a:txBody>
+                  <a:tcPr anchor="ctr">
+                    <a:solidFill>
+                      <a:srgbClr val="96E8EA"/>
+                    </a:solidFill>
+                  </a:tcPr>
+                </a:tc>
+                <a:tc>
+                  <a:txBody>
+                    <a:bodyPr/>
+                    <a:lstStyle/>
+                    <a:p>
+                      <a:pPr algn="ctr"/>
+                      <a:r>
+                        <a:rPr lang="en-US" dirty="0"/>
+                        <a:t>Schedule Reminders</a:t>
+                      </a:r>
+                      <a:endParaRPr lang="en-IN" dirty="0"/>
+                    </a:p>
+                  </a:txBody>
+                  <a:tcPr anchor="ctr">
+                    <a:solidFill>
+                      <a:schemeClr val="accent2">
+                        <a:lumMod val="20000"/>
+                        <a:lumOff val="80000"/>
+                      </a:schemeClr>
+                    </a:solidFill>
+                  </a:tcPr>
+                </a:tc>
+                <a:extLst>
+                  <a:ext uri="{0D108BD9-81ED-4DB2-BD59-A6C34878D82A}">
+                    <a16:rowId xmlns:a16="http://schemas.microsoft.com/office/drawing/2014/main" val="2186698483"/>
+                  </a:ext>
+                </a:extLst>
+              </a:tr>
+              <a:tr h="578746">
+                <a:tc>
+                  <a:txBody>
+                    <a:bodyPr/>
+                    <a:lstStyle/>
+                    <a:p>
+                      <a:pPr algn="ctr"/>
+                      <a:r>
+                        <a:rPr lang="en-US" dirty="0"/>
+                        <a:t>Analytics</a:t>
+                      </a:r>
+                      <a:endParaRPr lang="en-IN" dirty="0"/>
+                    </a:p>
+                  </a:txBody>
+                  <a:tcPr anchor="ctr">
+                    <a:solidFill>
+                      <a:schemeClr val="accent2">
+                        <a:lumMod val="20000"/>
+                        <a:lumOff val="80000"/>
+                      </a:schemeClr>
+                    </a:solidFill>
+                  </a:tcPr>
+                </a:tc>
+                <a:tc>
+                  <a:txBody>
+                    <a:bodyPr/>
+                    <a:lstStyle/>
+                    <a:p>
+                      <a:pPr algn="ctr"/>
+                      <a:r>
+                        <a:rPr lang="en-US" dirty="0">
+                          <a:solidFill>
+                            <a:schemeClr val="tx1"/>
+                          </a:solidFill>
+                        </a:rPr>
+                        <a:t>Insights/ Report</a:t>
+                      </a:r>
+                      <a:endParaRPr lang="en-IN" dirty="0">
+                        <a:solidFill>
+                          <a:schemeClr val="tx1"/>
+                        </a:solidFill>
+                      </a:endParaRPr>
+                    </a:p>
+                  </a:txBody>
+                  <a:tcPr anchor="ctr">
+                    <a:solidFill>
+                      <a:srgbClr val="96E8EA"/>
+                    </a:solidFill>
+                  </a:tcPr>
+                </a:tc>
+                <a:tc>
+                  <a:txBody>
+                    <a:bodyPr/>
+                    <a:lstStyle/>
+                    <a:p>
+                      <a:pPr algn="ctr"/>
+                      <a:r>
+                        <a:rPr lang="en-US" dirty="0"/>
+                        <a:t>Show Progress and Trends</a:t>
+                      </a:r>
+                      <a:endParaRPr lang="en-IN" dirty="0"/>
+                    </a:p>
+                  </a:txBody>
+                  <a:tcPr anchor="ctr">
+                    <a:solidFill>
+                      <a:schemeClr val="accent2">
+                        <a:lumMod val="20000"/>
+                        <a:lumOff val="80000"/>
+                      </a:schemeClr>
+                    </a:solidFill>
+                  </a:tcPr>
+                </a:tc>
+                <a:extLst>
+                  <a:ext uri="{0D108BD9-81ED-4DB2-BD59-A6C34878D82A}">
+                    <a16:rowId xmlns:a16="http://schemas.microsoft.com/office/drawing/2014/main" val="3253578691"/>
+                  </a:ext>
+                </a:extLst>
+              </a:tr>
+            </a:tbl>
+          </a:graphicData>
+        </a:graphic>
+      </p:graphicFrame>
+      <p:sp>
+        <p:nvSpPr>
+          <p:cNvPr id="10" name="Title 9">
+            <a:extLst>
+              <a:ext uri="{FF2B5EF4-FFF2-40B4-BE49-F238E27FC236}">
+                <a16:creationId xmlns:a16="http://schemas.microsoft.com/office/drawing/2014/main" id="{60AD50BE-C1BA-0582-7F1A-A720EDE14AF0}"/>
               </a:ext>
             </a:extLst>
           </p:cNvPr>
@@ -4311,6 +5006,78 @@
             <p:ph type="title"/>
           </p:nvPr>
         </p:nvSpPr>
+        <p:spPr>
+          <a:xfrm>
+            <a:off x="1286539" y="365126"/>
+            <a:ext cx="10515600" cy="1134066"/>
+          </a:xfrm>
+        </p:spPr>
+        <p:txBody>
+          <a:bodyPr/>
+          <a:lstStyle/>
+          <a:p>
+            <a:r>
+              <a:rPr lang="en-US" b="1" dirty="0">
+                <a:solidFill>
+                  <a:srgbClr val="1B134C"/>
+                </a:solidFill>
+              </a:rPr>
+              <a:t>API Modules</a:t>
+            </a:r>
+            <a:endParaRPr lang="en-IN" b="1" dirty="0">
+              <a:solidFill>
+                <a:srgbClr val="1B134C"/>
+              </a:solidFill>
+            </a:endParaRPr>
+          </a:p>
+        </p:txBody>
+      </p:sp>
+    </p:spTree>
+    <p:extLst>
+      <p:ext uri="{BB962C8B-B14F-4D97-AF65-F5344CB8AC3E}">
+        <p14:creationId xmlns:p14="http://schemas.microsoft.com/office/powerpoint/2010/main" val="1759974623"/>
+      </p:ext>
+    </p:extLst>
+  </p:cSld>
+  <p:clrMapOvr>
+    <a:masterClrMapping/>
+  </p:clrMapOvr>
+</p:sld>
+</file>
+
+<file path=ppt/slides/slide11.xml><?xml version="1.0" encoding="utf-8"?>
+<p:sld xmlns:a="http://schemas.openxmlformats.org/drawingml/2006/main" xmlns:r="http://schemas.openxmlformats.org/officeDocument/2006/relationships" xmlns:p="http://schemas.openxmlformats.org/presentationml/2006/main">
+  <p:cSld>
+    <p:spTree>
+      <p:nvGrpSpPr>
+        <p:cNvPr id="1" name=""/>
+        <p:cNvGrpSpPr/>
+        <p:nvPr/>
+      </p:nvGrpSpPr>
+      <p:grpSpPr>
+        <a:xfrm>
+          <a:off x="0" y="0"/>
+          <a:ext cx="0" cy="0"/>
+          <a:chOff x="0" y="0"/>
+          <a:chExt cx="0" cy="0"/>
+        </a:xfrm>
+      </p:grpSpPr>
+      <p:sp>
+        <p:nvSpPr>
+          <p:cNvPr id="2" name="Title 1">
+            <a:extLst>
+              <a:ext uri="{FF2B5EF4-FFF2-40B4-BE49-F238E27FC236}">
+                <a16:creationId xmlns:a16="http://schemas.microsoft.com/office/drawing/2014/main" id="{E3189B1D-8484-5ABE-E5AA-FA98DC3DE89A}"/>
+              </a:ext>
+            </a:extLst>
+          </p:cNvPr>
+          <p:cNvSpPr>
+            <a:spLocks noGrp="1"/>
+          </p:cNvSpPr>
+          <p:nvPr>
+            <p:ph type="title"/>
+          </p:nvPr>
+        </p:nvSpPr>
         <p:spPr/>
         <p:txBody>
           <a:bodyPr/>
@@ -4343,7 +5110,12 @@
             <p:ph idx="1"/>
           </p:nvPr>
         </p:nvSpPr>
-        <p:spPr/>
+        <p:spPr>
+          <a:xfrm>
+            <a:off x="838200" y="1825625"/>
+            <a:ext cx="5158563" cy="4351338"/>
+          </a:xfrm>
+        </p:spPr>
         <p:txBody>
           <a:bodyPr/>
           <a:lstStyle/>
@@ -4352,9 +5124,6 @@
               <a:rPr lang="en-US" dirty="0"/>
               <a:t>User sets habits: Drink 2L water, Walk 5,000 steps, Read 20 minutes.</a:t>
             </a:r>
-          </a:p>
-          <a:p>
-            <a:endParaRPr lang="en-US" dirty="0"/>
           </a:p>
           <a:p>
             <a:r>
@@ -4617,6 +5386,205 @@
           </a:p>
         </p:txBody>
       </p:sp>
+      <p:sp>
+        <p:nvSpPr>
+          <p:cNvPr id="12" name="Rectangle 11">
+            <a:extLst>
+              <a:ext uri="{FF2B5EF4-FFF2-40B4-BE49-F238E27FC236}">
+                <a16:creationId xmlns:a16="http://schemas.microsoft.com/office/drawing/2014/main" id="{29C0C73F-F4CD-CCC2-9140-32DFA364C5B2}"/>
+              </a:ext>
+            </a:extLst>
+          </p:cNvPr>
+          <p:cNvSpPr/>
+          <p:nvPr/>
+        </p:nvSpPr>
+        <p:spPr>
+          <a:xfrm>
+            <a:off x="8551772" y="4706443"/>
+            <a:ext cx="1593140" cy="1364696"/>
+          </a:xfrm>
+          <a:prstGeom prst="rect">
+            <a:avLst/>
+          </a:prstGeom>
+          <a:solidFill>
+            <a:schemeClr val="accent4"/>
+          </a:solidFill>
+          <a:ln>
+            <a:solidFill>
+              <a:schemeClr val="accent4"/>
+            </a:solidFill>
+          </a:ln>
+          <a:effectLst>
+            <a:outerShdw blurRad="50800" dist="38100" dir="10800000" algn="r" rotWithShape="0">
+              <a:prstClr val="black">
+                <a:alpha val="40000"/>
+              </a:prstClr>
+            </a:outerShdw>
+          </a:effectLst>
+        </p:spPr>
+        <p:style>
+          <a:lnRef idx="2">
+            <a:schemeClr val="accent1">
+              <a:shade val="15000"/>
+            </a:schemeClr>
+          </a:lnRef>
+          <a:fillRef idx="1">
+            <a:schemeClr val="accent1"/>
+          </a:fillRef>
+          <a:effectRef idx="0">
+            <a:schemeClr val="accent1"/>
+          </a:effectRef>
+          <a:fontRef idx="minor">
+            <a:schemeClr val="lt1"/>
+          </a:fontRef>
+        </p:style>
+        <p:txBody>
+          <a:bodyPr rtlCol="0" anchor="ctr"/>
+          <a:lstStyle/>
+          <a:p>
+            <a:pPr algn="ctr"/>
+            <a:endParaRPr lang="en-US"/>
+          </a:p>
+        </p:txBody>
+      </p:sp>
+      <p:sp>
+        <p:nvSpPr>
+          <p:cNvPr id="13" name="Rectangle 12">
+            <a:extLst>
+              <a:ext uri="{FF2B5EF4-FFF2-40B4-BE49-F238E27FC236}">
+                <a16:creationId xmlns:a16="http://schemas.microsoft.com/office/drawing/2014/main" id="{3ACB0DFB-4C61-F27F-51D4-294B40CCC7BF}"/>
+              </a:ext>
+            </a:extLst>
+          </p:cNvPr>
+          <p:cNvSpPr/>
+          <p:nvPr/>
+        </p:nvSpPr>
+        <p:spPr>
+          <a:xfrm>
+            <a:off x="6203068" y="684531"/>
+            <a:ext cx="2663887" cy="2301119"/>
+          </a:xfrm>
+          <a:prstGeom prst="rect">
+            <a:avLst/>
+          </a:prstGeom>
+          <a:solidFill>
+            <a:schemeClr val="accent1">
+              <a:lumMod val="50000"/>
+            </a:schemeClr>
+          </a:solidFill>
+          <a:ln>
+            <a:solidFill>
+              <a:schemeClr val="accent1">
+                <a:lumMod val="75000"/>
+              </a:schemeClr>
+            </a:solidFill>
+          </a:ln>
+          <a:effectLst>
+            <a:outerShdw blurRad="50800" dist="38100" dir="10800000" algn="r" rotWithShape="0">
+              <a:prstClr val="black">
+                <a:alpha val="40000"/>
+              </a:prstClr>
+            </a:outerShdw>
+          </a:effectLst>
+        </p:spPr>
+        <p:style>
+          <a:lnRef idx="2">
+            <a:schemeClr val="accent1">
+              <a:shade val="15000"/>
+            </a:schemeClr>
+          </a:lnRef>
+          <a:fillRef idx="1">
+            <a:schemeClr val="accent1"/>
+          </a:fillRef>
+          <a:effectRef idx="0">
+            <a:schemeClr val="accent1"/>
+          </a:effectRef>
+          <a:fontRef idx="minor">
+            <a:schemeClr val="lt1"/>
+          </a:fontRef>
+        </p:style>
+        <p:txBody>
+          <a:bodyPr rtlCol="0" anchor="ctr"/>
+          <a:lstStyle/>
+          <a:p>
+            <a:pPr algn="ctr"/>
+            <a:endParaRPr lang="en-US" dirty="0"/>
+          </a:p>
+        </p:txBody>
+      </p:sp>
+      <p:sp>
+        <p:nvSpPr>
+          <p:cNvPr id="14" name="TextBox 13">
+            <a:extLst>
+              <a:ext uri="{FF2B5EF4-FFF2-40B4-BE49-F238E27FC236}">
+                <a16:creationId xmlns:a16="http://schemas.microsoft.com/office/drawing/2014/main" id="{B51E800C-3006-FB96-5CF8-7A5CCD04E402}"/>
+              </a:ext>
+            </a:extLst>
+          </p:cNvPr>
+          <p:cNvSpPr txBox="1"/>
+          <p:nvPr/>
+        </p:nvSpPr>
+        <p:spPr>
+          <a:xfrm>
+            <a:off x="6729492" y="1573845"/>
+            <a:ext cx="3072486" cy="3938310"/>
+          </a:xfrm>
+          <a:prstGeom prst="rect">
+            <a:avLst/>
+          </a:prstGeom>
+          <a:solidFill>
+            <a:schemeClr val="accent1">
+              <a:lumMod val="40000"/>
+              <a:lumOff val="60000"/>
+            </a:schemeClr>
+          </a:solidFill>
+        </p:spPr>
+        <p:txBody>
+          <a:bodyPr wrap="square" rtlCol="0">
+            <a:spAutoFit/>
+          </a:bodyPr>
+          <a:lstStyle/>
+          <a:p>
+            <a:endParaRPr lang="en-IN" dirty="0"/>
+          </a:p>
+        </p:txBody>
+      </p:sp>
+      <p:pic>
+        <p:nvPicPr>
+          <p:cNvPr id="17" name="Picture 16">
+            <a:extLst>
+              <a:ext uri="{FF2B5EF4-FFF2-40B4-BE49-F238E27FC236}">
+                <a16:creationId xmlns:a16="http://schemas.microsoft.com/office/drawing/2014/main" id="{D3ACDC14-0604-FB1A-695B-BFED46E294F5}"/>
+              </a:ext>
+            </a:extLst>
+          </p:cNvPr>
+          <p:cNvPicPr>
+            <a:picLocks noChangeAspect="1"/>
+          </p:cNvPicPr>
+          <p:nvPr/>
+        </p:nvPicPr>
+        <p:blipFill>
+          <a:blip r:embed="rId4">
+            <a:extLst>
+              <a:ext uri="{28A0092B-C50C-407E-A947-70E740481C1C}">
+                <a14:useLocalDpi xmlns:a14="http://schemas.microsoft.com/office/drawing/2010/main" val="0"/>
+              </a:ext>
+            </a:extLst>
+          </a:blip>
+          <a:stretch>
+            <a:fillRect/>
+          </a:stretch>
+        </p:blipFill>
+        <p:spPr>
+          <a:xfrm>
+            <a:off x="6954638" y="2323629"/>
+            <a:ext cx="2438741" cy="2438741"/>
+          </a:xfrm>
+          <a:prstGeom prst="rect">
+            <a:avLst/>
+          </a:prstGeom>
+        </p:spPr>
+      </p:pic>
     </p:spTree>
     <p:extLst>
       <p:ext uri="{BB962C8B-B14F-4D97-AF65-F5344CB8AC3E}">
@@ -4630,7 +5598,7 @@
 </p:sld>
 </file>
 
-<file path=ppt/slides/slide11.xml><?xml version="1.0" encoding="utf-8"?>
+<file path=ppt/slides/slide12.xml><?xml version="1.0" encoding="utf-8"?>
 <p:sld xmlns:a="http://schemas.openxmlformats.org/drawingml/2006/main" xmlns:r="http://schemas.openxmlformats.org/officeDocument/2006/relationships" xmlns:p="http://schemas.openxmlformats.org/presentationml/2006/main">
   <p:cSld>
     <p:spTree>
@@ -4695,26 +5663,31 @@
             <p:ph idx="1"/>
           </p:nvPr>
         </p:nvSpPr>
-        <p:spPr/>
+        <p:spPr>
+          <a:xfrm>
+            <a:off x="838200" y="1825625"/>
+            <a:ext cx="5573233" cy="4351338"/>
+          </a:xfrm>
+        </p:spPr>
         <p:txBody>
           <a:bodyPr/>
           <a:lstStyle/>
           <a:p>
             <a:r>
               <a:rPr lang="en-US" dirty="0"/>
-              <a:t>- Integration with fitness APIs (Fitbit, Google Fit)</a:t>
+              <a:t>Integration with fitness APIs (Fitbit, Google Fit)</a:t>
             </a:r>
           </a:p>
           <a:p>
             <a:r>
               <a:rPr lang="en-US" dirty="0"/>
-              <a:t>- AI-powered personalized insights</a:t>
+              <a:t>AI-powered personalized insights</a:t>
             </a:r>
           </a:p>
           <a:p>
             <a:r>
               <a:rPr lang="en-US" dirty="0"/>
-              <a:t>- Advanced gamification (leaderboards, group challenges)</a:t>
+              <a:t>Advanced gamification (leaderboards, group challenges)</a:t>
             </a:r>
           </a:p>
           <a:p>
@@ -4960,6 +5933,205 @@
           </a:p>
         </p:txBody>
       </p:sp>
+      <p:sp>
+        <p:nvSpPr>
+          <p:cNvPr id="10" name="Rectangle 9">
+            <a:extLst>
+              <a:ext uri="{FF2B5EF4-FFF2-40B4-BE49-F238E27FC236}">
+                <a16:creationId xmlns:a16="http://schemas.microsoft.com/office/drawing/2014/main" id="{BBE8389C-BC51-0BF3-CBF5-D76D3C2B9E51}"/>
+              </a:ext>
+            </a:extLst>
+          </p:cNvPr>
+          <p:cNvSpPr/>
+          <p:nvPr/>
+        </p:nvSpPr>
+        <p:spPr>
+          <a:xfrm>
+            <a:off x="9022273" y="4610249"/>
+            <a:ext cx="1593140" cy="1364696"/>
+          </a:xfrm>
+          <a:prstGeom prst="rect">
+            <a:avLst/>
+          </a:prstGeom>
+          <a:solidFill>
+            <a:schemeClr val="accent4"/>
+          </a:solidFill>
+          <a:ln>
+            <a:solidFill>
+              <a:schemeClr val="accent4"/>
+            </a:solidFill>
+          </a:ln>
+          <a:effectLst>
+            <a:outerShdw blurRad="50800" dist="38100" dir="10800000" algn="r" rotWithShape="0">
+              <a:prstClr val="black">
+                <a:alpha val="40000"/>
+              </a:prstClr>
+            </a:outerShdw>
+          </a:effectLst>
+        </p:spPr>
+        <p:style>
+          <a:lnRef idx="2">
+            <a:schemeClr val="accent1">
+              <a:shade val="15000"/>
+            </a:schemeClr>
+          </a:lnRef>
+          <a:fillRef idx="1">
+            <a:schemeClr val="accent1"/>
+          </a:fillRef>
+          <a:effectRef idx="0">
+            <a:schemeClr val="accent1"/>
+          </a:effectRef>
+          <a:fontRef idx="minor">
+            <a:schemeClr val="lt1"/>
+          </a:fontRef>
+        </p:style>
+        <p:txBody>
+          <a:bodyPr rtlCol="0" anchor="ctr"/>
+          <a:lstStyle/>
+          <a:p>
+            <a:pPr algn="ctr"/>
+            <a:endParaRPr lang="en-US"/>
+          </a:p>
+        </p:txBody>
+      </p:sp>
+      <p:sp>
+        <p:nvSpPr>
+          <p:cNvPr id="11" name="Rectangle 10">
+            <a:extLst>
+              <a:ext uri="{FF2B5EF4-FFF2-40B4-BE49-F238E27FC236}">
+                <a16:creationId xmlns:a16="http://schemas.microsoft.com/office/drawing/2014/main" id="{9426468C-1A04-44C4-11DB-819DC9ADD418}"/>
+              </a:ext>
+            </a:extLst>
+          </p:cNvPr>
+          <p:cNvSpPr/>
+          <p:nvPr/>
+        </p:nvSpPr>
+        <p:spPr>
+          <a:xfrm>
+            <a:off x="6673569" y="920300"/>
+            <a:ext cx="2663887" cy="1969156"/>
+          </a:xfrm>
+          <a:prstGeom prst="rect">
+            <a:avLst/>
+          </a:prstGeom>
+          <a:solidFill>
+            <a:schemeClr val="accent1">
+              <a:lumMod val="50000"/>
+            </a:schemeClr>
+          </a:solidFill>
+          <a:ln>
+            <a:solidFill>
+              <a:schemeClr val="accent1">
+                <a:lumMod val="75000"/>
+              </a:schemeClr>
+            </a:solidFill>
+          </a:ln>
+          <a:effectLst>
+            <a:outerShdw blurRad="50800" dist="38100" dir="10800000" algn="r" rotWithShape="0">
+              <a:prstClr val="black">
+                <a:alpha val="40000"/>
+              </a:prstClr>
+            </a:outerShdw>
+          </a:effectLst>
+        </p:spPr>
+        <p:style>
+          <a:lnRef idx="2">
+            <a:schemeClr val="accent1">
+              <a:shade val="15000"/>
+            </a:schemeClr>
+          </a:lnRef>
+          <a:fillRef idx="1">
+            <a:schemeClr val="accent1"/>
+          </a:fillRef>
+          <a:effectRef idx="0">
+            <a:schemeClr val="accent1"/>
+          </a:effectRef>
+          <a:fontRef idx="minor">
+            <a:schemeClr val="lt1"/>
+          </a:fontRef>
+        </p:style>
+        <p:txBody>
+          <a:bodyPr rtlCol="0" anchor="ctr"/>
+          <a:lstStyle/>
+          <a:p>
+            <a:pPr algn="ctr"/>
+            <a:endParaRPr lang="en-US" dirty="0"/>
+          </a:p>
+        </p:txBody>
+      </p:sp>
+      <p:sp>
+        <p:nvSpPr>
+          <p:cNvPr id="12" name="TextBox 11">
+            <a:extLst>
+              <a:ext uri="{FF2B5EF4-FFF2-40B4-BE49-F238E27FC236}">
+                <a16:creationId xmlns:a16="http://schemas.microsoft.com/office/drawing/2014/main" id="{E39C2DF7-B4F7-1553-9F41-B76BFE569FA7}"/>
+              </a:ext>
+            </a:extLst>
+          </p:cNvPr>
+          <p:cNvSpPr txBox="1"/>
+          <p:nvPr/>
+        </p:nvSpPr>
+        <p:spPr>
+          <a:xfrm>
+            <a:off x="7227876" y="1595354"/>
+            <a:ext cx="2971416" cy="3938310"/>
+          </a:xfrm>
+          <a:prstGeom prst="rect">
+            <a:avLst/>
+          </a:prstGeom>
+          <a:solidFill>
+            <a:schemeClr val="accent1">
+              <a:lumMod val="40000"/>
+              <a:lumOff val="60000"/>
+            </a:schemeClr>
+          </a:solidFill>
+        </p:spPr>
+        <p:txBody>
+          <a:bodyPr wrap="square" rtlCol="0">
+            <a:spAutoFit/>
+          </a:bodyPr>
+          <a:lstStyle/>
+          <a:p>
+            <a:endParaRPr lang="en-IN" dirty="0"/>
+          </a:p>
+        </p:txBody>
+      </p:sp>
+      <p:pic>
+        <p:nvPicPr>
+          <p:cNvPr id="19" name="Picture 18">
+            <a:extLst>
+              <a:ext uri="{FF2B5EF4-FFF2-40B4-BE49-F238E27FC236}">
+                <a16:creationId xmlns:a16="http://schemas.microsoft.com/office/drawing/2014/main" id="{CCC0487C-2EE6-62CE-BC73-6308299515F1}"/>
+              </a:ext>
+            </a:extLst>
+          </p:cNvPr>
+          <p:cNvPicPr>
+            <a:picLocks noChangeAspect="1"/>
+          </p:cNvPicPr>
+          <p:nvPr/>
+        </p:nvPicPr>
+        <p:blipFill>
+          <a:blip r:embed="rId4">
+            <a:extLst>
+              <a:ext uri="{28A0092B-C50C-407E-A947-70E740481C1C}">
+                <a14:useLocalDpi xmlns:a14="http://schemas.microsoft.com/office/drawing/2010/main" val="0"/>
+              </a:ext>
+            </a:extLst>
+          </a:blip>
+          <a:stretch>
+            <a:fillRect/>
+          </a:stretch>
+        </p:blipFill>
+        <p:spPr>
+          <a:xfrm>
+            <a:off x="7413203" y="2346268"/>
+            <a:ext cx="2600762" cy="2600762"/>
+          </a:xfrm>
+          <a:prstGeom prst="rect">
+            <a:avLst/>
+          </a:prstGeom>
+        </p:spPr>
+      </p:pic>
     </p:spTree>
     <p:extLst>
       <p:ext uri="{BB962C8B-B14F-4D97-AF65-F5344CB8AC3E}">
@@ -4973,7 +6145,445 @@
 </p:sld>
 </file>
 
-<file path=ppt/slides/slide12.xml><?xml version="1.0" encoding="utf-8"?>
+<file path=ppt/slides/slide13.xml><?xml version="1.0" encoding="utf-8"?>
+<p:sld xmlns:a="http://schemas.openxmlformats.org/drawingml/2006/main" xmlns:r="http://schemas.openxmlformats.org/officeDocument/2006/relationships" xmlns:p="http://schemas.openxmlformats.org/presentationml/2006/main">
+  <p:cSld>
+    <p:spTree>
+      <p:nvGrpSpPr>
+        <p:cNvPr id="1" name=""/>
+        <p:cNvGrpSpPr/>
+        <p:nvPr/>
+      </p:nvGrpSpPr>
+      <p:grpSpPr>
+        <a:xfrm>
+          <a:off x="0" y="0"/>
+          <a:ext cx="0" cy="0"/>
+          <a:chOff x="0" y="0"/>
+          <a:chExt cx="0" cy="0"/>
+        </a:xfrm>
+      </p:grpSpPr>
+      <p:sp>
+        <p:nvSpPr>
+          <p:cNvPr id="2" name="Title 1">
+            <a:extLst>
+              <a:ext uri="{FF2B5EF4-FFF2-40B4-BE49-F238E27FC236}">
+                <a16:creationId xmlns:a16="http://schemas.microsoft.com/office/drawing/2014/main" id="{56B1A398-2819-CF58-DB51-843367F368FF}"/>
+              </a:ext>
+            </a:extLst>
+          </p:cNvPr>
+          <p:cNvSpPr>
+            <a:spLocks noGrp="1"/>
+          </p:cNvSpPr>
+          <p:nvPr>
+            <p:ph type="title"/>
+          </p:nvPr>
+        </p:nvSpPr>
+        <p:spPr/>
+        <p:txBody>
+          <a:bodyPr/>
+          <a:lstStyle/>
+          <a:p>
+            <a:r>
+              <a:rPr lang="en-US" b="1" dirty="0">
+                <a:solidFill>
+                  <a:srgbClr val="1B134C"/>
+                </a:solidFill>
+              </a:rPr>
+              <a:t>Conclusion</a:t>
+            </a:r>
+            <a:endParaRPr lang="en-IN" b="1" dirty="0">
+              <a:solidFill>
+                <a:srgbClr val="1B134C"/>
+              </a:solidFill>
+            </a:endParaRPr>
+          </a:p>
+        </p:txBody>
+      </p:sp>
+      <p:sp>
+        <p:nvSpPr>
+          <p:cNvPr id="5" name="Content Placeholder 4">
+            <a:extLst>
+              <a:ext uri="{FF2B5EF4-FFF2-40B4-BE49-F238E27FC236}">
+                <a16:creationId xmlns:a16="http://schemas.microsoft.com/office/drawing/2014/main" id="{1CED7968-B653-62DE-0E0E-15ED850B721F}"/>
+              </a:ext>
+            </a:extLst>
+          </p:cNvPr>
+          <p:cNvSpPr>
+            <a:spLocks noGrp="1"/>
+          </p:cNvSpPr>
+          <p:nvPr>
+            <p:ph idx="1"/>
+          </p:nvPr>
+        </p:nvSpPr>
+        <p:spPr>
+          <a:xfrm>
+            <a:off x="700586" y="1647826"/>
+            <a:ext cx="6328144" cy="4351338"/>
+          </a:xfrm>
+        </p:spPr>
+        <p:txBody>
+          <a:bodyPr>
+            <a:normAutofit fontScale="92500" lnSpcReduction="20000"/>
+          </a:bodyPr>
+          <a:lstStyle/>
+          <a:p>
+            <a:r>
+              <a:rPr lang="en-US" dirty="0"/>
+              <a:t>Developed a </a:t>
+            </a:r>
+            <a:r>
+              <a:rPr lang="en-US" dirty="0" err="1"/>
+              <a:t>FastAPI</a:t>
+            </a:r>
+            <a:r>
+              <a:rPr lang="en-US" dirty="0"/>
+              <a:t> + MongoDB Wellness and Habit Tracker</a:t>
+            </a:r>
+          </a:p>
+          <a:p>
+            <a:r>
+              <a:rPr lang="en-US" dirty="0"/>
+              <a:t>Helps users build healthy habits, log wellness metrics and stay consistent</a:t>
+            </a:r>
+          </a:p>
+          <a:p>
+            <a:r>
+              <a:rPr lang="en-US" dirty="0"/>
+              <a:t>Provides reminders, analytics and personalized insights for self-improvement</a:t>
+            </a:r>
+          </a:p>
+          <a:p>
+            <a:r>
+              <a:rPr lang="en-US" dirty="0"/>
+              <a:t>Ensures scalability and flexibility with containerized development (Docker + Cloud)</a:t>
+            </a:r>
+          </a:p>
+          <a:p>
+            <a:r>
+              <a:rPr lang="en-US" dirty="0"/>
+              <a:t>Sets Foundation for future enhancements-&gt; AI-powered recommendations, fitness API integration and gamification</a:t>
+            </a:r>
+            <a:endParaRPr lang="en-IN" dirty="0"/>
+          </a:p>
+        </p:txBody>
+      </p:sp>
+      <p:sp>
+        <p:nvSpPr>
+          <p:cNvPr id="6" name="Rectangle 5">
+            <a:extLst>
+              <a:ext uri="{FF2B5EF4-FFF2-40B4-BE49-F238E27FC236}">
+                <a16:creationId xmlns:a16="http://schemas.microsoft.com/office/drawing/2014/main" id="{B1725575-33CD-9E8F-FFC7-BF93AEBB850F}"/>
+              </a:ext>
+            </a:extLst>
+          </p:cNvPr>
+          <p:cNvSpPr/>
+          <p:nvPr/>
+        </p:nvSpPr>
+        <p:spPr>
+          <a:xfrm>
+            <a:off x="0" y="0"/>
+            <a:ext cx="542925" cy="1647826"/>
+          </a:xfrm>
+          <a:prstGeom prst="rect">
+            <a:avLst/>
+          </a:prstGeom>
+          <a:solidFill>
+            <a:srgbClr val="23AAAD"/>
+          </a:solidFill>
+          <a:ln>
+            <a:noFill/>
+          </a:ln>
+        </p:spPr>
+        <p:style>
+          <a:lnRef idx="2">
+            <a:schemeClr val="accent1">
+              <a:shade val="15000"/>
+            </a:schemeClr>
+          </a:lnRef>
+          <a:fillRef idx="1">
+            <a:schemeClr val="accent1"/>
+          </a:fillRef>
+          <a:effectRef idx="0">
+            <a:schemeClr val="accent1"/>
+          </a:effectRef>
+          <a:fontRef idx="minor">
+            <a:schemeClr val="lt1"/>
+          </a:fontRef>
+        </p:style>
+        <p:txBody>
+          <a:bodyPr rtlCol="0" anchor="ctr"/>
+          <a:lstStyle/>
+          <a:p>
+            <a:pPr algn="ctr"/>
+            <a:endParaRPr lang="en-US"/>
+          </a:p>
+        </p:txBody>
+      </p:sp>
+      <p:sp>
+        <p:nvSpPr>
+          <p:cNvPr id="8" name="Rectangle 7">
+            <a:extLst>
+              <a:ext uri="{FF2B5EF4-FFF2-40B4-BE49-F238E27FC236}">
+                <a16:creationId xmlns:a16="http://schemas.microsoft.com/office/drawing/2014/main" id="{B36AE01C-F12E-C40A-F8FF-61D17BACEFCF}"/>
+              </a:ext>
+            </a:extLst>
+          </p:cNvPr>
+          <p:cNvSpPr/>
+          <p:nvPr/>
+        </p:nvSpPr>
+        <p:spPr>
+          <a:xfrm>
+            <a:off x="11493794" y="4914900"/>
+            <a:ext cx="698205" cy="1943100"/>
+          </a:xfrm>
+          <a:prstGeom prst="rect">
+            <a:avLst/>
+          </a:prstGeom>
+          <a:solidFill>
+            <a:srgbClr val="F39E34"/>
+          </a:solidFill>
+          <a:ln>
+            <a:noFill/>
+          </a:ln>
+        </p:spPr>
+        <p:style>
+          <a:lnRef idx="2">
+            <a:schemeClr val="accent1">
+              <a:shade val="15000"/>
+            </a:schemeClr>
+          </a:lnRef>
+          <a:fillRef idx="1">
+            <a:schemeClr val="accent1"/>
+          </a:fillRef>
+          <a:effectRef idx="0">
+            <a:schemeClr val="accent1"/>
+          </a:effectRef>
+          <a:fontRef idx="minor">
+            <a:schemeClr val="lt1"/>
+          </a:fontRef>
+        </p:style>
+        <p:txBody>
+          <a:bodyPr rtlCol="0" anchor="ctr"/>
+          <a:lstStyle/>
+          <a:p>
+            <a:pPr algn="ctr"/>
+            <a:endParaRPr lang="en-US"/>
+          </a:p>
+        </p:txBody>
+      </p:sp>
+      <p:sp>
+        <p:nvSpPr>
+          <p:cNvPr id="9" name="Rectangle 8">
+            <a:extLst>
+              <a:ext uri="{FF2B5EF4-FFF2-40B4-BE49-F238E27FC236}">
+                <a16:creationId xmlns:a16="http://schemas.microsoft.com/office/drawing/2014/main" id="{6DA615A5-4E7C-285F-AFBB-503A3D34E142}"/>
+              </a:ext>
+            </a:extLst>
+          </p:cNvPr>
+          <p:cNvSpPr/>
+          <p:nvPr/>
+        </p:nvSpPr>
+        <p:spPr>
+          <a:xfrm>
+            <a:off x="9733800" y="4104900"/>
+            <a:ext cx="1620000" cy="1620000"/>
+          </a:xfrm>
+          <a:prstGeom prst="rect">
+            <a:avLst/>
+          </a:prstGeom>
+          <a:solidFill>
+            <a:schemeClr val="accent4"/>
+          </a:solidFill>
+          <a:ln>
+            <a:solidFill>
+              <a:schemeClr val="accent4"/>
+            </a:solidFill>
+          </a:ln>
+          <a:effectLst>
+            <a:outerShdw blurRad="50800" dist="38100" dir="10800000" algn="r" rotWithShape="0">
+              <a:prstClr val="black">
+                <a:alpha val="40000"/>
+              </a:prstClr>
+            </a:outerShdw>
+          </a:effectLst>
+        </p:spPr>
+        <p:style>
+          <a:lnRef idx="2">
+            <a:schemeClr val="accent1">
+              <a:shade val="15000"/>
+            </a:schemeClr>
+          </a:lnRef>
+          <a:fillRef idx="1">
+            <a:schemeClr val="accent1"/>
+          </a:fillRef>
+          <a:effectRef idx="0">
+            <a:schemeClr val="accent1"/>
+          </a:effectRef>
+          <a:fontRef idx="minor">
+            <a:schemeClr val="lt1"/>
+          </a:fontRef>
+        </p:style>
+        <p:txBody>
+          <a:bodyPr rtlCol="0" anchor="ctr"/>
+          <a:lstStyle/>
+          <a:p>
+            <a:pPr algn="ctr"/>
+            <a:endParaRPr lang="en-US"/>
+          </a:p>
+        </p:txBody>
+      </p:sp>
+      <p:sp>
+        <p:nvSpPr>
+          <p:cNvPr id="10" name="Rectangle 9">
+            <a:extLst>
+              <a:ext uri="{FF2B5EF4-FFF2-40B4-BE49-F238E27FC236}">
+                <a16:creationId xmlns:a16="http://schemas.microsoft.com/office/drawing/2014/main" id="{F4A686AD-0F82-31A4-E638-8990D9226C52}"/>
+              </a:ext>
+            </a:extLst>
+          </p:cNvPr>
+          <p:cNvSpPr/>
+          <p:nvPr/>
+        </p:nvSpPr>
+        <p:spPr>
+          <a:xfrm>
+            <a:off x="6831262" y="1316976"/>
+            <a:ext cx="1620000" cy="1620000"/>
+          </a:xfrm>
+          <a:prstGeom prst="rect">
+            <a:avLst/>
+          </a:prstGeom>
+          <a:solidFill>
+            <a:schemeClr val="accent1">
+              <a:lumMod val="50000"/>
+            </a:schemeClr>
+          </a:solidFill>
+          <a:ln>
+            <a:solidFill>
+              <a:schemeClr val="accent1">
+                <a:lumMod val="75000"/>
+              </a:schemeClr>
+            </a:solidFill>
+          </a:ln>
+          <a:effectLst>
+            <a:outerShdw blurRad="50800" dist="38100" dir="10800000" algn="r" rotWithShape="0">
+              <a:prstClr val="black">
+                <a:alpha val="40000"/>
+              </a:prstClr>
+            </a:outerShdw>
+          </a:effectLst>
+        </p:spPr>
+        <p:style>
+          <a:lnRef idx="2">
+            <a:schemeClr val="accent1">
+              <a:shade val="15000"/>
+            </a:schemeClr>
+          </a:lnRef>
+          <a:fillRef idx="1">
+            <a:schemeClr val="accent1"/>
+          </a:fillRef>
+          <a:effectRef idx="0">
+            <a:schemeClr val="accent1"/>
+          </a:effectRef>
+          <a:fontRef idx="minor">
+            <a:schemeClr val="lt1"/>
+          </a:fontRef>
+        </p:style>
+        <p:txBody>
+          <a:bodyPr rtlCol="0" anchor="ctr"/>
+          <a:lstStyle/>
+          <a:p>
+            <a:pPr algn="ctr"/>
+            <a:endParaRPr lang="en-US" dirty="0"/>
+          </a:p>
+        </p:txBody>
+      </p:sp>
+      <p:sp>
+        <p:nvSpPr>
+          <p:cNvPr id="11" name="TextBox 10">
+            <a:extLst>
+              <a:ext uri="{FF2B5EF4-FFF2-40B4-BE49-F238E27FC236}">
+                <a16:creationId xmlns:a16="http://schemas.microsoft.com/office/drawing/2014/main" id="{CFE1D0FA-9BDA-E71C-D62D-7690E0BC0095}"/>
+              </a:ext>
+            </a:extLst>
+          </p:cNvPr>
+          <p:cNvSpPr txBox="1"/>
+          <p:nvPr/>
+        </p:nvSpPr>
+        <p:spPr>
+          <a:xfrm>
+            <a:off x="7631918" y="2126976"/>
+            <a:ext cx="2971416" cy="2970000"/>
+          </a:xfrm>
+          <a:prstGeom prst="rect">
+            <a:avLst/>
+          </a:prstGeom>
+          <a:solidFill>
+            <a:schemeClr val="accent1">
+              <a:lumMod val="40000"/>
+              <a:lumOff val="60000"/>
+            </a:schemeClr>
+          </a:solidFill>
+        </p:spPr>
+        <p:txBody>
+          <a:bodyPr wrap="square" rtlCol="0">
+            <a:spAutoFit/>
+          </a:bodyPr>
+          <a:lstStyle/>
+          <a:p>
+            <a:endParaRPr lang="en-IN" dirty="0"/>
+          </a:p>
+        </p:txBody>
+      </p:sp>
+      <p:pic>
+        <p:nvPicPr>
+          <p:cNvPr id="14" name="Picture 13">
+            <a:extLst>
+              <a:ext uri="{FF2B5EF4-FFF2-40B4-BE49-F238E27FC236}">
+                <a16:creationId xmlns:a16="http://schemas.microsoft.com/office/drawing/2014/main" id="{2F741918-5674-29BB-139E-07C165E78DC0}"/>
+              </a:ext>
+            </a:extLst>
+          </p:cNvPr>
+          <p:cNvPicPr>
+            <a:picLocks noChangeAspect="1"/>
+          </p:cNvPicPr>
+          <p:nvPr/>
+        </p:nvPicPr>
+        <p:blipFill>
+          <a:blip r:embed="rId2">
+            <a:extLst>
+              <a:ext uri="{28A0092B-C50C-407E-A947-70E740481C1C}">
+                <a14:useLocalDpi xmlns:a14="http://schemas.microsoft.com/office/drawing/2010/main" val="0"/>
+              </a:ext>
+            </a:extLst>
+          </a:blip>
+          <a:stretch>
+            <a:fillRect/>
+          </a:stretch>
+        </p:blipFill>
+        <p:spPr>
+          <a:xfrm>
+            <a:off x="8043567" y="2537917"/>
+            <a:ext cx="2148118" cy="2148118"/>
+          </a:xfrm>
+          <a:prstGeom prst="rect">
+            <a:avLst/>
+          </a:prstGeom>
+        </p:spPr>
+      </p:pic>
+    </p:spTree>
+    <p:extLst>
+      <p:ext uri="{BB962C8B-B14F-4D97-AF65-F5344CB8AC3E}">
+        <p14:creationId xmlns:p14="http://schemas.microsoft.com/office/powerpoint/2010/main" val="3719201353"/>
+      </p:ext>
+    </p:extLst>
+  </p:cSld>
+  <p:clrMapOvr>
+    <a:masterClrMapping/>
+  </p:clrMapOvr>
+</p:sld>
+</file>
+
+<file path=ppt/slides/slide14.xml><?xml version="1.0" encoding="utf-8"?>
 <p:sld xmlns:a="http://schemas.openxmlformats.org/drawingml/2006/main" xmlns:r="http://schemas.openxmlformats.org/officeDocument/2006/relationships" xmlns:p="http://schemas.openxmlformats.org/presentationml/2006/main">
   <p:cSld>
     <p:spTree>
@@ -5184,7 +6794,7 @@
         </p:nvSpPr>
         <p:spPr>
           <a:xfrm>
-            <a:off x="9725025" y="4267826"/>
+            <a:off x="9250819" y="4352545"/>
             <a:ext cx="2057400" cy="1943100"/>
           </a:xfrm>
           <a:prstGeom prst="rect">
@@ -5236,14 +6846,16 @@
         </p:nvSpPr>
         <p:spPr>
           <a:xfrm>
-            <a:off x="7677150" y="628650"/>
+            <a:off x="7202944" y="713369"/>
             <a:ext cx="3705225" cy="5124450"/>
           </a:xfrm>
           <a:prstGeom prst="rect">
             <a:avLst/>
           </a:prstGeom>
           <a:solidFill>
-            <a:srgbClr val="1B134C"/>
+            <a:schemeClr val="accent1">
+              <a:lumMod val="75000"/>
+            </a:schemeClr>
           </a:solidFill>
           <a:ln>
             <a:noFill/>
@@ -5425,8 +7037,8 @@
         </p:nvSpPr>
         <p:spPr>
           <a:xfrm>
-            <a:off x="828194" y="960234"/>
-            <a:ext cx="5133037" cy="2954655"/>
+            <a:off x="828194" y="2523219"/>
+            <a:ext cx="5133037" cy="2585323"/>
           </a:xfrm>
           <a:prstGeom prst="rect">
             <a:avLst/>
@@ -5438,19 +7050,6 @@
             <a:spAutoFit/>
           </a:bodyPr>
           <a:lstStyle/>
-          <a:p>
-            <a:pPr marL="285750" indent="-285750">
-              <a:buFont typeface="Arial"/>
-              <a:buChar char="•"/>
-            </a:pPr>
-            <a:endParaRPr lang="en-US" sz="2400" dirty="0">
-              <a:solidFill>
-                <a:srgbClr val="1B134C"/>
-              </a:solidFill>
-              <a:ea typeface="+mn-lt"/>
-              <a:cs typeface="+mn-lt"/>
-            </a:endParaRPr>
-          </a:p>
           <a:p>
             <a:r>
               <a:rPr lang="en-US" sz="2400" dirty="0"/>
@@ -5482,7 +7081,7 @@
         </p:nvSpPr>
         <p:spPr>
           <a:xfrm>
-            <a:off x="828194" y="338953"/>
+            <a:off x="881652" y="1996891"/>
             <a:ext cx="4381499" cy="596766"/>
           </a:xfrm>
           <a:prstGeom prst="rect">
@@ -5536,7 +7135,7 @@
         </p:nvSpPr>
         <p:spPr>
           <a:xfrm>
-            <a:off x="7403057" y="338953"/>
+            <a:off x="6928851" y="423672"/>
             <a:ext cx="542925" cy="1647826"/>
           </a:xfrm>
           <a:prstGeom prst="rect">
@@ -5626,6 +7225,42 @@
           </a:p>
         </p:txBody>
       </p:sp>
+      <p:pic>
+        <p:nvPicPr>
+          <p:cNvPr id="4" name="Picture 3">
+            <a:extLst>
+              <a:ext uri="{FF2B5EF4-FFF2-40B4-BE49-F238E27FC236}">
+                <a16:creationId xmlns:a16="http://schemas.microsoft.com/office/drawing/2014/main" id="{65646BE6-0CBF-0110-471E-8EE1CD1A3C70}"/>
+              </a:ext>
+            </a:extLst>
+          </p:cNvPr>
+          <p:cNvPicPr>
+            <a:picLocks noChangeAspect="1"/>
+          </p:cNvPicPr>
+          <p:nvPr/>
+        </p:nvPicPr>
+        <p:blipFill>
+          <a:blip r:embed="rId4">
+            <a:extLst>
+              <a:ext uri="{28A0092B-C50C-407E-A947-70E740481C1C}">
+                <a14:useLocalDpi xmlns:a14="http://schemas.microsoft.com/office/drawing/2010/main" val="0"/>
+              </a:ext>
+            </a:extLst>
+          </a:blip>
+          <a:stretch>
+            <a:fillRect/>
+          </a:stretch>
+        </p:blipFill>
+        <p:spPr>
+          <a:xfrm>
+            <a:off x="7200313" y="1305711"/>
+            <a:ext cx="3705225" cy="3939766"/>
+          </a:xfrm>
+          <a:prstGeom prst="rect">
+            <a:avLst/>
+          </a:prstGeom>
+        </p:spPr>
+      </p:pic>
     </p:spTree>
     <p:extLst>
       <p:ext uri="{BB962C8B-B14F-4D97-AF65-F5344CB8AC3E}">
@@ -5676,7 +7311,7 @@
         </p:nvSpPr>
         <p:spPr>
           <a:xfrm>
-            <a:off x="9496552" y="4594034"/>
+            <a:off x="9464654" y="4399540"/>
             <a:ext cx="2258446" cy="1994053"/>
           </a:xfrm>
           <a:prstGeom prst="rect">
@@ -5737,8 +7372,8 @@
         </p:nvSpPr>
         <p:spPr>
           <a:xfrm>
-            <a:off x="6700698" y="140271"/>
-            <a:ext cx="3776344" cy="3362327"/>
+            <a:off x="6687203" y="464407"/>
+            <a:ext cx="3776344" cy="3427557"/>
           </a:xfrm>
           <a:prstGeom prst="rect">
             <a:avLst/>
@@ -5802,7 +7437,7 @@
         </p:nvSpPr>
         <p:spPr>
           <a:xfrm>
-            <a:off x="95616" y="140271"/>
+            <a:off x="1073812" y="140271"/>
             <a:ext cx="4381499" cy="596766"/>
           </a:xfrm>
           <a:prstGeom prst="rect">
@@ -5822,9 +7457,9 @@
               </a:lnSpc>
             </a:pPr>
             <a:r>
-              <a:rPr lang="en-US" sz="4400" spc="-300" dirty="0">
+              <a:rPr lang="en-US" sz="4400" b="1" spc="-300" dirty="0">
                 <a:solidFill>
-                  <a:srgbClr val="000000"/>
+                  <a:srgbClr val="1B134C"/>
                 </a:solidFill>
                 <a:latin typeface="Calibri"/>
                 <a:ea typeface="Calibri"/>
@@ -5832,7 +7467,340 @@
               </a:rPr>
               <a:t>Architecture</a:t>
             </a:r>
-            <a:endParaRPr lang="en-US" dirty="0"/>
+            <a:endParaRPr lang="en-US" b="1" dirty="0">
+              <a:solidFill>
+                <a:srgbClr val="1B134C"/>
+              </a:solidFill>
+            </a:endParaRPr>
+          </a:p>
+        </p:txBody>
+      </p:sp>
+      <p:sp>
+        <p:nvSpPr>
+          <p:cNvPr id="7" name="TextBox 6">
+            <a:extLst>
+              <a:ext uri="{FF2B5EF4-FFF2-40B4-BE49-F238E27FC236}">
+                <a16:creationId xmlns:a16="http://schemas.microsoft.com/office/drawing/2014/main" id="{9A17FC05-0E05-8D59-0BF9-EC5F91E3D62F}"/>
+              </a:ext>
+            </a:extLst>
+          </p:cNvPr>
+          <p:cNvSpPr txBox="1"/>
+          <p:nvPr/>
+        </p:nvSpPr>
+        <p:spPr>
+          <a:xfrm>
+            <a:off x="7430099" y="1209161"/>
+            <a:ext cx="3797882" cy="4613578"/>
+          </a:xfrm>
+          <a:prstGeom prst="rect">
+            <a:avLst/>
+          </a:prstGeom>
+          <a:solidFill>
+            <a:schemeClr val="accent1">
+              <a:lumMod val="40000"/>
+              <a:lumOff val="60000"/>
+            </a:schemeClr>
+          </a:solidFill>
+        </p:spPr>
+        <p:txBody>
+          <a:bodyPr wrap="square" rtlCol="0">
+            <a:spAutoFit/>
+          </a:bodyPr>
+          <a:lstStyle/>
+          <a:p>
+            <a:endParaRPr lang="en-IN" dirty="0"/>
+          </a:p>
+        </p:txBody>
+      </p:sp>
+      <p:pic>
+        <p:nvPicPr>
+          <p:cNvPr id="11" name="Picture 10">
+            <a:extLst>
+              <a:ext uri="{FF2B5EF4-FFF2-40B4-BE49-F238E27FC236}">
+                <a16:creationId xmlns:a16="http://schemas.microsoft.com/office/drawing/2014/main" id="{E7DD74DE-3015-E369-E590-F89D24C268D3}"/>
+              </a:ext>
+            </a:extLst>
+          </p:cNvPr>
+          <p:cNvPicPr>
+            <a:picLocks noChangeAspect="1"/>
+          </p:cNvPicPr>
+          <p:nvPr/>
+        </p:nvPicPr>
+        <p:blipFill>
+          <a:blip r:embed="rId3">
+            <a:extLst>
+              <a:ext uri="{28A0092B-C50C-407E-A947-70E740481C1C}">
+                <a14:useLocalDpi xmlns:a14="http://schemas.microsoft.com/office/drawing/2010/main" val="0"/>
+              </a:ext>
+            </a:extLst>
+          </a:blip>
+          <a:stretch>
+            <a:fillRect/>
+          </a:stretch>
+        </p:blipFill>
+        <p:spPr>
+          <a:xfrm>
+            <a:off x="7430099" y="1666766"/>
+            <a:ext cx="3777994" cy="3777994"/>
+          </a:xfrm>
+          <a:prstGeom prst="rect">
+            <a:avLst/>
+          </a:prstGeom>
+        </p:spPr>
+      </p:pic>
+      <p:sp>
+        <p:nvSpPr>
+          <p:cNvPr id="2" name="TextBox 1">
+            <a:extLst>
+              <a:ext uri="{FF2B5EF4-FFF2-40B4-BE49-F238E27FC236}">
+                <a16:creationId xmlns:a16="http://schemas.microsoft.com/office/drawing/2014/main" id="{50283D58-1E2A-3563-27FE-6C4DD9860B24}"/>
+              </a:ext>
+            </a:extLst>
+          </p:cNvPr>
+          <p:cNvSpPr txBox="1"/>
+          <p:nvPr/>
+        </p:nvSpPr>
+        <p:spPr>
+          <a:xfrm>
+            <a:off x="1051748" y="623546"/>
+            <a:ext cx="5206665" cy="5986254"/>
+          </a:xfrm>
+          <a:prstGeom prst="rect">
+            <a:avLst/>
+          </a:prstGeom>
+          <a:solidFill>
+            <a:schemeClr val="bg1"/>
+          </a:solidFill>
+        </p:spPr>
+        <p:txBody>
+          <a:bodyPr wrap="square" rtlCol="0">
+            <a:spAutoFit/>
+          </a:bodyPr>
+          <a:lstStyle/>
+          <a:p>
+            <a:r>
+              <a:rPr lang="en-US" sz="1200" dirty="0" err="1"/>
+              <a:t>wellness_habit_tracker</a:t>
+            </a:r>
+            <a:r>
+              <a:rPr lang="en-US" sz="1200" dirty="0"/>
+              <a:t>/</a:t>
+            </a:r>
+          </a:p>
+          <a:p>
+            <a:r>
+              <a:rPr lang="en-US" sz="1200" dirty="0"/>
+              <a:t>│── app/</a:t>
+            </a:r>
+          </a:p>
+          <a:p>
+            <a:r>
+              <a:rPr lang="en-US" sz="1200" dirty="0"/>
+              <a:t>│   │── main.py                 # </a:t>
+            </a:r>
+            <a:r>
+              <a:rPr lang="en-US" sz="1200" dirty="0" err="1"/>
+              <a:t>FastAPI</a:t>
+            </a:r>
+            <a:r>
+              <a:rPr lang="en-US" sz="1200" dirty="0"/>
+              <a:t> entry point</a:t>
+            </a:r>
+          </a:p>
+          <a:p>
+            <a:r>
+              <a:rPr lang="en-US" sz="1200" dirty="0"/>
+              <a:t>│   │── database.py             # MongoDB connection (Motor client)</a:t>
+            </a:r>
+          </a:p>
+          <a:p>
+            <a:r>
+              <a:rPr lang="en-US" sz="1200" dirty="0"/>
+              <a:t>│   │── celery_worker.py        # Celery app (for reminders/notifications)</a:t>
+            </a:r>
+          </a:p>
+          <a:p>
+            <a:r>
+              <a:rPr lang="en-US" sz="1200" dirty="0"/>
+              <a:t>│   │</a:t>
+            </a:r>
+          </a:p>
+          <a:p>
+            <a:r>
+              <a:rPr lang="en-US" sz="1200" dirty="0"/>
+              <a:t>│   ├── models/                 # </a:t>
+            </a:r>
+            <a:r>
+              <a:rPr lang="en-US" sz="1200" dirty="0" err="1"/>
+              <a:t>Pydantic</a:t>
+            </a:r>
+            <a:r>
+              <a:rPr lang="en-US" sz="1200" dirty="0"/>
+              <a:t> models (schemas)</a:t>
+            </a:r>
+          </a:p>
+          <a:p>
+            <a:r>
+              <a:rPr lang="en-US" sz="1200" dirty="0"/>
+              <a:t>│   │   │── user.py             # User schemas</a:t>
+            </a:r>
+          </a:p>
+          <a:p>
+            <a:r>
+              <a:rPr lang="en-US" sz="1200" dirty="0"/>
+              <a:t>│   │   │── habit.py            # Habit schemas</a:t>
+            </a:r>
+          </a:p>
+          <a:p>
+            <a:r>
+              <a:rPr lang="en-US" sz="1200" dirty="0"/>
+              <a:t>│   │   │── wellness.py         # Wellness log schemas</a:t>
+            </a:r>
+          </a:p>
+          <a:p>
+            <a:r>
+              <a:rPr lang="en-US" sz="1200" dirty="0"/>
+              <a:t>│   │   │── reminder.py         # Reminder schemas</a:t>
+            </a:r>
+          </a:p>
+          <a:p>
+            <a:r>
+              <a:rPr lang="en-US" sz="1200" dirty="0"/>
+              <a:t>│   │</a:t>
+            </a:r>
+          </a:p>
+          <a:p>
+            <a:r>
+              <a:rPr lang="en-US" sz="1200" dirty="0"/>
+              <a:t>│   ├── routes/                 # API endpoints</a:t>
+            </a:r>
+          </a:p>
+          <a:p>
+            <a:r>
+              <a:rPr lang="en-US" sz="1200" dirty="0"/>
+              <a:t>│   │   │── auth.py             # Register, login, logout</a:t>
+            </a:r>
+          </a:p>
+          <a:p>
+            <a:r>
+              <a:rPr lang="en-US" sz="1200" dirty="0"/>
+              <a:t>│   │   │── users.py            # User profile, update profile, change password</a:t>
+            </a:r>
+          </a:p>
+          <a:p>
+            <a:r>
+              <a:rPr lang="en-US" sz="1200" dirty="0"/>
+              <a:t>│   │   │── habits.py           # Habit CRUD + logging</a:t>
+            </a:r>
+          </a:p>
+          <a:p>
+            <a:r>
+              <a:rPr lang="en-US" sz="1200" dirty="0"/>
+              <a:t>│   │   │── wellness.py         # Wellness logging CRUD</a:t>
+            </a:r>
+          </a:p>
+          <a:p>
+            <a:r>
+              <a:rPr lang="en-US" sz="1200" dirty="0"/>
+              <a:t>│   │   │── reminders.py        # Reminder CRUD</a:t>
+            </a:r>
+          </a:p>
+          <a:p>
+            <a:r>
+              <a:rPr lang="en-US" sz="1200" dirty="0"/>
+              <a:t>│   │   │── analytics.py        # Analytics/insights endpoints</a:t>
+            </a:r>
+          </a:p>
+          <a:p>
+            <a:r>
+              <a:rPr lang="en-US" sz="1200" dirty="0"/>
+              <a:t>│   │</a:t>
+            </a:r>
+          </a:p>
+          <a:p>
+            <a:r>
+              <a:rPr lang="en-US" sz="1200" dirty="0"/>
+              <a:t>│   ├── utils/                  # Helper utilities</a:t>
+            </a:r>
+          </a:p>
+          <a:p>
+            <a:r>
+              <a:rPr lang="en-US" sz="1200" dirty="0"/>
+              <a:t>│   │   │── security.py         # JWT utils, password hashing utils</a:t>
+            </a:r>
+          </a:p>
+          <a:p>
+            <a:r>
+              <a:rPr lang="en-US" sz="1200" dirty="0"/>
+              <a:t>│   │   │── scheduler.py        # Celery tasks, background jobs</a:t>
+            </a:r>
+          </a:p>
+          <a:p>
+            <a:r>
+              <a:rPr lang="en-US" sz="1200" dirty="0"/>
+              <a:t>│   │   │── mongo_helper.py           # Logging config</a:t>
+            </a:r>
+          </a:p>
+          <a:p>
+            <a:r>
+              <a:rPr lang="en-US" sz="1200" dirty="0"/>
+              <a:t>│   │</a:t>
+            </a:r>
+          </a:p>
+          <a:p>
+            <a:r>
+              <a:rPr lang="en-US" sz="1200" dirty="0"/>
+              <a:t>│</a:t>
+            </a:r>
+          </a:p>
+          <a:p>
+            <a:r>
+              <a:rPr lang="en-US" sz="1200" dirty="0"/>
+              <a:t>│── requirements.txt            # All dependencies</a:t>
+            </a:r>
+          </a:p>
+          <a:p>
+            <a:r>
+              <a:rPr lang="en-US" sz="1200" dirty="0"/>
+              <a:t>│── .env                        # Environment variables (DB URI, JWT secret, etc.)</a:t>
+            </a:r>
+          </a:p>
+          <a:p>
+            <a:r>
+              <a:rPr lang="en-US" sz="1200" dirty="0"/>
+              <a:t>│── </a:t>
+            </a:r>
+            <a:r>
+              <a:rPr lang="en-US" sz="1200" dirty="0" err="1"/>
+              <a:t>Dockerfile</a:t>
+            </a:r>
+            <a:r>
+              <a:rPr lang="en-US" sz="1200" dirty="0"/>
+              <a:t>                  # For containerization</a:t>
+            </a:r>
+          </a:p>
+          <a:p>
+            <a:r>
+              <a:rPr lang="en-US" sz="1200" dirty="0"/>
+              <a:t>│── docker-</a:t>
+            </a:r>
+            <a:r>
+              <a:rPr lang="en-US" sz="1200" dirty="0" err="1"/>
+              <a:t>compose.yml</a:t>
+            </a:r>
+            <a:r>
+              <a:rPr lang="en-US" sz="1200" dirty="0"/>
+              <a:t>          # (optional) MongoDB + Redis + App setup</a:t>
+            </a:r>
+          </a:p>
+          <a:p>
+            <a:r>
+              <a:rPr lang="en-US" sz="1200" dirty="0"/>
+              <a:t>│── README.md                   # Project documentation</a:t>
+            </a:r>
+          </a:p>
+          <a:p>
+            <a:endParaRPr lang="en-US" sz="1100" dirty="0"/>
           </a:p>
         </p:txBody>
       </p:sp>
@@ -5850,7 +7818,7 @@
         </p:nvGrpSpPr>
         <p:grpSpPr>
           <a:xfrm>
-            <a:off x="126706" y="6376302"/>
+            <a:off x="126706" y="6393593"/>
             <a:ext cx="4886323" cy="388987"/>
             <a:chOff x="618333" y="6026099"/>
             <a:chExt cx="4886323" cy="388987"/>
@@ -5912,10 +7880,10 @@
             <p:nvPr/>
           </p:nvPicPr>
           <p:blipFill>
-            <a:blip r:embed="rId3">
+            <a:blip r:embed="rId4">
               <a:extLst>
                 <a:ext uri="{96DAC541-7B7A-43D3-8B79-37D633B846F1}">
-                  <asvg:svgBlip xmlns:asvg="http://schemas.microsoft.com/office/drawing/2016/SVG/main" r:embed="rId4"/>
+                  <asvg:svgBlip xmlns:asvg="http://schemas.microsoft.com/office/drawing/2016/SVG/main" r:embed="rId5"/>
                 </a:ext>
               </a:extLst>
             </a:blip>
@@ -5970,314 +7938,6 @@
           </p:style>
         </p:cxnSp>
       </p:grpSp>
-      <p:sp>
-        <p:nvSpPr>
-          <p:cNvPr id="2" name="TextBox 1">
-            <a:extLst>
-              <a:ext uri="{FF2B5EF4-FFF2-40B4-BE49-F238E27FC236}">
-                <a16:creationId xmlns:a16="http://schemas.microsoft.com/office/drawing/2014/main" id="{50283D58-1E2A-3563-27FE-6C4DD9860B24}"/>
-              </a:ext>
-            </a:extLst>
-          </p:cNvPr>
-          <p:cNvSpPr txBox="1"/>
-          <p:nvPr/>
-        </p:nvSpPr>
-        <p:spPr>
-          <a:xfrm>
-            <a:off x="126706" y="623546"/>
-            <a:ext cx="5706832" cy="5678478"/>
-          </a:xfrm>
-          <a:prstGeom prst="rect">
-            <a:avLst/>
-          </a:prstGeom>
-          <a:solidFill>
-            <a:schemeClr val="bg1"/>
-          </a:solidFill>
-        </p:spPr>
-        <p:txBody>
-          <a:bodyPr wrap="square" rtlCol="0">
-            <a:spAutoFit/>
-          </a:bodyPr>
-          <a:lstStyle/>
-          <a:p>
-            <a:r>
-              <a:rPr lang="en-US" sz="1100" dirty="0" err="1"/>
-              <a:t>wellness_habit_tracker</a:t>
-            </a:r>
-            <a:r>
-              <a:rPr lang="en-US" sz="1100" dirty="0"/>
-              <a:t>/</a:t>
-            </a:r>
-          </a:p>
-          <a:p>
-            <a:r>
-              <a:rPr lang="en-US" sz="1100" dirty="0"/>
-              <a:t>│── app/</a:t>
-            </a:r>
-          </a:p>
-          <a:p>
-            <a:r>
-              <a:rPr lang="en-US" sz="1100" dirty="0"/>
-              <a:t>│   │── main.py                 # </a:t>
-            </a:r>
-            <a:r>
-              <a:rPr lang="en-US" sz="1100" dirty="0" err="1"/>
-              <a:t>FastAPI</a:t>
-            </a:r>
-            <a:r>
-              <a:rPr lang="en-US" sz="1100" dirty="0"/>
-              <a:t> entry point</a:t>
-            </a:r>
-          </a:p>
-          <a:p>
-            <a:r>
-              <a:rPr lang="en-US" sz="1100" dirty="0"/>
-              <a:t>│   │── config.py               # Settings (env vars, DB URL, JWT secret, etc.)</a:t>
-            </a:r>
-          </a:p>
-          <a:p>
-            <a:r>
-              <a:rPr lang="en-US" sz="1100" dirty="0"/>
-              <a:t>│   │── database.py             # MongoDB connection (Motor client)</a:t>
-            </a:r>
-          </a:p>
-          <a:p>
-            <a:r>
-              <a:rPr lang="en-US" sz="1100" dirty="0"/>
-              <a:t>│   │── celery_worker.py        # Celery app (for reminders/notifications)</a:t>
-            </a:r>
-          </a:p>
-          <a:p>
-            <a:r>
-              <a:rPr lang="en-US" sz="1100" dirty="0"/>
-              <a:t>│   │</a:t>
-            </a:r>
-          </a:p>
-          <a:p>
-            <a:r>
-              <a:rPr lang="en-US" sz="1100" dirty="0"/>
-              <a:t>│   ├── models/                 # </a:t>
-            </a:r>
-            <a:r>
-              <a:rPr lang="en-US" sz="1100" dirty="0" err="1"/>
-              <a:t>Pydantic</a:t>
-            </a:r>
-            <a:r>
-              <a:rPr lang="en-US" sz="1100" dirty="0"/>
-              <a:t> models (schemas)</a:t>
-            </a:r>
-          </a:p>
-          <a:p>
-            <a:r>
-              <a:rPr lang="en-US" sz="1100" dirty="0"/>
-              <a:t>│   │   │── user.py             # User schemas</a:t>
-            </a:r>
-          </a:p>
-          <a:p>
-            <a:r>
-              <a:rPr lang="en-US" sz="1100" dirty="0"/>
-              <a:t>│   │   │── habit.py            # Habit schemas</a:t>
-            </a:r>
-          </a:p>
-          <a:p>
-            <a:r>
-              <a:rPr lang="en-US" sz="1100" dirty="0"/>
-              <a:t>│   │   │── wellness.py         # Wellness log schemas</a:t>
-            </a:r>
-          </a:p>
-          <a:p>
-            <a:r>
-              <a:rPr lang="en-US" sz="1100" dirty="0"/>
-              <a:t>│   │   │── reminder.py         # Reminder schemas</a:t>
-            </a:r>
-          </a:p>
-          <a:p>
-            <a:r>
-              <a:rPr lang="en-US" sz="1100" dirty="0"/>
-              <a:t>│   │</a:t>
-            </a:r>
-          </a:p>
-          <a:p>
-            <a:r>
-              <a:rPr lang="en-US" sz="1100" dirty="0"/>
-              <a:t>│   ├── routes/                 # API endpoints</a:t>
-            </a:r>
-          </a:p>
-          <a:p>
-            <a:r>
-              <a:rPr lang="en-US" sz="1100" dirty="0"/>
-              <a:t>│   │   │── auth.py             # Register, login, logout</a:t>
-            </a:r>
-          </a:p>
-          <a:p>
-            <a:r>
-              <a:rPr lang="en-US" sz="1100" dirty="0"/>
-              <a:t>│   │   │── users.py            # User profile, update profile, change password</a:t>
-            </a:r>
-          </a:p>
-          <a:p>
-            <a:r>
-              <a:rPr lang="en-US" sz="1100" dirty="0"/>
-              <a:t>│   │   │── habits.py           # Habit CRUD + logging</a:t>
-            </a:r>
-          </a:p>
-          <a:p>
-            <a:r>
-              <a:rPr lang="en-US" sz="1100" dirty="0"/>
-              <a:t>│   │   │── wellness.py         # Wellness logging CRUD</a:t>
-            </a:r>
-          </a:p>
-          <a:p>
-            <a:r>
-              <a:rPr lang="en-US" sz="1100" dirty="0"/>
-              <a:t>│   │   │── reminders.py        # Reminder CRUD</a:t>
-            </a:r>
-          </a:p>
-          <a:p>
-            <a:r>
-              <a:rPr lang="en-US" sz="1100" dirty="0"/>
-              <a:t>│   │   │── analytics.py        # Analytics/insights endpoints</a:t>
-            </a:r>
-          </a:p>
-          <a:p>
-            <a:r>
-              <a:rPr lang="en-US" sz="1100" dirty="0"/>
-              <a:t>│   │</a:t>
-            </a:r>
-          </a:p>
-          <a:p>
-            <a:r>
-              <a:rPr lang="en-US" sz="1100" dirty="0"/>
-              <a:t>│   ├── utils/                  # Helper utilities</a:t>
-            </a:r>
-          </a:p>
-          <a:p>
-            <a:r>
-              <a:rPr lang="en-US" sz="1100" dirty="0"/>
-              <a:t>│   │   │── security.py         # JWT utils, password hashing utils</a:t>
-            </a:r>
-          </a:p>
-          <a:p>
-            <a:r>
-              <a:rPr lang="en-US" sz="1100" dirty="0"/>
-              <a:t>│   │   │── scheduler.py        # Celery tasks, background jobs</a:t>
-            </a:r>
-          </a:p>
-          <a:p>
-            <a:r>
-              <a:rPr lang="en-US" sz="1100" dirty="0"/>
-              <a:t>│   │   │── mongo_helper.py           # Logging config</a:t>
-            </a:r>
-          </a:p>
-          <a:p>
-            <a:r>
-              <a:rPr lang="en-US" sz="1100" dirty="0"/>
-              <a:t>│   │</a:t>
-            </a:r>
-          </a:p>
-          <a:p>
-            <a:r>
-              <a:rPr lang="en-US" sz="1100" dirty="0"/>
-              <a:t>│</a:t>
-            </a:r>
-          </a:p>
-          <a:p>
-            <a:r>
-              <a:rPr lang="en-US" sz="1100" dirty="0"/>
-              <a:t>│── requirements.txt            # All dependencies</a:t>
-            </a:r>
-          </a:p>
-          <a:p>
-            <a:r>
-              <a:rPr lang="en-US" sz="1100" dirty="0"/>
-              <a:t>│── .env                        # Environment variables (DB URI, JWT secret, etc.)</a:t>
-            </a:r>
-          </a:p>
-          <a:p>
-            <a:r>
-              <a:rPr lang="en-US" sz="1100" dirty="0"/>
-              <a:t>│── </a:t>
-            </a:r>
-            <a:r>
-              <a:rPr lang="en-US" sz="1100" dirty="0" err="1"/>
-              <a:t>Dockerfile</a:t>
-            </a:r>
-            <a:r>
-              <a:rPr lang="en-US" sz="1100" dirty="0"/>
-              <a:t>                  # For containerization</a:t>
-            </a:r>
-          </a:p>
-          <a:p>
-            <a:r>
-              <a:rPr lang="en-US" sz="1100" dirty="0"/>
-              <a:t>│── docker-</a:t>
-            </a:r>
-            <a:r>
-              <a:rPr lang="en-US" sz="1100" dirty="0" err="1"/>
-              <a:t>compose.yml</a:t>
-            </a:r>
-            <a:r>
-              <a:rPr lang="en-US" sz="1100" dirty="0"/>
-              <a:t>          # (optional) MongoDB + Redis + App setup</a:t>
-            </a:r>
-          </a:p>
-          <a:p>
-            <a:r>
-              <a:rPr lang="en-US" sz="1100" dirty="0"/>
-              <a:t>│── README.md                   # Project documentation</a:t>
-            </a:r>
-          </a:p>
-          <a:p>
-            <a:endParaRPr lang="en-US" sz="1100" dirty="0"/>
-          </a:p>
-        </p:txBody>
-      </p:sp>
-      <p:pic>
-        <p:nvPicPr>
-          <p:cNvPr id="5" name="Picture 4">
-            <a:extLst>
-              <a:ext uri="{FF2B5EF4-FFF2-40B4-BE49-F238E27FC236}">
-                <a16:creationId xmlns:a16="http://schemas.microsoft.com/office/drawing/2014/main" id="{3D6B3D08-F22C-C780-532A-27893456D122}"/>
-              </a:ext>
-              <a:ext uri="{C183D7F6-B498-43B3-948B-1728B52AA6E4}">
-                <adec:decorative xmlns:adec="http://schemas.microsoft.com/office/drawing/2017/decorative" val="1"/>
-              </a:ext>
-            </a:extLst>
-          </p:cNvPr>
-          <p:cNvPicPr>
-            <a:picLocks noChangeAspect="1"/>
-          </p:cNvPicPr>
-          <p:nvPr/>
-        </p:nvPicPr>
-        <p:blipFill>
-          <a:blip r:embed="rId5">
-            <a:extLst>
-              <a:ext uri="{28A0092B-C50C-407E-A947-70E740481C1C}">
-                <a14:useLocalDpi xmlns:a14="http://schemas.microsoft.com/office/drawing/2010/main" val="0"/>
-              </a:ext>
-            </a:extLst>
-          </a:blip>
-          <a:stretch>
-            <a:fillRect/>
-          </a:stretch>
-        </p:blipFill>
-        <p:spPr>
-          <a:xfrm>
-            <a:off x="7231686" y="737037"/>
-            <a:ext cx="4112516" cy="5497417"/>
-          </a:xfrm>
-          <a:prstGeom prst="rect">
-            <a:avLst/>
-          </a:prstGeom>
-          <a:effectLst>
-            <a:outerShdw blurRad="63500" sx="102000" sy="102000" algn="ctr" rotWithShape="0">
-              <a:prstClr val="black">
-                <a:alpha val="40000"/>
-              </a:prstClr>
-            </a:outerShdw>
-          </a:effectLst>
-        </p:spPr>
-      </p:pic>
     </p:spTree>
     <p:extLst>
       <p:ext uri="{BB962C8B-B14F-4D97-AF65-F5344CB8AC3E}">
@@ -6548,7 +8208,12 @@
             <p:ph idx="1"/>
           </p:nvPr>
         </p:nvSpPr>
-        <p:spPr/>
+        <p:spPr>
+          <a:xfrm>
+            <a:off x="838200" y="1825625"/>
+            <a:ext cx="6136755" cy="4351338"/>
+          </a:xfrm>
+        </p:spPr>
         <p:txBody>
           <a:bodyPr/>
           <a:lstStyle/>
@@ -6685,6 +8350,205 @@
           </a:p>
         </p:txBody>
       </p:sp>
+      <p:sp>
+        <p:nvSpPr>
+          <p:cNvPr id="9" name="Rectangle 8">
+            <a:extLst>
+              <a:ext uri="{FF2B5EF4-FFF2-40B4-BE49-F238E27FC236}">
+                <a16:creationId xmlns:a16="http://schemas.microsoft.com/office/drawing/2014/main" id="{629065A2-3C51-AD22-7ACE-B8FDBF549A6F}"/>
+              </a:ext>
+            </a:extLst>
+          </p:cNvPr>
+          <p:cNvSpPr/>
+          <p:nvPr/>
+        </p:nvSpPr>
+        <p:spPr>
+          <a:xfrm>
+            <a:off x="9009029" y="4812267"/>
+            <a:ext cx="1593140" cy="1364696"/>
+          </a:xfrm>
+          <a:prstGeom prst="rect">
+            <a:avLst/>
+          </a:prstGeom>
+          <a:solidFill>
+            <a:schemeClr val="accent4"/>
+          </a:solidFill>
+          <a:ln>
+            <a:solidFill>
+              <a:schemeClr val="accent4"/>
+            </a:solidFill>
+          </a:ln>
+          <a:effectLst>
+            <a:outerShdw blurRad="50800" dist="38100" dir="10800000" algn="r" rotWithShape="0">
+              <a:prstClr val="black">
+                <a:alpha val="40000"/>
+              </a:prstClr>
+            </a:outerShdw>
+          </a:effectLst>
+        </p:spPr>
+        <p:style>
+          <a:lnRef idx="2">
+            <a:schemeClr val="accent1">
+              <a:shade val="15000"/>
+            </a:schemeClr>
+          </a:lnRef>
+          <a:fillRef idx="1">
+            <a:schemeClr val="accent1"/>
+          </a:fillRef>
+          <a:effectRef idx="0">
+            <a:schemeClr val="accent1"/>
+          </a:effectRef>
+          <a:fontRef idx="minor">
+            <a:schemeClr val="lt1"/>
+          </a:fontRef>
+        </p:style>
+        <p:txBody>
+          <a:bodyPr rtlCol="0" anchor="ctr"/>
+          <a:lstStyle/>
+          <a:p>
+            <a:pPr algn="ctr"/>
+            <a:endParaRPr lang="en-US"/>
+          </a:p>
+        </p:txBody>
+      </p:sp>
+      <p:sp>
+        <p:nvSpPr>
+          <p:cNvPr id="11" name="Rectangle 10">
+            <a:extLst>
+              <a:ext uri="{FF2B5EF4-FFF2-40B4-BE49-F238E27FC236}">
+                <a16:creationId xmlns:a16="http://schemas.microsoft.com/office/drawing/2014/main" id="{1811A2C5-C6F3-683E-8CD4-85A866E6CF3B}"/>
+              </a:ext>
+            </a:extLst>
+          </p:cNvPr>
+          <p:cNvSpPr/>
+          <p:nvPr/>
+        </p:nvSpPr>
+        <p:spPr>
+          <a:xfrm>
+            <a:off x="6660325" y="790355"/>
+            <a:ext cx="2663887" cy="2301119"/>
+          </a:xfrm>
+          <a:prstGeom prst="rect">
+            <a:avLst/>
+          </a:prstGeom>
+          <a:solidFill>
+            <a:schemeClr val="accent1">
+              <a:lumMod val="50000"/>
+            </a:schemeClr>
+          </a:solidFill>
+          <a:ln>
+            <a:solidFill>
+              <a:schemeClr val="accent1">
+                <a:lumMod val="75000"/>
+              </a:schemeClr>
+            </a:solidFill>
+          </a:ln>
+          <a:effectLst>
+            <a:outerShdw blurRad="50800" dist="38100" dir="10800000" algn="r" rotWithShape="0">
+              <a:prstClr val="black">
+                <a:alpha val="40000"/>
+              </a:prstClr>
+            </a:outerShdw>
+          </a:effectLst>
+        </p:spPr>
+        <p:style>
+          <a:lnRef idx="2">
+            <a:schemeClr val="accent1">
+              <a:shade val="15000"/>
+            </a:schemeClr>
+          </a:lnRef>
+          <a:fillRef idx="1">
+            <a:schemeClr val="accent1"/>
+          </a:fillRef>
+          <a:effectRef idx="0">
+            <a:schemeClr val="accent1"/>
+          </a:effectRef>
+          <a:fontRef idx="minor">
+            <a:schemeClr val="lt1"/>
+          </a:fontRef>
+        </p:style>
+        <p:txBody>
+          <a:bodyPr rtlCol="0" anchor="ctr"/>
+          <a:lstStyle/>
+          <a:p>
+            <a:pPr algn="ctr"/>
+            <a:endParaRPr lang="en-US" dirty="0"/>
+          </a:p>
+        </p:txBody>
+      </p:sp>
+      <p:sp>
+        <p:nvSpPr>
+          <p:cNvPr id="12" name="TextBox 11">
+            <a:extLst>
+              <a:ext uri="{FF2B5EF4-FFF2-40B4-BE49-F238E27FC236}">
+                <a16:creationId xmlns:a16="http://schemas.microsoft.com/office/drawing/2014/main" id="{597D2288-F56E-B8A8-95B4-C1FD640823CC}"/>
+              </a:ext>
+            </a:extLst>
+          </p:cNvPr>
+          <p:cNvSpPr txBox="1"/>
+          <p:nvPr/>
+        </p:nvSpPr>
+        <p:spPr>
+          <a:xfrm>
+            <a:off x="7396072" y="2200996"/>
+            <a:ext cx="2679080" cy="3157454"/>
+          </a:xfrm>
+          <a:prstGeom prst="rect">
+            <a:avLst/>
+          </a:prstGeom>
+          <a:solidFill>
+            <a:schemeClr val="accent1">
+              <a:lumMod val="40000"/>
+              <a:lumOff val="60000"/>
+            </a:schemeClr>
+          </a:solidFill>
+        </p:spPr>
+        <p:txBody>
+          <a:bodyPr wrap="square" rtlCol="0">
+            <a:spAutoFit/>
+          </a:bodyPr>
+          <a:lstStyle/>
+          <a:p>
+            <a:endParaRPr lang="en-IN" dirty="0"/>
+          </a:p>
+        </p:txBody>
+      </p:sp>
+      <p:pic>
+        <p:nvPicPr>
+          <p:cNvPr id="15" name="Picture 14">
+            <a:extLst>
+              <a:ext uri="{FF2B5EF4-FFF2-40B4-BE49-F238E27FC236}">
+                <a16:creationId xmlns:a16="http://schemas.microsoft.com/office/drawing/2014/main" id="{9FCE269C-D468-E36E-7837-F33A02A39BD9}"/>
+              </a:ext>
+            </a:extLst>
+          </p:cNvPr>
+          <p:cNvPicPr>
+            <a:picLocks noChangeAspect="1"/>
+          </p:cNvPicPr>
+          <p:nvPr/>
+        </p:nvPicPr>
+        <p:blipFill>
+          <a:blip r:embed="rId5">
+            <a:extLst>
+              <a:ext uri="{28A0092B-C50C-407E-A947-70E740481C1C}">
+                <a14:useLocalDpi xmlns:a14="http://schemas.microsoft.com/office/drawing/2010/main" val="0"/>
+              </a:ext>
+            </a:extLst>
+          </a:blip>
+          <a:stretch>
+            <a:fillRect/>
+          </a:stretch>
+        </p:blipFill>
+        <p:spPr>
+          <a:xfrm>
+            <a:off x="7625146" y="2534647"/>
+            <a:ext cx="2374883" cy="2374883"/>
+          </a:xfrm>
+          <a:prstGeom prst="rect">
+            <a:avLst/>
+          </a:prstGeom>
+        </p:spPr>
+      </p:pic>
     </p:spTree>
     <p:extLst>
       <p:ext uri="{BB962C8B-B14F-4D97-AF65-F5344CB8AC3E}">
@@ -6731,7 +8595,12 @@
             <p:ph type="title"/>
           </p:nvPr>
         </p:nvSpPr>
-        <p:spPr/>
+        <p:spPr>
+          <a:xfrm>
+            <a:off x="838200" y="617537"/>
+            <a:ext cx="10515600" cy="1325563"/>
+          </a:xfrm>
+        </p:spPr>
         <p:txBody>
           <a:bodyPr/>
           <a:lstStyle/>
@@ -6767,7 +8636,12 @@
             <p:ph idx="1"/>
           </p:nvPr>
         </p:nvSpPr>
-        <p:spPr/>
+        <p:spPr>
+          <a:xfrm>
+            <a:off x="838200" y="2009396"/>
+            <a:ext cx="6009167" cy="4351338"/>
+          </a:xfrm>
+        </p:spPr>
         <p:txBody>
           <a:bodyPr/>
           <a:lstStyle/>
@@ -6800,7 +8674,15 @@
           <a:p>
             <a:r>
               <a:rPr lang="en-IN" dirty="0"/>
-              <a:t>- Scheduling: Celery + Redis</a:t>
+              <a:t>- Scheduling: Used(</a:t>
+            </a:r>
+            <a:r>
+              <a:rPr lang="en-IN" dirty="0" err="1"/>
+              <a:t>BackgroundTask</a:t>
+            </a:r>
+            <a:r>
+              <a:rPr lang="en-IN" dirty="0"/>
+              <a:t>)/Celery + Redis</a:t>
             </a:r>
           </a:p>
           <a:p>
@@ -7052,6 +8934,205 @@
           </a:p>
         </p:txBody>
       </p:sp>
+      <p:sp>
+        <p:nvSpPr>
+          <p:cNvPr id="10" name="Rectangle 9">
+            <a:extLst>
+              <a:ext uri="{FF2B5EF4-FFF2-40B4-BE49-F238E27FC236}">
+                <a16:creationId xmlns:a16="http://schemas.microsoft.com/office/drawing/2014/main" id="{0AA2AAEF-7AA6-7CEF-0ACA-9D58C9520243}"/>
+              </a:ext>
+            </a:extLst>
+          </p:cNvPr>
+          <p:cNvSpPr/>
+          <p:nvPr/>
+        </p:nvSpPr>
+        <p:spPr>
+          <a:xfrm>
+            <a:off x="8960378" y="4757608"/>
+            <a:ext cx="1593140" cy="1364696"/>
+          </a:xfrm>
+          <a:prstGeom prst="rect">
+            <a:avLst/>
+          </a:prstGeom>
+          <a:solidFill>
+            <a:schemeClr val="accent4"/>
+          </a:solidFill>
+          <a:ln>
+            <a:solidFill>
+              <a:schemeClr val="accent4"/>
+            </a:solidFill>
+          </a:ln>
+          <a:effectLst>
+            <a:outerShdw blurRad="50800" dist="38100" dir="10800000" algn="r" rotWithShape="0">
+              <a:prstClr val="black">
+                <a:alpha val="40000"/>
+              </a:prstClr>
+            </a:outerShdw>
+          </a:effectLst>
+        </p:spPr>
+        <p:style>
+          <a:lnRef idx="2">
+            <a:schemeClr val="accent1">
+              <a:shade val="15000"/>
+            </a:schemeClr>
+          </a:lnRef>
+          <a:fillRef idx="1">
+            <a:schemeClr val="accent1"/>
+          </a:fillRef>
+          <a:effectRef idx="0">
+            <a:schemeClr val="accent1"/>
+          </a:effectRef>
+          <a:fontRef idx="minor">
+            <a:schemeClr val="lt1"/>
+          </a:fontRef>
+        </p:style>
+        <p:txBody>
+          <a:bodyPr rtlCol="0" anchor="ctr"/>
+          <a:lstStyle/>
+          <a:p>
+            <a:pPr algn="ctr"/>
+            <a:endParaRPr lang="en-US"/>
+          </a:p>
+        </p:txBody>
+      </p:sp>
+      <p:sp>
+        <p:nvSpPr>
+          <p:cNvPr id="11" name="Rectangle 10">
+            <a:extLst>
+              <a:ext uri="{FF2B5EF4-FFF2-40B4-BE49-F238E27FC236}">
+                <a16:creationId xmlns:a16="http://schemas.microsoft.com/office/drawing/2014/main" id="{8EC889B2-3255-AEEF-0FD7-66FA17478152}"/>
+              </a:ext>
+            </a:extLst>
+          </p:cNvPr>
+          <p:cNvSpPr/>
+          <p:nvPr/>
+        </p:nvSpPr>
+        <p:spPr>
+          <a:xfrm>
+            <a:off x="6611674" y="735696"/>
+            <a:ext cx="2663887" cy="2301119"/>
+          </a:xfrm>
+          <a:prstGeom prst="rect">
+            <a:avLst/>
+          </a:prstGeom>
+          <a:solidFill>
+            <a:schemeClr val="accent1">
+              <a:lumMod val="50000"/>
+            </a:schemeClr>
+          </a:solidFill>
+          <a:ln>
+            <a:solidFill>
+              <a:schemeClr val="accent1">
+                <a:lumMod val="75000"/>
+              </a:schemeClr>
+            </a:solidFill>
+          </a:ln>
+          <a:effectLst>
+            <a:outerShdw blurRad="50800" dist="38100" dir="10800000" algn="r" rotWithShape="0">
+              <a:prstClr val="black">
+                <a:alpha val="40000"/>
+              </a:prstClr>
+            </a:outerShdw>
+          </a:effectLst>
+        </p:spPr>
+        <p:style>
+          <a:lnRef idx="2">
+            <a:schemeClr val="accent1">
+              <a:shade val="15000"/>
+            </a:schemeClr>
+          </a:lnRef>
+          <a:fillRef idx="1">
+            <a:schemeClr val="accent1"/>
+          </a:fillRef>
+          <a:effectRef idx="0">
+            <a:schemeClr val="accent1"/>
+          </a:effectRef>
+          <a:fontRef idx="minor">
+            <a:schemeClr val="lt1"/>
+          </a:fontRef>
+        </p:style>
+        <p:txBody>
+          <a:bodyPr rtlCol="0" anchor="ctr"/>
+          <a:lstStyle/>
+          <a:p>
+            <a:pPr algn="ctr"/>
+            <a:endParaRPr lang="en-US" dirty="0"/>
+          </a:p>
+        </p:txBody>
+      </p:sp>
+      <p:sp>
+        <p:nvSpPr>
+          <p:cNvPr id="12" name="TextBox 11">
+            <a:extLst>
+              <a:ext uri="{FF2B5EF4-FFF2-40B4-BE49-F238E27FC236}">
+                <a16:creationId xmlns:a16="http://schemas.microsoft.com/office/drawing/2014/main" id="{81539FD1-1433-921B-75F9-C609708ED97A}"/>
+              </a:ext>
+            </a:extLst>
+          </p:cNvPr>
+          <p:cNvSpPr txBox="1"/>
+          <p:nvPr/>
+        </p:nvSpPr>
+        <p:spPr>
+          <a:xfrm>
+            <a:off x="7138098" y="1625010"/>
+            <a:ext cx="3072486" cy="3938310"/>
+          </a:xfrm>
+          <a:prstGeom prst="rect">
+            <a:avLst/>
+          </a:prstGeom>
+          <a:solidFill>
+            <a:schemeClr val="accent1">
+              <a:lumMod val="40000"/>
+              <a:lumOff val="60000"/>
+            </a:schemeClr>
+          </a:solidFill>
+        </p:spPr>
+        <p:txBody>
+          <a:bodyPr wrap="square" rtlCol="0">
+            <a:spAutoFit/>
+          </a:bodyPr>
+          <a:lstStyle/>
+          <a:p>
+            <a:endParaRPr lang="en-IN" dirty="0"/>
+          </a:p>
+        </p:txBody>
+      </p:sp>
+      <p:pic>
+        <p:nvPicPr>
+          <p:cNvPr id="17" name="Picture 16">
+            <a:extLst>
+              <a:ext uri="{FF2B5EF4-FFF2-40B4-BE49-F238E27FC236}">
+                <a16:creationId xmlns:a16="http://schemas.microsoft.com/office/drawing/2014/main" id="{2FAB3499-7649-0C81-8D1E-D7EEB2C787EC}"/>
+              </a:ext>
+            </a:extLst>
+          </p:cNvPr>
+          <p:cNvPicPr>
+            <a:picLocks noChangeAspect="1"/>
+          </p:cNvPicPr>
+          <p:nvPr/>
+        </p:nvPicPr>
+        <p:blipFill>
+          <a:blip r:embed="rId4">
+            <a:extLst>
+              <a:ext uri="{28A0092B-C50C-407E-A947-70E740481C1C}">
+                <a14:useLocalDpi xmlns:a14="http://schemas.microsoft.com/office/drawing/2010/main" val="0"/>
+              </a:ext>
+            </a:extLst>
+          </a:blip>
+          <a:stretch>
+            <a:fillRect/>
+          </a:stretch>
+        </p:blipFill>
+        <p:spPr>
+          <a:xfrm>
+            <a:off x="7481286" y="2401110"/>
+            <a:ext cx="2386109" cy="2386109"/>
+          </a:xfrm>
+          <a:prstGeom prst="rect">
+            <a:avLst/>
+          </a:prstGeom>
+        </p:spPr>
+      </p:pic>
     </p:spTree>
     <p:extLst>
       <p:ext uri="{BB962C8B-B14F-4D97-AF65-F5344CB8AC3E}">
@@ -7098,7 +9179,12 @@
             <p:ph type="title"/>
           </p:nvPr>
         </p:nvSpPr>
-        <p:spPr/>
+        <p:spPr>
+          <a:xfrm>
+            <a:off x="838200" y="1283312"/>
+            <a:ext cx="10515600" cy="1325563"/>
+          </a:xfrm>
+        </p:spPr>
         <p:txBody>
           <a:bodyPr/>
           <a:lstStyle/>
@@ -7130,7 +9216,12 @@
             <p:ph idx="1"/>
           </p:nvPr>
         </p:nvSpPr>
-        <p:spPr/>
+        <p:spPr>
+          <a:xfrm>
+            <a:off x="838200" y="2653366"/>
+            <a:ext cx="10515600" cy="4351338"/>
+          </a:xfrm>
+        </p:spPr>
         <p:txBody>
           <a:bodyPr/>
           <a:lstStyle/>
@@ -7407,6 +9498,205 @@
           </a:p>
         </p:txBody>
       </p:sp>
+      <p:sp>
+        <p:nvSpPr>
+          <p:cNvPr id="10" name="Rectangle 9">
+            <a:extLst>
+              <a:ext uri="{FF2B5EF4-FFF2-40B4-BE49-F238E27FC236}">
+                <a16:creationId xmlns:a16="http://schemas.microsoft.com/office/drawing/2014/main" id="{CCEED477-AE2D-2C12-73A1-53A0CCB2D746}"/>
+              </a:ext>
+            </a:extLst>
+          </p:cNvPr>
+          <p:cNvSpPr/>
+          <p:nvPr/>
+        </p:nvSpPr>
+        <p:spPr>
+          <a:xfrm>
+            <a:off x="8551772" y="4706443"/>
+            <a:ext cx="1593140" cy="1364696"/>
+          </a:xfrm>
+          <a:prstGeom prst="rect">
+            <a:avLst/>
+          </a:prstGeom>
+          <a:solidFill>
+            <a:schemeClr val="accent4"/>
+          </a:solidFill>
+          <a:ln>
+            <a:solidFill>
+              <a:schemeClr val="accent4"/>
+            </a:solidFill>
+          </a:ln>
+          <a:effectLst>
+            <a:outerShdw blurRad="50800" dist="38100" dir="10800000" algn="r" rotWithShape="0">
+              <a:prstClr val="black">
+                <a:alpha val="40000"/>
+              </a:prstClr>
+            </a:outerShdw>
+          </a:effectLst>
+        </p:spPr>
+        <p:style>
+          <a:lnRef idx="2">
+            <a:schemeClr val="accent1">
+              <a:shade val="15000"/>
+            </a:schemeClr>
+          </a:lnRef>
+          <a:fillRef idx="1">
+            <a:schemeClr val="accent1"/>
+          </a:fillRef>
+          <a:effectRef idx="0">
+            <a:schemeClr val="accent1"/>
+          </a:effectRef>
+          <a:fontRef idx="minor">
+            <a:schemeClr val="lt1"/>
+          </a:fontRef>
+        </p:style>
+        <p:txBody>
+          <a:bodyPr rtlCol="0" anchor="ctr"/>
+          <a:lstStyle/>
+          <a:p>
+            <a:pPr algn="ctr"/>
+            <a:endParaRPr lang="en-US"/>
+          </a:p>
+        </p:txBody>
+      </p:sp>
+      <p:sp>
+        <p:nvSpPr>
+          <p:cNvPr id="11" name="Rectangle 10">
+            <a:extLst>
+              <a:ext uri="{FF2B5EF4-FFF2-40B4-BE49-F238E27FC236}">
+                <a16:creationId xmlns:a16="http://schemas.microsoft.com/office/drawing/2014/main" id="{F4DC4D48-E8F0-8F1F-2419-CF4E53D3C37C}"/>
+              </a:ext>
+            </a:extLst>
+          </p:cNvPr>
+          <p:cNvSpPr/>
+          <p:nvPr/>
+        </p:nvSpPr>
+        <p:spPr>
+          <a:xfrm>
+            <a:off x="6203068" y="684531"/>
+            <a:ext cx="2663887" cy="2301119"/>
+          </a:xfrm>
+          <a:prstGeom prst="rect">
+            <a:avLst/>
+          </a:prstGeom>
+          <a:solidFill>
+            <a:schemeClr val="accent1">
+              <a:lumMod val="50000"/>
+            </a:schemeClr>
+          </a:solidFill>
+          <a:ln>
+            <a:solidFill>
+              <a:schemeClr val="accent1">
+                <a:lumMod val="75000"/>
+              </a:schemeClr>
+            </a:solidFill>
+          </a:ln>
+          <a:effectLst>
+            <a:outerShdw blurRad="50800" dist="38100" dir="10800000" algn="r" rotWithShape="0">
+              <a:prstClr val="black">
+                <a:alpha val="40000"/>
+              </a:prstClr>
+            </a:outerShdw>
+          </a:effectLst>
+        </p:spPr>
+        <p:style>
+          <a:lnRef idx="2">
+            <a:schemeClr val="accent1">
+              <a:shade val="15000"/>
+            </a:schemeClr>
+          </a:lnRef>
+          <a:fillRef idx="1">
+            <a:schemeClr val="accent1"/>
+          </a:fillRef>
+          <a:effectRef idx="0">
+            <a:schemeClr val="accent1"/>
+          </a:effectRef>
+          <a:fontRef idx="minor">
+            <a:schemeClr val="lt1"/>
+          </a:fontRef>
+        </p:style>
+        <p:txBody>
+          <a:bodyPr rtlCol="0" anchor="ctr"/>
+          <a:lstStyle/>
+          <a:p>
+            <a:pPr algn="ctr"/>
+            <a:endParaRPr lang="en-US" dirty="0"/>
+          </a:p>
+        </p:txBody>
+      </p:sp>
+      <p:sp>
+        <p:nvSpPr>
+          <p:cNvPr id="12" name="TextBox 11">
+            <a:extLst>
+              <a:ext uri="{FF2B5EF4-FFF2-40B4-BE49-F238E27FC236}">
+                <a16:creationId xmlns:a16="http://schemas.microsoft.com/office/drawing/2014/main" id="{FBF3082F-3836-4B47-ADB4-4C5431CBFD36}"/>
+              </a:ext>
+            </a:extLst>
+          </p:cNvPr>
+          <p:cNvSpPr txBox="1"/>
+          <p:nvPr/>
+        </p:nvSpPr>
+        <p:spPr>
+          <a:xfrm>
+            <a:off x="6729492" y="1573845"/>
+            <a:ext cx="3072486" cy="3938310"/>
+          </a:xfrm>
+          <a:prstGeom prst="rect">
+            <a:avLst/>
+          </a:prstGeom>
+          <a:solidFill>
+            <a:schemeClr val="accent1">
+              <a:lumMod val="40000"/>
+              <a:lumOff val="60000"/>
+            </a:schemeClr>
+          </a:solidFill>
+        </p:spPr>
+        <p:txBody>
+          <a:bodyPr wrap="square" rtlCol="0">
+            <a:spAutoFit/>
+          </a:bodyPr>
+          <a:lstStyle/>
+          <a:p>
+            <a:endParaRPr lang="en-IN" dirty="0"/>
+          </a:p>
+        </p:txBody>
+      </p:sp>
+      <p:pic>
+        <p:nvPicPr>
+          <p:cNvPr id="15" name="Picture 14">
+            <a:extLst>
+              <a:ext uri="{FF2B5EF4-FFF2-40B4-BE49-F238E27FC236}">
+                <a16:creationId xmlns:a16="http://schemas.microsoft.com/office/drawing/2014/main" id="{BF3BD08F-F515-6D3C-A46A-2B2243C5C108}"/>
+              </a:ext>
+            </a:extLst>
+          </p:cNvPr>
+          <p:cNvPicPr>
+            <a:picLocks noChangeAspect="1"/>
+          </p:cNvPicPr>
+          <p:nvPr/>
+        </p:nvPicPr>
+        <p:blipFill>
+          <a:blip r:embed="rId4">
+            <a:extLst>
+              <a:ext uri="{28A0092B-C50C-407E-A947-70E740481C1C}">
+                <a14:useLocalDpi xmlns:a14="http://schemas.microsoft.com/office/drawing/2010/main" val="0"/>
+              </a:ext>
+            </a:extLst>
+          </a:blip>
+          <a:stretch>
+            <a:fillRect/>
+          </a:stretch>
+        </p:blipFill>
+        <p:spPr>
+          <a:xfrm>
+            <a:off x="7041077" y="2318342"/>
+            <a:ext cx="2449315" cy="2449315"/>
+          </a:xfrm>
+          <a:prstGeom prst="rect">
+            <a:avLst/>
+          </a:prstGeom>
+        </p:spPr>
+      </p:pic>
     </p:spTree>
     <p:extLst>
       <p:ext uri="{BB962C8B-B14F-4D97-AF65-F5344CB8AC3E}">
@@ -7453,13 +9743,20 @@
             <p:ph type="title"/>
           </p:nvPr>
         </p:nvSpPr>
-        <p:spPr/>
-        <p:txBody>
-          <a:bodyPr/>
-          <a:lstStyle/>
-          <a:p>
-            <a:r>
-              <a:rPr lang="en-IN" b="1" dirty="0">
+        <p:spPr>
+          <a:xfrm>
+            <a:off x="920048" y="2766218"/>
+            <a:ext cx="5406322" cy="1325563"/>
+          </a:xfrm>
+        </p:spPr>
+        <p:txBody>
+          <a:bodyPr>
+            <a:noAutofit/>
+          </a:bodyPr>
+          <a:lstStyle/>
+          <a:p>
+            <a:r>
+              <a:rPr lang="en-IN" sz="5400" b="1" dirty="0">
                 <a:solidFill>
                   <a:srgbClr val="1B134C"/>
                 </a:solidFill>
@@ -7491,8 +9788,8 @@
         </p:blipFill>
         <p:spPr>
           <a:xfrm>
-            <a:off x="3694751" y="1578934"/>
-            <a:ext cx="4802498" cy="4525963"/>
+            <a:off x="4763977" y="694908"/>
+            <a:ext cx="5802286" cy="5468182"/>
           </a:xfrm>
           <a:prstGeom prst="rect">
             <a:avLst/>
@@ -7783,13 +10080,20 @@
             <p:ph type="title"/>
           </p:nvPr>
         </p:nvSpPr>
-        <p:spPr/>
-        <p:txBody>
-          <a:bodyPr/>
-          <a:lstStyle/>
-          <a:p>
-            <a:r>
-              <a:rPr lang="en-IN" b="1" dirty="0">
+        <p:spPr>
+          <a:xfrm>
+            <a:off x="983642" y="2766218"/>
+            <a:ext cx="3003569" cy="1325563"/>
+          </a:xfrm>
+        </p:spPr>
+        <p:txBody>
+          <a:bodyPr>
+            <a:noAutofit/>
+          </a:bodyPr>
+          <a:lstStyle/>
+          <a:p>
+            <a:r>
+              <a:rPr lang="en-IN" sz="5400" b="1" dirty="0">
                 <a:solidFill>
                   <a:srgbClr val="1B134C"/>
                 </a:solidFill>
@@ -7823,8 +10127,8 @@
         </p:blipFill>
         <p:spPr>
           <a:xfrm>
-            <a:off x="4137536" y="1825625"/>
-            <a:ext cx="3916928" cy="4351338"/>
+            <a:off x="4364796" y="290465"/>
+            <a:ext cx="5650405" cy="6277068"/>
           </a:xfrm>
         </p:spPr>
       </p:pic>
@@ -8112,13 +10416,20 @@
             <p:ph type="title"/>
           </p:nvPr>
         </p:nvSpPr>
-        <p:spPr/>
-        <p:txBody>
-          <a:bodyPr/>
-          <a:lstStyle/>
-          <a:p>
-            <a:r>
-              <a:rPr lang="en-IN" b="1" dirty="0">
+        <p:spPr>
+          <a:xfrm>
+            <a:off x="2029047" y="2649260"/>
+            <a:ext cx="2936358" cy="1325563"/>
+          </a:xfrm>
+        </p:spPr>
+        <p:txBody>
+          <a:bodyPr>
+            <a:normAutofit/>
+          </a:bodyPr>
+          <a:lstStyle/>
+          <a:p>
+            <a:r>
+              <a:rPr lang="en-IN" sz="5400" b="1" dirty="0">
                 <a:solidFill>
                   <a:srgbClr val="1B134C"/>
                 </a:solidFill>
@@ -8150,8 +10461,8 @@
         </p:blipFill>
         <p:spPr>
           <a:xfrm>
-            <a:off x="4863803" y="1499189"/>
-            <a:ext cx="2464394" cy="5263291"/>
+            <a:off x="5865536" y="106325"/>
+            <a:ext cx="3242918" cy="6645349"/>
           </a:xfrm>
           <a:prstGeom prst="rect">
             <a:avLst/>

</xml_diff>

<commit_message>
Modified requirement.txt file and made PPT and report, made changes to comments
</commit_message>
<xml_diff>
--- a/ZennialPro_Project_PPT.pptx
+++ b/ZennialPro_Project_PPT.pptx
@@ -10,8 +10,8 @@
   <p:sldIdLst>
     <p:sldId id="256" r:id="rId2"/>
     <p:sldId id="257" r:id="rId3"/>
-    <p:sldId id="260" r:id="rId4"/>
-    <p:sldId id="259" r:id="rId5"/>
+    <p:sldId id="259" r:id="rId4"/>
+    <p:sldId id="260" r:id="rId5"/>
     <p:sldId id="266" r:id="rId6"/>
     <p:sldId id="262" r:id="rId7"/>
     <p:sldId id="263" r:id="rId8"/>
@@ -223,7 +223,7 @@
           <a:p>
             <a:fld id="{BD8DE5F0-F600-46C3-AE4D-5148C69FFBAD}" type="datetimeFigureOut">
               <a:rPr lang="en-US" smtClean="0"/>
-              <a:t>9/9/2025</a:t>
+              <a:t>9/18/2025</a:t>
             </a:fld>
             <a:endParaRPr lang="en-US"/>
           </a:p>
@@ -564,7 +564,7 @@
     </p:spTree>
     <p:extLst>
       <p:ext uri="{BB962C8B-B14F-4D97-AF65-F5344CB8AC3E}">
-        <p14:creationId xmlns:p14="http://schemas.microsoft.com/office/powerpoint/2010/main" val="1620486215"/>
+        <p14:creationId xmlns:p14="http://schemas.microsoft.com/office/powerpoint/2010/main" val="2217890524"/>
       </p:ext>
     </p:extLst>
   </p:cSld>
@@ -648,7 +648,7 @@
     </p:spTree>
     <p:extLst>
       <p:ext uri="{BB962C8B-B14F-4D97-AF65-F5344CB8AC3E}">
-        <p14:creationId xmlns:p14="http://schemas.microsoft.com/office/powerpoint/2010/main" val="2217890524"/>
+        <p14:creationId xmlns:p14="http://schemas.microsoft.com/office/powerpoint/2010/main" val="1620486215"/>
       </p:ext>
     </p:extLst>
   </p:cSld>
@@ -805,7 +805,7 @@
           <a:p>
             <a:fld id="{8CFBE4D0-E68C-4FB2-8B3A-AA41DAF039F9}" type="datetimeFigureOut">
               <a:rPr lang="en-US" smtClean="0"/>
-              <a:t>9/9/2025</a:t>
+              <a:t>9/18/2025</a:t>
             </a:fld>
             <a:endParaRPr lang="en-US"/>
           </a:p>
@@ -1003,7 +1003,7 @@
           <a:p>
             <a:fld id="{8CFBE4D0-E68C-4FB2-8B3A-AA41DAF039F9}" type="datetimeFigureOut">
               <a:rPr lang="en-US" smtClean="0"/>
-              <a:t>9/9/2025</a:t>
+              <a:t>9/18/2025</a:t>
             </a:fld>
             <a:endParaRPr lang="en-US"/>
           </a:p>
@@ -1211,7 +1211,7 @@
           <a:p>
             <a:fld id="{8CFBE4D0-E68C-4FB2-8B3A-AA41DAF039F9}" type="datetimeFigureOut">
               <a:rPr lang="en-US" smtClean="0"/>
-              <a:t>9/9/2025</a:t>
+              <a:t>9/18/2025</a:t>
             </a:fld>
             <a:endParaRPr lang="en-US"/>
           </a:p>
@@ -1409,7 +1409,7 @@
           <a:p>
             <a:fld id="{8CFBE4D0-E68C-4FB2-8B3A-AA41DAF039F9}" type="datetimeFigureOut">
               <a:rPr lang="en-US" smtClean="0"/>
-              <a:t>9/9/2025</a:t>
+              <a:t>9/18/2025</a:t>
             </a:fld>
             <a:endParaRPr lang="en-US"/>
           </a:p>
@@ -1684,7 +1684,7 @@
           <a:p>
             <a:fld id="{8CFBE4D0-E68C-4FB2-8B3A-AA41DAF039F9}" type="datetimeFigureOut">
               <a:rPr lang="en-US" smtClean="0"/>
-              <a:t>9/9/2025</a:t>
+              <a:t>9/18/2025</a:t>
             </a:fld>
             <a:endParaRPr lang="en-US"/>
           </a:p>
@@ -1949,7 +1949,7 @@
           <a:p>
             <a:fld id="{8CFBE4D0-E68C-4FB2-8B3A-AA41DAF039F9}" type="datetimeFigureOut">
               <a:rPr lang="en-US" smtClean="0"/>
-              <a:t>9/9/2025</a:t>
+              <a:t>9/18/2025</a:t>
             </a:fld>
             <a:endParaRPr lang="en-US"/>
           </a:p>
@@ -2361,7 +2361,7 @@
           <a:p>
             <a:fld id="{8CFBE4D0-E68C-4FB2-8B3A-AA41DAF039F9}" type="datetimeFigureOut">
               <a:rPr lang="en-US" smtClean="0"/>
-              <a:t>9/9/2025</a:t>
+              <a:t>9/18/2025</a:t>
             </a:fld>
             <a:endParaRPr lang="en-US"/>
           </a:p>
@@ -2502,7 +2502,7 @@
           <a:p>
             <a:fld id="{8CFBE4D0-E68C-4FB2-8B3A-AA41DAF039F9}" type="datetimeFigureOut">
               <a:rPr lang="en-US" smtClean="0"/>
-              <a:t>9/9/2025</a:t>
+              <a:t>9/18/2025</a:t>
             </a:fld>
             <a:endParaRPr lang="en-US"/>
           </a:p>
@@ -2615,7 +2615,7 @@
           <a:p>
             <a:fld id="{8CFBE4D0-E68C-4FB2-8B3A-AA41DAF039F9}" type="datetimeFigureOut">
               <a:rPr lang="en-US" smtClean="0"/>
-              <a:t>9/9/2025</a:t>
+              <a:t>9/18/2025</a:t>
             </a:fld>
             <a:endParaRPr lang="en-US"/>
           </a:p>
@@ -2926,7 +2926,7 @@
           <a:p>
             <a:fld id="{8CFBE4D0-E68C-4FB2-8B3A-AA41DAF039F9}" type="datetimeFigureOut">
               <a:rPr lang="en-US" smtClean="0"/>
-              <a:t>9/9/2025</a:t>
+              <a:t>9/18/2025</a:t>
             </a:fld>
             <a:endParaRPr lang="en-US"/>
           </a:p>
@@ -3214,7 +3214,7 @@
           <a:p>
             <a:fld id="{8CFBE4D0-E68C-4FB2-8B3A-AA41DAF039F9}" type="datetimeFigureOut">
               <a:rPr lang="en-US" smtClean="0"/>
-              <a:t>9/9/2025</a:t>
+              <a:t>9/18/2025</a:t>
             </a:fld>
             <a:endParaRPr lang="en-US"/>
           </a:p>
@@ -3455,7 +3455,7 @@
           <a:p>
             <a:fld id="{8CFBE4D0-E68C-4FB2-8B3A-AA41DAF039F9}" type="datetimeFigureOut">
               <a:rPr lang="en-US" smtClean="0"/>
-              <a:t>9/9/2025</a:t>
+              <a:t>9/18/2025</a:t>
             </a:fld>
             <a:endParaRPr lang="en-US"/>
           </a:p>
@@ -3978,64 +3978,6 @@
       </p:sp>
       <p:sp>
         <p:nvSpPr>
-          <p:cNvPr id="16" name="TextBox 15">
-            <a:extLst>
-              <a:ext uri="{FF2B5EF4-FFF2-40B4-BE49-F238E27FC236}">
-                <a16:creationId xmlns:a16="http://schemas.microsoft.com/office/drawing/2014/main" id="{1A1895CA-783E-4D67-0B80-4F581E510DFC}"/>
-              </a:ext>
-            </a:extLst>
-          </p:cNvPr>
-          <p:cNvSpPr txBox="1"/>
-          <p:nvPr/>
-        </p:nvSpPr>
-        <p:spPr>
-          <a:xfrm>
-            <a:off x="3930059" y="3009924"/>
-            <a:ext cx="4698797" cy="1450654"/>
-          </a:xfrm>
-          <a:prstGeom prst="rect">
-            <a:avLst/>
-          </a:prstGeom>
-          <a:noFill/>
-        </p:spPr>
-        <p:txBody>
-          <a:bodyPr wrap="square" lIns="91440" tIns="45720" rIns="91440" bIns="45720" rtlCol="0" anchor="t">
-            <a:spAutoFit/>
-          </a:bodyPr>
-          <a:lstStyle/>
-          <a:p>
-            <a:pPr algn="ctr"/>
-            <a:r>
-              <a:rPr lang="en-US" sz="3200" spc="-300" dirty="0">
-                <a:solidFill>
-                  <a:srgbClr val="898989"/>
-                </a:solidFill>
-                <a:latin typeface="Calibri"/>
-                <a:ea typeface="Calibri"/>
-                <a:cs typeface="Calibri"/>
-              </a:rPr>
-              <a:t>FastAPI + MongoDB Based Wellness and habit tracking system</a:t>
-            </a:r>
-            <a:endParaRPr lang="en-US" dirty="0"/>
-          </a:p>
-          <a:p>
-            <a:pPr>
-              <a:lnSpc>
-                <a:spcPct val="70000"/>
-              </a:lnSpc>
-            </a:pPr>
-            <a:endParaRPr lang="en-US" sz="3200" spc="-300" dirty="0">
-              <a:solidFill>
-                <a:srgbClr val="23AAAD"/>
-              </a:solidFill>
-              <a:latin typeface="Poppins" panose="00000500000000000000" pitchFamily="2" charset="0"/>
-              <a:cs typeface="Poppins" panose="00000500000000000000" pitchFamily="2" charset="0"/>
-            </a:endParaRPr>
-          </a:p>
-        </p:txBody>
-      </p:sp>
-      <p:sp>
-        <p:nvSpPr>
           <p:cNvPr id="17" name="Flowchart: Connector 16">
             <a:extLst>
               <a:ext uri="{FF2B5EF4-FFF2-40B4-BE49-F238E27FC236}">
@@ -4240,8 +4182,8 @@
         </p:nvSpPr>
         <p:spPr>
           <a:xfrm>
-            <a:off x="2519917" y="1891678"/>
-            <a:ext cx="7878725" cy="923330"/>
+            <a:off x="6593484" y="2183287"/>
+            <a:ext cx="5220586" cy="1754326"/>
           </a:xfrm>
           <a:prstGeom prst="rect">
             <a:avLst/>
@@ -4254,6 +4196,7 @@
           </a:bodyPr>
           <a:lstStyle/>
           <a:p>
+            <a:pPr algn="ctr"/>
             <a:r>
               <a:rPr lang="en-US" sz="5400" b="1" dirty="0">
                 <a:solidFill>
@@ -4264,6 +4207,546 @@
               </a:rPr>
               <a:t>Wellness and Habit Tracker</a:t>
             </a:r>
+          </a:p>
+        </p:txBody>
+      </p:sp>
+      <p:grpSp>
+        <p:nvGrpSpPr>
+          <p:cNvPr id="2" name="Group 1">
+            <a:extLst>
+              <a:ext uri="{FF2B5EF4-FFF2-40B4-BE49-F238E27FC236}">
+                <a16:creationId xmlns:a16="http://schemas.microsoft.com/office/drawing/2014/main" id="{2E0B9D15-33D0-DD82-F9B9-A62E397585AB}"/>
+              </a:ext>
+            </a:extLst>
+          </p:cNvPr>
+          <p:cNvGrpSpPr/>
+          <p:nvPr/>
+        </p:nvGrpSpPr>
+        <p:grpSpPr>
+          <a:xfrm rot="9900000">
+            <a:off x="2760201" y="688903"/>
+            <a:ext cx="2299791" cy="5480193"/>
+            <a:chOff x="3753542" y="990487"/>
+            <a:chExt cx="2046332" cy="4876222"/>
+          </a:xfrm>
+        </p:grpSpPr>
+        <p:sp>
+          <p:nvSpPr>
+            <p:cNvPr id="4" name="Oval 11">
+              <a:extLst>
+                <a:ext uri="{FF2B5EF4-FFF2-40B4-BE49-F238E27FC236}">
+                  <a16:creationId xmlns:a16="http://schemas.microsoft.com/office/drawing/2014/main" id="{EE8F1EA6-1449-2D14-64DF-6AE6F61827F1}"/>
+                </a:ext>
+              </a:extLst>
+            </p:cNvPr>
+            <p:cNvSpPr/>
+            <p:nvPr/>
+          </p:nvSpPr>
+          <p:spPr>
+            <a:xfrm rot="2843287">
+              <a:off x="3753542" y="3846218"/>
+              <a:ext cx="2020491" cy="2020491"/>
+            </a:xfrm>
+            <a:custGeom>
+              <a:avLst/>
+              <a:gdLst>
+                <a:gd name="connsiteX0" fmla="*/ 0 w 4040981"/>
+                <a:gd name="connsiteY0" fmla="*/ 2020491 h 4040981"/>
+                <a:gd name="connsiteX1" fmla="*/ 2020491 w 4040981"/>
+                <a:gd name="connsiteY1" fmla="*/ 0 h 4040981"/>
+                <a:gd name="connsiteX2" fmla="*/ 4040982 w 4040981"/>
+                <a:gd name="connsiteY2" fmla="*/ 2020491 h 4040981"/>
+                <a:gd name="connsiteX3" fmla="*/ 2020491 w 4040981"/>
+                <a:gd name="connsiteY3" fmla="*/ 4040982 h 4040981"/>
+                <a:gd name="connsiteX4" fmla="*/ 0 w 4040981"/>
+                <a:gd name="connsiteY4" fmla="*/ 2020491 h 4040981"/>
+                <a:gd name="connsiteX0" fmla="*/ 2020491 w 4040982"/>
+                <a:gd name="connsiteY0" fmla="*/ 0 h 4040982"/>
+                <a:gd name="connsiteX1" fmla="*/ 4040982 w 4040982"/>
+                <a:gd name="connsiteY1" fmla="*/ 2020491 h 4040982"/>
+                <a:gd name="connsiteX2" fmla="*/ 2020491 w 4040982"/>
+                <a:gd name="connsiteY2" fmla="*/ 4040982 h 4040982"/>
+                <a:gd name="connsiteX3" fmla="*/ 0 w 4040982"/>
+                <a:gd name="connsiteY3" fmla="*/ 2020491 h 4040982"/>
+                <a:gd name="connsiteX4" fmla="*/ 2111931 w 4040982"/>
+                <a:gd name="connsiteY4" fmla="*/ 91440 h 4040982"/>
+                <a:gd name="connsiteX0" fmla="*/ 2020491 w 4040982"/>
+                <a:gd name="connsiteY0" fmla="*/ 0 h 4040982"/>
+                <a:gd name="connsiteX1" fmla="*/ 4040982 w 4040982"/>
+                <a:gd name="connsiteY1" fmla="*/ 2020491 h 4040982"/>
+                <a:gd name="connsiteX2" fmla="*/ 2020491 w 4040982"/>
+                <a:gd name="connsiteY2" fmla="*/ 4040982 h 4040982"/>
+                <a:gd name="connsiteX3" fmla="*/ 0 w 4040982"/>
+                <a:gd name="connsiteY3" fmla="*/ 2020491 h 4040982"/>
+                <a:gd name="connsiteX0" fmla="*/ 4040982 w 4040982"/>
+                <a:gd name="connsiteY0" fmla="*/ 0 h 2020491"/>
+                <a:gd name="connsiteX1" fmla="*/ 2020491 w 4040982"/>
+                <a:gd name="connsiteY1" fmla="*/ 2020491 h 2020491"/>
+                <a:gd name="connsiteX2" fmla="*/ 0 w 4040982"/>
+                <a:gd name="connsiteY2" fmla="*/ 0 h 2020491"/>
+                <a:gd name="connsiteX0" fmla="*/ 2020491 w 2020491"/>
+                <a:gd name="connsiteY0" fmla="*/ 0 h 2020491"/>
+                <a:gd name="connsiteX1" fmla="*/ 0 w 2020491"/>
+                <a:gd name="connsiteY1" fmla="*/ 2020491 h 2020491"/>
+              </a:gdLst>
+              <a:ahLst/>
+              <a:cxnLst>
+                <a:cxn ang="0">
+                  <a:pos x="connsiteX0" y="connsiteY0"/>
+                </a:cxn>
+                <a:cxn ang="0">
+                  <a:pos x="connsiteX1" y="connsiteY1"/>
+                </a:cxn>
+              </a:cxnLst>
+              <a:rect l="l" t="t" r="r" b="b"/>
+              <a:pathLst>
+                <a:path w="2020491" h="2020491">
+                  <a:moveTo>
+                    <a:pt x="2020491" y="0"/>
+                  </a:moveTo>
+                  <a:cubicBezTo>
+                    <a:pt x="2020491" y="1115886"/>
+                    <a:pt x="1115886" y="2020491"/>
+                    <a:pt x="0" y="2020491"/>
+                  </a:cubicBezTo>
+                </a:path>
+              </a:pathLst>
+            </a:custGeom>
+            <a:noFill/>
+            <a:ln w="403225" cap="rnd">
+              <a:gradFill>
+                <a:gsLst>
+                  <a:gs pos="0">
+                    <a:schemeClr val="bg1"/>
+                  </a:gs>
+                  <a:gs pos="100000">
+                    <a:srgbClr val="23AAAD"/>
+                  </a:gs>
+                </a:gsLst>
+                <a:lin ang="21594000" scaled="0"/>
+              </a:gradFill>
+            </a:ln>
+          </p:spPr>
+          <p:style>
+            <a:lnRef idx="2">
+              <a:schemeClr val="accent1">
+                <a:shade val="15000"/>
+              </a:schemeClr>
+            </a:lnRef>
+            <a:fillRef idx="1">
+              <a:schemeClr val="accent1"/>
+            </a:fillRef>
+            <a:effectRef idx="0">
+              <a:schemeClr val="accent1"/>
+            </a:effectRef>
+            <a:fontRef idx="minor">
+              <a:schemeClr val="lt1"/>
+            </a:fontRef>
+          </p:style>
+          <p:txBody>
+            <a:bodyPr rtlCol="0" anchor="ctr"/>
+            <a:lstStyle>
+              <a:defPPr>
+                <a:defRPr lang="en-US"/>
+              </a:defPPr>
+              <a:lvl1pPr marL="0" algn="l" defTabSz="914400" rtl="0" eaLnBrk="1" latinLnBrk="0" hangingPunct="1">
+                <a:defRPr sz="1800" kern="1200">
+                  <a:solidFill>
+                    <a:schemeClr val="lt1"/>
+                  </a:solidFill>
+                  <a:latin typeface="+mn-lt"/>
+                  <a:ea typeface="+mn-ea"/>
+                  <a:cs typeface="+mn-cs"/>
+                </a:defRPr>
+              </a:lvl1pPr>
+              <a:lvl2pPr marL="457200" algn="l" defTabSz="914400" rtl="0" eaLnBrk="1" latinLnBrk="0" hangingPunct="1">
+                <a:defRPr sz="1800" kern="1200">
+                  <a:solidFill>
+                    <a:schemeClr val="lt1"/>
+                  </a:solidFill>
+                  <a:latin typeface="+mn-lt"/>
+                  <a:ea typeface="+mn-ea"/>
+                  <a:cs typeface="+mn-cs"/>
+                </a:defRPr>
+              </a:lvl2pPr>
+              <a:lvl3pPr marL="914400" algn="l" defTabSz="914400" rtl="0" eaLnBrk="1" latinLnBrk="0" hangingPunct="1">
+                <a:defRPr sz="1800" kern="1200">
+                  <a:solidFill>
+                    <a:schemeClr val="lt1"/>
+                  </a:solidFill>
+                  <a:latin typeface="+mn-lt"/>
+                  <a:ea typeface="+mn-ea"/>
+                  <a:cs typeface="+mn-cs"/>
+                </a:defRPr>
+              </a:lvl3pPr>
+              <a:lvl4pPr marL="1371600" algn="l" defTabSz="914400" rtl="0" eaLnBrk="1" latinLnBrk="0" hangingPunct="1">
+                <a:defRPr sz="1800" kern="1200">
+                  <a:solidFill>
+                    <a:schemeClr val="lt1"/>
+                  </a:solidFill>
+                  <a:latin typeface="+mn-lt"/>
+                  <a:ea typeface="+mn-ea"/>
+                  <a:cs typeface="+mn-cs"/>
+                </a:defRPr>
+              </a:lvl4pPr>
+              <a:lvl5pPr marL="1828800" algn="l" defTabSz="914400" rtl="0" eaLnBrk="1" latinLnBrk="0" hangingPunct="1">
+                <a:defRPr sz="1800" kern="1200">
+                  <a:solidFill>
+                    <a:schemeClr val="lt1"/>
+                  </a:solidFill>
+                  <a:latin typeface="+mn-lt"/>
+                  <a:ea typeface="+mn-ea"/>
+                  <a:cs typeface="+mn-cs"/>
+                </a:defRPr>
+              </a:lvl5pPr>
+              <a:lvl6pPr marL="2286000" algn="l" defTabSz="914400" rtl="0" eaLnBrk="1" latinLnBrk="0" hangingPunct="1">
+                <a:defRPr sz="1800" kern="1200">
+                  <a:solidFill>
+                    <a:schemeClr val="lt1"/>
+                  </a:solidFill>
+                  <a:latin typeface="+mn-lt"/>
+                  <a:ea typeface="+mn-ea"/>
+                  <a:cs typeface="+mn-cs"/>
+                </a:defRPr>
+              </a:lvl6pPr>
+              <a:lvl7pPr marL="2743200" algn="l" defTabSz="914400" rtl="0" eaLnBrk="1" latinLnBrk="0" hangingPunct="1">
+                <a:defRPr sz="1800" kern="1200">
+                  <a:solidFill>
+                    <a:schemeClr val="lt1"/>
+                  </a:solidFill>
+                  <a:latin typeface="+mn-lt"/>
+                  <a:ea typeface="+mn-ea"/>
+                  <a:cs typeface="+mn-cs"/>
+                </a:defRPr>
+              </a:lvl7pPr>
+              <a:lvl8pPr marL="3200400" algn="l" defTabSz="914400" rtl="0" eaLnBrk="1" latinLnBrk="0" hangingPunct="1">
+                <a:defRPr sz="1800" kern="1200">
+                  <a:solidFill>
+                    <a:schemeClr val="lt1"/>
+                  </a:solidFill>
+                  <a:latin typeface="+mn-lt"/>
+                  <a:ea typeface="+mn-ea"/>
+                  <a:cs typeface="+mn-cs"/>
+                </a:defRPr>
+              </a:lvl8pPr>
+              <a:lvl9pPr marL="3657600" algn="l" defTabSz="914400" rtl="0" eaLnBrk="1" latinLnBrk="0" hangingPunct="1">
+                <a:defRPr sz="1800" kern="1200">
+                  <a:solidFill>
+                    <a:schemeClr val="lt1"/>
+                  </a:solidFill>
+                  <a:latin typeface="+mn-lt"/>
+                  <a:ea typeface="+mn-ea"/>
+                  <a:cs typeface="+mn-cs"/>
+                </a:defRPr>
+              </a:lvl9pPr>
+            </a:lstStyle>
+            <a:p>
+              <a:pPr algn="ctr"/>
+              <a:endParaRPr lang="en-US"/>
+            </a:p>
+          </p:txBody>
+        </p:sp>
+        <p:sp>
+          <p:nvSpPr>
+            <p:cNvPr id="5" name="Oval 12">
+              <a:extLst>
+                <a:ext uri="{FF2B5EF4-FFF2-40B4-BE49-F238E27FC236}">
+                  <a16:creationId xmlns:a16="http://schemas.microsoft.com/office/drawing/2014/main" id="{16BA0D63-1A8C-FA71-AF34-8D981C9DA020}"/>
+                </a:ext>
+              </a:extLst>
+            </p:cNvPr>
+            <p:cNvSpPr/>
+            <p:nvPr/>
+          </p:nvSpPr>
+          <p:spPr>
+            <a:xfrm rot="18815050">
+              <a:off x="3779383" y="990487"/>
+              <a:ext cx="2020491" cy="2020491"/>
+            </a:xfrm>
+            <a:custGeom>
+              <a:avLst/>
+              <a:gdLst>
+                <a:gd name="connsiteX0" fmla="*/ 0 w 4040981"/>
+                <a:gd name="connsiteY0" fmla="*/ 2020491 h 4040981"/>
+                <a:gd name="connsiteX1" fmla="*/ 2020491 w 4040981"/>
+                <a:gd name="connsiteY1" fmla="*/ 0 h 4040981"/>
+                <a:gd name="connsiteX2" fmla="*/ 4040982 w 4040981"/>
+                <a:gd name="connsiteY2" fmla="*/ 2020491 h 4040981"/>
+                <a:gd name="connsiteX3" fmla="*/ 2020491 w 4040981"/>
+                <a:gd name="connsiteY3" fmla="*/ 4040982 h 4040981"/>
+                <a:gd name="connsiteX4" fmla="*/ 0 w 4040981"/>
+                <a:gd name="connsiteY4" fmla="*/ 2020491 h 4040981"/>
+                <a:gd name="connsiteX0" fmla="*/ 0 w 4040982"/>
+                <a:gd name="connsiteY0" fmla="*/ 2020491 h 4040982"/>
+                <a:gd name="connsiteX1" fmla="*/ 2020491 w 4040982"/>
+                <a:gd name="connsiteY1" fmla="*/ 0 h 4040982"/>
+                <a:gd name="connsiteX2" fmla="*/ 4040982 w 4040982"/>
+                <a:gd name="connsiteY2" fmla="*/ 2020491 h 4040982"/>
+                <a:gd name="connsiteX3" fmla="*/ 2020491 w 4040982"/>
+                <a:gd name="connsiteY3" fmla="*/ 4040982 h 4040982"/>
+                <a:gd name="connsiteX4" fmla="*/ 91440 w 4040982"/>
+                <a:gd name="connsiteY4" fmla="*/ 2111931 h 4040982"/>
+                <a:gd name="connsiteX0" fmla="*/ 1935425 w 3955916"/>
+                <a:gd name="connsiteY0" fmla="*/ 0 h 4040982"/>
+                <a:gd name="connsiteX1" fmla="*/ 3955916 w 3955916"/>
+                <a:gd name="connsiteY1" fmla="*/ 2020491 h 4040982"/>
+                <a:gd name="connsiteX2" fmla="*/ 1935425 w 3955916"/>
+                <a:gd name="connsiteY2" fmla="*/ 4040982 h 4040982"/>
+                <a:gd name="connsiteX3" fmla="*/ 6374 w 3955916"/>
+                <a:gd name="connsiteY3" fmla="*/ 2111931 h 4040982"/>
+                <a:gd name="connsiteX0" fmla="*/ 0 w 2020491"/>
+                <a:gd name="connsiteY0" fmla="*/ 0 h 4040982"/>
+                <a:gd name="connsiteX1" fmla="*/ 2020491 w 2020491"/>
+                <a:gd name="connsiteY1" fmla="*/ 2020491 h 4040982"/>
+                <a:gd name="connsiteX2" fmla="*/ 0 w 2020491"/>
+                <a:gd name="connsiteY2" fmla="*/ 4040982 h 4040982"/>
+                <a:gd name="connsiteX0" fmla="*/ 0 w 2020491"/>
+                <a:gd name="connsiteY0" fmla="*/ 0 h 2020491"/>
+                <a:gd name="connsiteX1" fmla="*/ 2020491 w 2020491"/>
+                <a:gd name="connsiteY1" fmla="*/ 2020491 h 2020491"/>
+              </a:gdLst>
+              <a:ahLst/>
+              <a:cxnLst>
+                <a:cxn ang="0">
+                  <a:pos x="connsiteX0" y="connsiteY0"/>
+                </a:cxn>
+                <a:cxn ang="0">
+                  <a:pos x="connsiteX1" y="connsiteY1"/>
+                </a:cxn>
+              </a:cxnLst>
+              <a:rect l="l" t="t" r="r" b="b"/>
+              <a:pathLst>
+                <a:path w="2020491" h="2020491">
+                  <a:moveTo>
+                    <a:pt x="0" y="0"/>
+                  </a:moveTo>
+                  <a:cubicBezTo>
+                    <a:pt x="1115886" y="0"/>
+                    <a:pt x="2020491" y="904605"/>
+                    <a:pt x="2020491" y="2020491"/>
+                  </a:cubicBezTo>
+                </a:path>
+              </a:pathLst>
+            </a:custGeom>
+            <a:noFill/>
+            <a:ln w="403225" cap="rnd">
+              <a:gradFill>
+                <a:gsLst>
+                  <a:gs pos="100000">
+                    <a:schemeClr val="bg1"/>
+                  </a:gs>
+                  <a:gs pos="0">
+                    <a:srgbClr val="F39E34"/>
+                  </a:gs>
+                </a:gsLst>
+                <a:lin ang="5400000" scaled="1"/>
+              </a:gradFill>
+            </a:ln>
+          </p:spPr>
+          <p:style>
+            <a:lnRef idx="2">
+              <a:schemeClr val="accent1">
+                <a:shade val="15000"/>
+              </a:schemeClr>
+            </a:lnRef>
+            <a:fillRef idx="1">
+              <a:schemeClr val="accent1"/>
+            </a:fillRef>
+            <a:effectRef idx="0">
+              <a:schemeClr val="accent1"/>
+            </a:effectRef>
+            <a:fontRef idx="minor">
+              <a:schemeClr val="lt1"/>
+            </a:fontRef>
+          </p:style>
+          <p:txBody>
+            <a:bodyPr rtlCol="0" anchor="ctr"/>
+            <a:lstStyle>
+              <a:defPPr>
+                <a:defRPr lang="en-US"/>
+              </a:defPPr>
+              <a:lvl1pPr marL="0" algn="l" defTabSz="914400" rtl="0" eaLnBrk="1" latinLnBrk="0" hangingPunct="1">
+                <a:defRPr sz="1800" kern="1200">
+                  <a:solidFill>
+                    <a:schemeClr val="lt1"/>
+                  </a:solidFill>
+                  <a:latin typeface="+mn-lt"/>
+                  <a:ea typeface="+mn-ea"/>
+                  <a:cs typeface="+mn-cs"/>
+                </a:defRPr>
+              </a:lvl1pPr>
+              <a:lvl2pPr marL="457200" algn="l" defTabSz="914400" rtl="0" eaLnBrk="1" latinLnBrk="0" hangingPunct="1">
+                <a:defRPr sz="1800" kern="1200">
+                  <a:solidFill>
+                    <a:schemeClr val="lt1"/>
+                  </a:solidFill>
+                  <a:latin typeface="+mn-lt"/>
+                  <a:ea typeface="+mn-ea"/>
+                  <a:cs typeface="+mn-cs"/>
+                </a:defRPr>
+              </a:lvl2pPr>
+              <a:lvl3pPr marL="914400" algn="l" defTabSz="914400" rtl="0" eaLnBrk="1" latinLnBrk="0" hangingPunct="1">
+                <a:defRPr sz="1800" kern="1200">
+                  <a:solidFill>
+                    <a:schemeClr val="lt1"/>
+                  </a:solidFill>
+                  <a:latin typeface="+mn-lt"/>
+                  <a:ea typeface="+mn-ea"/>
+                  <a:cs typeface="+mn-cs"/>
+                </a:defRPr>
+              </a:lvl3pPr>
+              <a:lvl4pPr marL="1371600" algn="l" defTabSz="914400" rtl="0" eaLnBrk="1" latinLnBrk="0" hangingPunct="1">
+                <a:defRPr sz="1800" kern="1200">
+                  <a:solidFill>
+                    <a:schemeClr val="lt1"/>
+                  </a:solidFill>
+                  <a:latin typeface="+mn-lt"/>
+                  <a:ea typeface="+mn-ea"/>
+                  <a:cs typeface="+mn-cs"/>
+                </a:defRPr>
+              </a:lvl4pPr>
+              <a:lvl5pPr marL="1828800" algn="l" defTabSz="914400" rtl="0" eaLnBrk="1" latinLnBrk="0" hangingPunct="1">
+                <a:defRPr sz="1800" kern="1200">
+                  <a:solidFill>
+                    <a:schemeClr val="lt1"/>
+                  </a:solidFill>
+                  <a:latin typeface="+mn-lt"/>
+                  <a:ea typeface="+mn-ea"/>
+                  <a:cs typeface="+mn-cs"/>
+                </a:defRPr>
+              </a:lvl5pPr>
+              <a:lvl6pPr marL="2286000" algn="l" defTabSz="914400" rtl="0" eaLnBrk="1" latinLnBrk="0" hangingPunct="1">
+                <a:defRPr sz="1800" kern="1200">
+                  <a:solidFill>
+                    <a:schemeClr val="lt1"/>
+                  </a:solidFill>
+                  <a:latin typeface="+mn-lt"/>
+                  <a:ea typeface="+mn-ea"/>
+                  <a:cs typeface="+mn-cs"/>
+                </a:defRPr>
+              </a:lvl6pPr>
+              <a:lvl7pPr marL="2743200" algn="l" defTabSz="914400" rtl="0" eaLnBrk="1" latinLnBrk="0" hangingPunct="1">
+                <a:defRPr sz="1800" kern="1200">
+                  <a:solidFill>
+                    <a:schemeClr val="lt1"/>
+                  </a:solidFill>
+                  <a:latin typeface="+mn-lt"/>
+                  <a:ea typeface="+mn-ea"/>
+                  <a:cs typeface="+mn-cs"/>
+                </a:defRPr>
+              </a:lvl7pPr>
+              <a:lvl8pPr marL="3200400" algn="l" defTabSz="914400" rtl="0" eaLnBrk="1" latinLnBrk="0" hangingPunct="1">
+                <a:defRPr sz="1800" kern="1200">
+                  <a:solidFill>
+                    <a:schemeClr val="lt1"/>
+                  </a:solidFill>
+                  <a:latin typeface="+mn-lt"/>
+                  <a:ea typeface="+mn-ea"/>
+                  <a:cs typeface="+mn-cs"/>
+                </a:defRPr>
+              </a:lvl8pPr>
+              <a:lvl9pPr marL="3657600" algn="l" defTabSz="914400" rtl="0" eaLnBrk="1" latinLnBrk="0" hangingPunct="1">
+                <a:defRPr sz="1800" kern="1200">
+                  <a:solidFill>
+                    <a:schemeClr val="lt1"/>
+                  </a:solidFill>
+                  <a:latin typeface="+mn-lt"/>
+                  <a:ea typeface="+mn-ea"/>
+                  <a:cs typeface="+mn-cs"/>
+                </a:defRPr>
+              </a:lvl9pPr>
+            </a:lstStyle>
+            <a:p>
+              <a:pPr algn="ctr"/>
+              <a:endParaRPr lang="en-US" sz="200"/>
+            </a:p>
+          </p:txBody>
+        </p:sp>
+      </p:grpSp>
+      <p:pic>
+        <p:nvPicPr>
+          <p:cNvPr id="23" name="Picture 22">
+            <a:extLst>
+              <a:ext uri="{FF2B5EF4-FFF2-40B4-BE49-F238E27FC236}">
+                <a16:creationId xmlns:a16="http://schemas.microsoft.com/office/drawing/2014/main" id="{724B1F2D-A3A2-B2F3-DEF5-B561D7BE290A}"/>
+              </a:ext>
+            </a:extLst>
+          </p:cNvPr>
+          <p:cNvPicPr>
+            <a:picLocks noChangeAspect="1"/>
+          </p:cNvPicPr>
+          <p:nvPr/>
+        </p:nvPicPr>
+        <p:blipFill>
+          <a:blip r:embed="rId3">
+            <a:extLst>
+              <a:ext uri="{28A0092B-C50C-407E-A947-70E740481C1C}">
+                <a14:useLocalDpi xmlns:a14="http://schemas.microsoft.com/office/drawing/2010/main" val="0"/>
+              </a:ext>
+            </a:extLst>
+          </a:blip>
+          <a:stretch>
+            <a:fillRect/>
+          </a:stretch>
+        </p:blipFill>
+        <p:spPr>
+          <a:xfrm>
+            <a:off x="2108200" y="1678360"/>
+            <a:ext cx="3527522" cy="3527522"/>
+          </a:xfrm>
+          <a:prstGeom prst="rect">
+            <a:avLst/>
+          </a:prstGeom>
+        </p:spPr>
+      </p:pic>
+      <p:sp>
+        <p:nvSpPr>
+          <p:cNvPr id="24" name="TextBox 23">
+            <a:extLst>
+              <a:ext uri="{FF2B5EF4-FFF2-40B4-BE49-F238E27FC236}">
+                <a16:creationId xmlns:a16="http://schemas.microsoft.com/office/drawing/2014/main" id="{6B7A01BE-7585-782A-996F-1AD7178F7D55}"/>
+              </a:ext>
+            </a:extLst>
+          </p:cNvPr>
+          <p:cNvSpPr txBox="1"/>
+          <p:nvPr/>
+        </p:nvSpPr>
+        <p:spPr>
+          <a:xfrm>
+            <a:off x="6593484" y="3944679"/>
+            <a:ext cx="5220586" cy="954107"/>
+          </a:xfrm>
+          <a:prstGeom prst="rect">
+            <a:avLst/>
+          </a:prstGeom>
+          <a:solidFill>
+            <a:schemeClr val="bg1"/>
+          </a:solidFill>
+        </p:spPr>
+        <p:txBody>
+          <a:bodyPr wrap="square" rtlCol="0">
+            <a:spAutoFit/>
+          </a:bodyPr>
+          <a:lstStyle/>
+          <a:p>
+            <a:pPr algn="ctr"/>
+            <a:r>
+              <a:rPr lang="en-US" sz="2800" dirty="0">
+                <a:solidFill>
+                  <a:schemeClr val="bg2">
+                    <a:lumMod val="50000"/>
+                  </a:schemeClr>
+                </a:solidFill>
+              </a:rPr>
+              <a:t>FastAPI + MongoDB based Wellness and Habit Tracker system</a:t>
+            </a:r>
+            <a:endParaRPr lang="en-IN" sz="2800" dirty="0" err="1">
+              <a:solidFill>
+                <a:schemeClr val="bg2">
+                  <a:lumMod val="50000"/>
+                </a:schemeClr>
+              </a:solidFill>
+            </a:endParaRPr>
           </a:p>
         </p:txBody>
       </p:sp>
@@ -5348,8 +5831,8 @@
         </p:nvSpPr>
         <p:spPr>
           <a:xfrm>
-            <a:off x="10877550" y="4914900"/>
-            <a:ext cx="1314450" cy="1943100"/>
+            <a:off x="11454304" y="4914900"/>
+            <a:ext cx="737696" cy="1943100"/>
           </a:xfrm>
           <a:prstGeom prst="rect">
             <a:avLst/>
@@ -5400,8 +5883,8 @@
         </p:nvSpPr>
         <p:spPr>
           <a:xfrm>
-            <a:off x="8551772" y="4706443"/>
-            <a:ext cx="1593140" cy="1364696"/>
+            <a:off x="9194251" y="4470480"/>
+            <a:ext cx="1364400" cy="1364696"/>
           </a:xfrm>
           <a:prstGeom prst="rect">
             <a:avLst/>
@@ -5415,7 +5898,7 @@
             </a:solidFill>
           </a:ln>
           <a:effectLst>
-            <a:outerShdw blurRad="50800" dist="38100" dir="10800000" algn="r" rotWithShape="0">
+            <a:outerShdw blurRad="50800" dist="38100" dir="2700000" algn="tl" rotWithShape="0">
               <a:prstClr val="black">
                 <a:alpha val="40000"/>
               </a:prstClr>
@@ -5449,71 +5932,6 @@
       </p:sp>
       <p:sp>
         <p:nvSpPr>
-          <p:cNvPr id="13" name="Rectangle 12">
-            <a:extLst>
-              <a:ext uri="{FF2B5EF4-FFF2-40B4-BE49-F238E27FC236}">
-                <a16:creationId xmlns:a16="http://schemas.microsoft.com/office/drawing/2014/main" id="{3ACB0DFB-4C61-F27F-51D4-294B40CCC7BF}"/>
-              </a:ext>
-            </a:extLst>
-          </p:cNvPr>
-          <p:cNvSpPr/>
-          <p:nvPr/>
-        </p:nvSpPr>
-        <p:spPr>
-          <a:xfrm>
-            <a:off x="6203068" y="684531"/>
-            <a:ext cx="2663887" cy="2301119"/>
-          </a:xfrm>
-          <a:prstGeom prst="rect">
-            <a:avLst/>
-          </a:prstGeom>
-          <a:solidFill>
-            <a:schemeClr val="accent1">
-              <a:lumMod val="50000"/>
-            </a:schemeClr>
-          </a:solidFill>
-          <a:ln>
-            <a:solidFill>
-              <a:schemeClr val="accent1">
-                <a:lumMod val="75000"/>
-              </a:schemeClr>
-            </a:solidFill>
-          </a:ln>
-          <a:effectLst>
-            <a:outerShdw blurRad="50800" dist="38100" dir="10800000" algn="r" rotWithShape="0">
-              <a:prstClr val="black">
-                <a:alpha val="40000"/>
-              </a:prstClr>
-            </a:outerShdw>
-          </a:effectLst>
-        </p:spPr>
-        <p:style>
-          <a:lnRef idx="2">
-            <a:schemeClr val="accent1">
-              <a:shade val="15000"/>
-            </a:schemeClr>
-          </a:lnRef>
-          <a:fillRef idx="1">
-            <a:schemeClr val="accent1"/>
-          </a:fillRef>
-          <a:effectRef idx="0">
-            <a:schemeClr val="accent1"/>
-          </a:effectRef>
-          <a:fontRef idx="minor">
-            <a:schemeClr val="lt1"/>
-          </a:fontRef>
-        </p:style>
-        <p:txBody>
-          <a:bodyPr rtlCol="0" anchor="ctr"/>
-          <a:lstStyle/>
-          <a:p>
-            <a:pPr algn="ctr"/>
-            <a:endParaRPr lang="en-US" dirty="0"/>
-          </a:p>
-        </p:txBody>
-      </p:sp>
-      <p:sp>
-        <p:nvSpPr>
           <p:cNvPr id="14" name="TextBox 13">
             <a:extLst>
               <a:ext uri="{FF2B5EF4-FFF2-40B4-BE49-F238E27FC236}">
@@ -5526,7 +5944,7 @@
         </p:nvSpPr>
         <p:spPr>
           <a:xfrm>
-            <a:off x="6729492" y="1573845"/>
+            <a:off x="7120838" y="1574604"/>
             <a:ext cx="3072486" cy="3938310"/>
           </a:xfrm>
           <a:prstGeom prst="rect">
@@ -5577,12 +5995,49 @@
         </p:blipFill>
         <p:spPr>
           <a:xfrm>
-            <a:off x="6954638" y="2323629"/>
+            <a:off x="7437710" y="2324388"/>
             <a:ext cx="2438741" cy="2438741"/>
           </a:xfrm>
           <a:prstGeom prst="rect">
             <a:avLst/>
           </a:prstGeom>
+        </p:spPr>
+      </p:pic>
+      <p:pic>
+        <p:nvPicPr>
+          <p:cNvPr id="10" name="Picture 9">
+            <a:extLst>
+              <a:ext uri="{FF2B5EF4-FFF2-40B4-BE49-F238E27FC236}">
+                <a16:creationId xmlns:a16="http://schemas.microsoft.com/office/drawing/2014/main" id="{ED6D5636-6485-DA4A-11BC-400D2D243389}"/>
+              </a:ext>
+            </a:extLst>
+          </p:cNvPr>
+          <p:cNvPicPr>
+            <a:picLocks noChangeAspect="1"/>
+          </p:cNvPicPr>
+          <p:nvPr/>
+        </p:nvPicPr>
+        <p:blipFill>
+          <a:blip r:embed="rId5"/>
+          <a:stretch>
+            <a:fillRect/>
+          </a:stretch>
+        </p:blipFill>
+        <p:spPr>
+          <a:xfrm>
+            <a:off x="6868439" y="1252342"/>
+            <a:ext cx="542925" cy="1647825"/>
+          </a:xfrm>
+          <a:prstGeom prst="rect">
+            <a:avLst/>
+          </a:prstGeom>
+          <a:effectLst>
+            <a:outerShdw blurRad="50800" dist="38100" dir="13500000" algn="br" rotWithShape="0">
+              <a:prstClr val="black">
+                <a:alpha val="40000"/>
+              </a:prstClr>
+            </a:outerShdw>
+          </a:effectLst>
         </p:spPr>
       </p:pic>
     </p:spTree>
@@ -5947,8 +6402,8 @@
         </p:nvSpPr>
         <p:spPr>
           <a:xfrm>
-            <a:off x="9022273" y="4610249"/>
-            <a:ext cx="1593140" cy="1364696"/>
+            <a:off x="9138254" y="4494184"/>
+            <a:ext cx="1364400" cy="1364696"/>
           </a:xfrm>
           <a:prstGeom prst="rect">
             <a:avLst/>
@@ -5962,7 +6417,7 @@
             </a:solidFill>
           </a:ln>
           <a:effectLst>
-            <a:outerShdw blurRad="50800" dist="38100" dir="10800000" algn="r" rotWithShape="0">
+            <a:outerShdw blurRad="50800" dist="38100" dir="2700000" algn="tl" rotWithShape="0">
               <a:prstClr val="black">
                 <a:alpha val="40000"/>
               </a:prstClr>
@@ -5996,71 +6451,6 @@
       </p:sp>
       <p:sp>
         <p:nvSpPr>
-          <p:cNvPr id="11" name="Rectangle 10">
-            <a:extLst>
-              <a:ext uri="{FF2B5EF4-FFF2-40B4-BE49-F238E27FC236}">
-                <a16:creationId xmlns:a16="http://schemas.microsoft.com/office/drawing/2014/main" id="{9426468C-1A04-44C4-11DB-819DC9ADD418}"/>
-              </a:ext>
-            </a:extLst>
-          </p:cNvPr>
-          <p:cNvSpPr/>
-          <p:nvPr/>
-        </p:nvSpPr>
-        <p:spPr>
-          <a:xfrm>
-            <a:off x="6673569" y="920300"/>
-            <a:ext cx="2663887" cy="1969156"/>
-          </a:xfrm>
-          <a:prstGeom prst="rect">
-            <a:avLst/>
-          </a:prstGeom>
-          <a:solidFill>
-            <a:schemeClr val="accent1">
-              <a:lumMod val="50000"/>
-            </a:schemeClr>
-          </a:solidFill>
-          <a:ln>
-            <a:solidFill>
-              <a:schemeClr val="accent1">
-                <a:lumMod val="75000"/>
-              </a:schemeClr>
-            </a:solidFill>
-          </a:ln>
-          <a:effectLst>
-            <a:outerShdw blurRad="50800" dist="38100" dir="10800000" algn="r" rotWithShape="0">
-              <a:prstClr val="black">
-                <a:alpha val="40000"/>
-              </a:prstClr>
-            </a:outerShdw>
-          </a:effectLst>
-        </p:spPr>
-        <p:style>
-          <a:lnRef idx="2">
-            <a:schemeClr val="accent1">
-              <a:shade val="15000"/>
-            </a:schemeClr>
-          </a:lnRef>
-          <a:fillRef idx="1">
-            <a:schemeClr val="accent1"/>
-          </a:fillRef>
-          <a:effectRef idx="0">
-            <a:schemeClr val="accent1"/>
-          </a:effectRef>
-          <a:fontRef idx="minor">
-            <a:schemeClr val="lt1"/>
-          </a:fontRef>
-        </p:style>
-        <p:txBody>
-          <a:bodyPr rtlCol="0" anchor="ctr"/>
-          <a:lstStyle/>
-          <a:p>
-            <a:pPr algn="ctr"/>
-            <a:endParaRPr lang="en-US" dirty="0"/>
-          </a:p>
-        </p:txBody>
-      </p:sp>
-      <p:sp>
-        <p:nvSpPr>
           <p:cNvPr id="12" name="TextBox 11">
             <a:extLst>
               <a:ext uri="{FF2B5EF4-FFF2-40B4-BE49-F238E27FC236}">
@@ -6130,6 +6520,43 @@
           <a:prstGeom prst="rect">
             <a:avLst/>
           </a:prstGeom>
+        </p:spPr>
+      </p:pic>
+      <p:pic>
+        <p:nvPicPr>
+          <p:cNvPr id="13" name="Picture 12">
+            <a:extLst>
+              <a:ext uri="{FF2B5EF4-FFF2-40B4-BE49-F238E27FC236}">
+                <a16:creationId xmlns:a16="http://schemas.microsoft.com/office/drawing/2014/main" id="{725DCAAE-DBD3-2154-785F-DE83B3F4384F}"/>
+              </a:ext>
+            </a:extLst>
+          </p:cNvPr>
+          <p:cNvPicPr>
+            <a:picLocks noChangeAspect="1"/>
+          </p:cNvPicPr>
+          <p:nvPr/>
+        </p:nvPicPr>
+        <p:blipFill>
+          <a:blip r:embed="rId5"/>
+          <a:stretch>
+            <a:fillRect/>
+          </a:stretch>
+        </p:blipFill>
+        <p:spPr>
+          <a:xfrm>
+            <a:off x="6956413" y="1154073"/>
+            <a:ext cx="542925" cy="1647825"/>
+          </a:xfrm>
+          <a:prstGeom prst="rect">
+            <a:avLst/>
+          </a:prstGeom>
+          <a:effectLst>
+            <a:outerShdw blurRad="50800" dist="38100" dir="13500000" algn="br" rotWithShape="0">
+              <a:prstClr val="black">
+                <a:alpha val="40000"/>
+              </a:prstClr>
+            </a:outerShdw>
+          </a:effectLst>
         </p:spPr>
       </p:pic>
     </p:spTree>
@@ -6229,15 +6656,7 @@
           <a:p>
             <a:r>
               <a:rPr lang="en-US" dirty="0"/>
-              <a:t>Developed a </a:t>
-            </a:r>
-            <a:r>
-              <a:rPr lang="en-US" dirty="0" err="1"/>
-              <a:t>FastAPI</a:t>
-            </a:r>
-            <a:r>
-              <a:rPr lang="en-US" dirty="0"/>
-              <a:t> + MongoDB Wellness and Habit Tracker</a:t>
+              <a:t>Developed a FastAPI + MongoDB Wellness and Habit Tracker</a:t>
             </a:r>
           </a:p>
           <a:p>
@@ -6385,8 +6804,8 @@
         </p:nvSpPr>
         <p:spPr>
           <a:xfrm>
-            <a:off x="9733800" y="4104900"/>
-            <a:ext cx="1620000" cy="1620000"/>
+            <a:off x="9386278" y="3547777"/>
+            <a:ext cx="1364400" cy="1364400"/>
           </a:xfrm>
           <a:prstGeom prst="rect">
             <a:avLst/>
@@ -6400,7 +6819,7 @@
             </a:solidFill>
           </a:ln>
           <a:effectLst>
-            <a:outerShdw blurRad="50800" dist="38100" dir="10800000" algn="r" rotWithShape="0">
+            <a:outerShdw blurRad="50800" dist="38100" dir="2700000" algn="tl" rotWithShape="0">
               <a:prstClr val="black">
                 <a:alpha val="40000"/>
               </a:prstClr>
@@ -6428,71 +6847,6 @@
           <a:lstStyle/>
           <a:p>
             <a:pPr algn="ctr"/>
-            <a:endParaRPr lang="en-US"/>
-          </a:p>
-        </p:txBody>
-      </p:sp>
-      <p:sp>
-        <p:nvSpPr>
-          <p:cNvPr id="10" name="Rectangle 9">
-            <a:extLst>
-              <a:ext uri="{FF2B5EF4-FFF2-40B4-BE49-F238E27FC236}">
-                <a16:creationId xmlns:a16="http://schemas.microsoft.com/office/drawing/2014/main" id="{F4A686AD-0F82-31A4-E638-8990D9226C52}"/>
-              </a:ext>
-            </a:extLst>
-          </p:cNvPr>
-          <p:cNvSpPr/>
-          <p:nvPr/>
-        </p:nvSpPr>
-        <p:spPr>
-          <a:xfrm>
-            <a:off x="6831262" y="1316976"/>
-            <a:ext cx="1620000" cy="1620000"/>
-          </a:xfrm>
-          <a:prstGeom prst="rect">
-            <a:avLst/>
-          </a:prstGeom>
-          <a:solidFill>
-            <a:schemeClr val="accent1">
-              <a:lumMod val="50000"/>
-            </a:schemeClr>
-          </a:solidFill>
-          <a:ln>
-            <a:solidFill>
-              <a:schemeClr val="accent1">
-                <a:lumMod val="75000"/>
-              </a:schemeClr>
-            </a:solidFill>
-          </a:ln>
-          <a:effectLst>
-            <a:outerShdw blurRad="50800" dist="38100" dir="10800000" algn="r" rotWithShape="0">
-              <a:prstClr val="black">
-                <a:alpha val="40000"/>
-              </a:prstClr>
-            </a:outerShdw>
-          </a:effectLst>
-        </p:spPr>
-        <p:style>
-          <a:lnRef idx="2">
-            <a:schemeClr val="accent1">
-              <a:shade val="15000"/>
-            </a:schemeClr>
-          </a:lnRef>
-          <a:fillRef idx="1">
-            <a:schemeClr val="accent1"/>
-          </a:fillRef>
-          <a:effectRef idx="0">
-            <a:schemeClr val="accent1"/>
-          </a:effectRef>
-          <a:fontRef idx="minor">
-            <a:schemeClr val="lt1"/>
-          </a:fontRef>
-        </p:style>
-        <p:txBody>
-          <a:bodyPr rtlCol="0" anchor="ctr"/>
-          <a:lstStyle/>
-          <a:p>
-            <a:pPr algn="ctr"/>
             <a:endParaRPr lang="en-US" dirty="0"/>
           </a:p>
         </p:txBody>
@@ -6511,8 +6865,8 @@
         </p:nvSpPr>
         <p:spPr>
           <a:xfrm>
-            <a:off x="7631918" y="2126976"/>
-            <a:ext cx="2971416" cy="2970000"/>
+            <a:off x="8008092" y="2318130"/>
+            <a:ext cx="2372348" cy="2221740"/>
           </a:xfrm>
           <a:prstGeom prst="rect">
             <a:avLst/>
@@ -6562,12 +6916,49 @@
         </p:blipFill>
         <p:spPr>
           <a:xfrm>
-            <a:off x="8043567" y="2537917"/>
-            <a:ext cx="2148118" cy="2148118"/>
+            <a:off x="8370718" y="2583883"/>
+            <a:ext cx="1690233" cy="1690233"/>
           </a:xfrm>
           <a:prstGeom prst="rect">
             <a:avLst/>
           </a:prstGeom>
+        </p:spPr>
+      </p:pic>
+      <p:pic>
+        <p:nvPicPr>
+          <p:cNvPr id="3" name="Picture 2">
+            <a:extLst>
+              <a:ext uri="{FF2B5EF4-FFF2-40B4-BE49-F238E27FC236}">
+                <a16:creationId xmlns:a16="http://schemas.microsoft.com/office/drawing/2014/main" id="{F1FE8530-7753-D789-B2A9-CE550EDA42E2}"/>
+              </a:ext>
+            </a:extLst>
+          </p:cNvPr>
+          <p:cNvPicPr>
+            <a:picLocks noChangeAspect="1"/>
+          </p:cNvPicPr>
+          <p:nvPr/>
+        </p:nvPicPr>
+        <p:blipFill>
+          <a:blip r:embed="rId3"/>
+          <a:stretch>
+            <a:fillRect/>
+          </a:stretch>
+        </p:blipFill>
+        <p:spPr>
+          <a:xfrm>
+            <a:off x="7736629" y="1899953"/>
+            <a:ext cx="542925" cy="1647825"/>
+          </a:xfrm>
+          <a:prstGeom prst="rect">
+            <a:avLst/>
+          </a:prstGeom>
+          <a:effectLst>
+            <a:outerShdw blurRad="50800" dist="38100" dir="13500000" algn="br" rotWithShape="0">
+              <a:prstClr val="black">
+                <a:alpha val="40000"/>
+              </a:prstClr>
+            </a:outerShdw>
+          </a:effectLst>
         </p:spPr>
       </p:pic>
     </p:spTree>
@@ -6794,7 +7185,7 @@
         </p:nvSpPr>
         <p:spPr>
           <a:xfrm>
-            <a:off x="9250819" y="4352545"/>
+            <a:off x="9250819" y="4278114"/>
             <a:ext cx="2057400" cy="1943100"/>
           </a:xfrm>
           <a:prstGeom prst="rect">
@@ -6806,6 +7197,13 @@
           <a:ln>
             <a:noFill/>
           </a:ln>
+          <a:effectLst>
+            <a:outerShdw blurRad="50800" dist="38100" dir="2700000" algn="tl" rotWithShape="0">
+              <a:prstClr val="black">
+                <a:alpha val="40000"/>
+              </a:prstClr>
+            </a:outerShdw>
+          </a:effectLst>
         </p:spPr>
         <p:style>
           <a:lnRef idx="2">
@@ -7069,64 +7467,69 @@
       </p:sp>
       <p:sp>
         <p:nvSpPr>
-          <p:cNvPr id="14" name="TextBox 13">
-            <a:extLst>
-              <a:ext uri="{FF2B5EF4-FFF2-40B4-BE49-F238E27FC236}">
-                <a16:creationId xmlns:a16="http://schemas.microsoft.com/office/drawing/2014/main" id="{FBD6280C-B1AC-E4E9-D7B9-00506334F729}"/>
-              </a:ext>
-            </a:extLst>
-          </p:cNvPr>
-          <p:cNvSpPr txBox="1"/>
+          <p:cNvPr id="18" name="Rectangle 17">
+            <a:extLst>
+              <a:ext uri="{FF2B5EF4-FFF2-40B4-BE49-F238E27FC236}">
+                <a16:creationId xmlns:a16="http://schemas.microsoft.com/office/drawing/2014/main" id="{8AEFBDE8-B5E7-821B-23CA-6944C624FA10}"/>
+              </a:ext>
+            </a:extLst>
+          </p:cNvPr>
+          <p:cNvSpPr/>
           <p:nvPr/>
         </p:nvSpPr>
         <p:spPr>
           <a:xfrm>
-            <a:off x="881652" y="1996891"/>
-            <a:ext cx="4381499" cy="596766"/>
+            <a:off x="6928851" y="423672"/>
+            <a:ext cx="542925" cy="1647826"/>
           </a:xfrm>
           <a:prstGeom prst="rect">
             <a:avLst/>
           </a:prstGeom>
-          <a:noFill/>
+          <a:solidFill>
+            <a:srgbClr val="23AAAD"/>
+          </a:solidFill>
+          <a:ln>
+            <a:noFill/>
+          </a:ln>
+          <a:effectLst>
+            <a:outerShdw blurRad="50800" dist="38100" dir="13500000" algn="br" rotWithShape="0">
+              <a:prstClr val="black">
+                <a:alpha val="40000"/>
+              </a:prstClr>
+            </a:outerShdw>
+          </a:effectLst>
         </p:spPr>
-        <p:txBody>
-          <a:bodyPr wrap="square" lIns="91440" tIns="45720" rIns="91440" bIns="45720" rtlCol="0" anchor="t">
-            <a:spAutoFit/>
-          </a:bodyPr>
-          <a:lstStyle/>
-          <a:p>
-            <a:pPr>
-              <a:lnSpc>
-                <a:spcPct val="70000"/>
-              </a:lnSpc>
-            </a:pPr>
-            <a:r>
-              <a:rPr lang="en-US" sz="4400" b="1" spc="-300" dirty="0">
-                <a:solidFill>
-                  <a:srgbClr val="1B134C"/>
-                </a:solidFill>
-                <a:latin typeface="+mj-lt"/>
-                <a:ea typeface="Calibri"/>
-                <a:cs typeface="Arial" panose="020B0604020202020204" pitchFamily="34" charset="0"/>
-              </a:rPr>
-              <a:t>Project Overview</a:t>
-            </a:r>
-            <a:endParaRPr lang="en-US" b="1" dirty="0">
-              <a:solidFill>
-                <a:srgbClr val="1B134C"/>
-              </a:solidFill>
-              <a:latin typeface="+mj-lt"/>
-              <a:cs typeface="Arial" panose="020B0604020202020204" pitchFamily="34" charset="0"/>
-            </a:endParaRPr>
-          </a:p>
-        </p:txBody>
-      </p:sp>
-      <p:sp>
-        <p:nvSpPr>
-          <p:cNvPr id="18" name="Rectangle 17">
-            <a:extLst>
-              <a:ext uri="{FF2B5EF4-FFF2-40B4-BE49-F238E27FC236}">
-                <a16:creationId xmlns:a16="http://schemas.microsoft.com/office/drawing/2014/main" id="{8AEFBDE8-B5E7-821B-23CA-6944C624FA10}"/>
+        <p:style>
+          <a:lnRef idx="2">
+            <a:schemeClr val="accent1">
+              <a:shade val="15000"/>
+            </a:schemeClr>
+          </a:lnRef>
+          <a:fillRef idx="1">
+            <a:schemeClr val="accent1"/>
+          </a:fillRef>
+          <a:effectRef idx="0">
+            <a:schemeClr val="accent1"/>
+          </a:effectRef>
+          <a:fontRef idx="minor">
+            <a:schemeClr val="lt1"/>
+          </a:fontRef>
+        </p:style>
+        <p:txBody>
+          <a:bodyPr rtlCol="0" anchor="ctr"/>
+          <a:lstStyle/>
+          <a:p>
+            <a:pPr algn="ctr"/>
+            <a:endParaRPr lang="en-US"/>
+          </a:p>
+        </p:txBody>
+      </p:sp>
+      <p:sp>
+        <p:nvSpPr>
+          <p:cNvPr id="2" name="Rectangle 1">
+            <a:extLst>
+              <a:ext uri="{FF2B5EF4-FFF2-40B4-BE49-F238E27FC236}">
+                <a16:creationId xmlns:a16="http://schemas.microsoft.com/office/drawing/2014/main" id="{B4468512-F9C5-6E7D-2CB3-A8F2E2D6702F}"/>
               </a:ext>
             </a:extLst>
           </p:cNvPr>
@@ -7135,7 +7538,7 @@
         </p:nvSpPr>
         <p:spPr>
           <a:xfrm>
-            <a:off x="6928851" y="423672"/>
+            <a:off x="0" y="0"/>
             <a:ext cx="542925" cy="1647826"/>
           </a:xfrm>
           <a:prstGeom prst="rect">
@@ -7173,12 +7576,403 @@
           </a:p>
         </p:txBody>
       </p:sp>
-      <p:sp>
-        <p:nvSpPr>
-          <p:cNvPr id="2" name="Rectangle 1">
-            <a:extLst>
-              <a:ext uri="{FF2B5EF4-FFF2-40B4-BE49-F238E27FC236}">
-                <a16:creationId xmlns:a16="http://schemas.microsoft.com/office/drawing/2014/main" id="{B4468512-F9C5-6E7D-2CB3-A8F2E2D6702F}"/>
+      <p:pic>
+        <p:nvPicPr>
+          <p:cNvPr id="4" name="Picture 3">
+            <a:extLst>
+              <a:ext uri="{FF2B5EF4-FFF2-40B4-BE49-F238E27FC236}">
+                <a16:creationId xmlns:a16="http://schemas.microsoft.com/office/drawing/2014/main" id="{65646BE6-0CBF-0110-471E-8EE1CD1A3C70}"/>
+              </a:ext>
+            </a:extLst>
+          </p:cNvPr>
+          <p:cNvPicPr>
+            <a:picLocks noChangeAspect="1"/>
+          </p:cNvPicPr>
+          <p:nvPr/>
+        </p:nvPicPr>
+        <p:blipFill>
+          <a:blip r:embed="rId4">
+            <a:extLst>
+              <a:ext uri="{28A0092B-C50C-407E-A947-70E740481C1C}">
+                <a14:useLocalDpi xmlns:a14="http://schemas.microsoft.com/office/drawing/2010/main" val="0"/>
+              </a:ext>
+            </a:extLst>
+          </a:blip>
+          <a:stretch>
+            <a:fillRect/>
+          </a:stretch>
+        </p:blipFill>
+        <p:spPr>
+          <a:xfrm>
+            <a:off x="7200313" y="1305711"/>
+            <a:ext cx="3705225" cy="3939766"/>
+          </a:xfrm>
+          <a:prstGeom prst="rect">
+            <a:avLst/>
+          </a:prstGeom>
+        </p:spPr>
+      </p:pic>
+      <p:sp>
+        <p:nvSpPr>
+          <p:cNvPr id="3" name="Title 2">
+            <a:extLst>
+              <a:ext uri="{FF2B5EF4-FFF2-40B4-BE49-F238E27FC236}">
+                <a16:creationId xmlns:a16="http://schemas.microsoft.com/office/drawing/2014/main" id="{06EF4B38-FBA3-3817-01D8-C17B63C82324}"/>
+              </a:ext>
+            </a:extLst>
+          </p:cNvPr>
+          <p:cNvSpPr>
+            <a:spLocks noGrp="1"/>
+          </p:cNvSpPr>
+          <p:nvPr>
+            <p:ph type="title"/>
+          </p:nvPr>
+        </p:nvSpPr>
+        <p:spPr>
+          <a:xfrm>
+            <a:off x="828194" y="1197656"/>
+            <a:ext cx="4669465" cy="1325563"/>
+          </a:xfrm>
+        </p:spPr>
+        <p:txBody>
+          <a:bodyPr/>
+          <a:lstStyle/>
+          <a:p>
+            <a:r>
+              <a:rPr lang="en-US" b="1" dirty="0">
+                <a:solidFill>
+                  <a:srgbClr val="1B134C"/>
+                </a:solidFill>
+              </a:rPr>
+              <a:t>Project Overview</a:t>
+            </a:r>
+            <a:endParaRPr lang="en-IN" b="1" dirty="0">
+              <a:solidFill>
+                <a:srgbClr val="1B134C"/>
+              </a:solidFill>
+            </a:endParaRPr>
+          </a:p>
+        </p:txBody>
+      </p:sp>
+    </p:spTree>
+    <p:extLst>
+      <p:ext uri="{BB962C8B-B14F-4D97-AF65-F5344CB8AC3E}">
+        <p14:creationId xmlns:p14="http://schemas.microsoft.com/office/powerpoint/2010/main" val="3368749316"/>
+      </p:ext>
+    </p:extLst>
+  </p:cSld>
+  <p:clrMapOvr>
+    <a:masterClrMapping/>
+  </p:clrMapOvr>
+</p:sld>
+</file>
+
+<file path=ppt/slides/slide3.xml><?xml version="1.0" encoding="utf-8"?>
+<p:sld xmlns:a="http://schemas.openxmlformats.org/drawingml/2006/main" xmlns:r="http://schemas.openxmlformats.org/officeDocument/2006/relationships" xmlns:p="http://schemas.openxmlformats.org/presentationml/2006/main">
+  <p:cSld>
+    <p:spTree>
+      <p:nvGrpSpPr>
+        <p:cNvPr id="1" name="">
+          <a:extLst>
+            <a:ext uri="{FF2B5EF4-FFF2-40B4-BE49-F238E27FC236}">
+              <a16:creationId xmlns:a16="http://schemas.microsoft.com/office/drawing/2014/main" id="{346C5D6E-75BE-3BF8-DDFF-AEFFFAB726E9}"/>
+            </a:ext>
+          </a:extLst>
+        </p:cNvPr>
+        <p:cNvGrpSpPr/>
+        <p:nvPr/>
+      </p:nvGrpSpPr>
+      <p:grpSpPr>
+        <a:xfrm>
+          <a:off x="0" y="0"/>
+          <a:ext cx="0" cy="0"/>
+          <a:chOff x="0" y="0"/>
+          <a:chExt cx="0" cy="0"/>
+        </a:xfrm>
+      </p:grpSpPr>
+      <p:sp>
+        <p:nvSpPr>
+          <p:cNvPr id="5" name="Rectangle 4">
+            <a:extLst>
+              <a:ext uri="{FF2B5EF4-FFF2-40B4-BE49-F238E27FC236}">
+                <a16:creationId xmlns:a16="http://schemas.microsoft.com/office/drawing/2014/main" id="{D57251C9-50E1-D6E7-1A31-0100DAF93BD5}"/>
+              </a:ext>
+            </a:extLst>
+          </p:cNvPr>
+          <p:cNvSpPr/>
+          <p:nvPr/>
+        </p:nvSpPr>
+        <p:spPr>
+          <a:xfrm>
+            <a:off x="0" y="5871188"/>
+            <a:ext cx="3428206" cy="697405"/>
+          </a:xfrm>
+          <a:prstGeom prst="rect">
+            <a:avLst/>
+          </a:prstGeom>
+          <a:solidFill>
+            <a:schemeClr val="bg1"/>
+          </a:solidFill>
+          <a:ln>
+            <a:noFill/>
+          </a:ln>
+        </p:spPr>
+        <p:style>
+          <a:lnRef idx="2">
+            <a:schemeClr val="accent1">
+              <a:shade val="15000"/>
+            </a:schemeClr>
+          </a:lnRef>
+          <a:fillRef idx="1">
+            <a:schemeClr val="accent1"/>
+          </a:fillRef>
+          <a:effectRef idx="0">
+            <a:schemeClr val="accent1"/>
+          </a:effectRef>
+          <a:fontRef idx="minor">
+            <a:schemeClr val="lt1"/>
+          </a:fontRef>
+        </p:style>
+        <p:txBody>
+          <a:bodyPr rtlCol="0" anchor="ctr"/>
+          <a:lstStyle/>
+          <a:p>
+            <a:pPr algn="ctr"/>
+            <a:endParaRPr lang="en-US" sz="1100"/>
+          </a:p>
+        </p:txBody>
+      </p:sp>
+      <p:grpSp>
+        <p:nvGrpSpPr>
+          <p:cNvPr id="19" name="Group 18">
+            <a:extLst>
+              <a:ext uri="{FF2B5EF4-FFF2-40B4-BE49-F238E27FC236}">
+                <a16:creationId xmlns:a16="http://schemas.microsoft.com/office/drawing/2014/main" id="{5337761C-828E-FF7C-E1DA-E59A8E2AF68F}"/>
+              </a:ext>
+            </a:extLst>
+          </p:cNvPr>
+          <p:cNvGrpSpPr/>
+          <p:nvPr/>
+        </p:nvGrpSpPr>
+        <p:grpSpPr>
+          <a:xfrm>
+            <a:off x="732633" y="6026099"/>
+            <a:ext cx="4886323" cy="388987"/>
+            <a:chOff x="618333" y="6026099"/>
+            <a:chExt cx="4886323" cy="388987"/>
+          </a:xfrm>
+        </p:grpSpPr>
+        <p:sp>
+          <p:nvSpPr>
+            <p:cNvPr id="6" name="TextBox 5">
+              <a:extLst>
+                <a:ext uri="{FF2B5EF4-FFF2-40B4-BE49-F238E27FC236}">
+                  <a16:creationId xmlns:a16="http://schemas.microsoft.com/office/drawing/2014/main" id="{7B643686-7E6A-4CFC-EB4B-F0BC1CE50BFB}"/>
+                </a:ext>
+              </a:extLst>
+            </p:cNvPr>
+            <p:cNvSpPr txBox="1"/>
+            <p:nvPr/>
+          </p:nvSpPr>
+          <p:spPr>
+            <a:xfrm>
+              <a:off x="1123157" y="6050614"/>
+              <a:ext cx="4381499" cy="338554"/>
+            </a:xfrm>
+            <a:prstGeom prst="rect">
+              <a:avLst/>
+            </a:prstGeom>
+            <a:noFill/>
+          </p:spPr>
+          <p:txBody>
+            <a:bodyPr wrap="square" rtlCol="0">
+              <a:spAutoFit/>
+            </a:bodyPr>
+            <a:lstStyle/>
+            <a:p>
+              <a:r>
+                <a:rPr lang="en-US" sz="1600" dirty="0">
+                  <a:solidFill>
+                    <a:srgbClr val="1B134C"/>
+                  </a:solidFill>
+                  <a:latin typeface="Poppins" panose="00000500000000000000" pitchFamily="2" charset="0"/>
+                  <a:cs typeface="Poppins" panose="00000500000000000000" pitchFamily="2" charset="0"/>
+                </a:rPr>
+                <a:t>Wellness and Habit Tracker</a:t>
+              </a:r>
+            </a:p>
+          </p:txBody>
+        </p:sp>
+        <p:pic>
+          <p:nvPicPr>
+            <p:cNvPr id="8" name="Graphic 7">
+              <a:extLst>
+                <a:ext uri="{FF2B5EF4-FFF2-40B4-BE49-F238E27FC236}">
+                  <a16:creationId xmlns:a16="http://schemas.microsoft.com/office/drawing/2014/main" id="{DB8019E4-3052-E355-AC05-A6B236742CB6}"/>
+                </a:ext>
+              </a:extLst>
+            </p:cNvPr>
+            <p:cNvPicPr>
+              <a:picLocks noChangeAspect="1"/>
+            </p:cNvPicPr>
+            <p:nvPr/>
+          </p:nvPicPr>
+          <p:blipFill>
+            <a:blip r:embed="rId3">
+              <a:extLst>
+                <a:ext uri="{96DAC541-7B7A-43D3-8B79-37D633B846F1}">
+                  <asvg:svgBlip xmlns:asvg="http://schemas.microsoft.com/office/drawing/2016/SVG/main" r:embed="rId4"/>
+                </a:ext>
+              </a:extLst>
+            </a:blip>
+            <a:stretch>
+              <a:fillRect/>
+            </a:stretch>
+          </p:blipFill>
+          <p:spPr>
+            <a:xfrm>
+              <a:off x="618333" y="6026099"/>
+              <a:ext cx="353218" cy="388987"/>
+            </a:xfrm>
+            <a:prstGeom prst="rect">
+              <a:avLst/>
+            </a:prstGeom>
+          </p:spPr>
+        </p:pic>
+        <p:cxnSp>
+          <p:nvCxnSpPr>
+            <p:cNvPr id="10" name="Straight Connector 9">
+              <a:extLst>
+                <a:ext uri="{FF2B5EF4-FFF2-40B4-BE49-F238E27FC236}">
+                  <a16:creationId xmlns:a16="http://schemas.microsoft.com/office/drawing/2014/main" id="{0EA24FC2-CF6A-5B4D-1C5F-4C0CC5ABE0AB}"/>
+                </a:ext>
+              </a:extLst>
+            </p:cNvPr>
+            <p:cNvCxnSpPr/>
+            <p:nvPr/>
+          </p:nvCxnSpPr>
+          <p:spPr>
+            <a:xfrm>
+              <a:off x="1123157" y="6026099"/>
+              <a:ext cx="0" cy="388987"/>
+            </a:xfrm>
+            <a:prstGeom prst="line">
+              <a:avLst/>
+            </a:prstGeom>
+          </p:spPr>
+          <p:style>
+            <a:lnRef idx="3">
+              <a:schemeClr val="dk1"/>
+            </a:lnRef>
+            <a:fillRef idx="0">
+              <a:schemeClr val="dk1"/>
+            </a:fillRef>
+            <a:effectRef idx="2">
+              <a:schemeClr val="dk1"/>
+            </a:effectRef>
+            <a:fontRef idx="minor">
+              <a:schemeClr val="tx1"/>
+            </a:fontRef>
+          </p:style>
+        </p:cxnSp>
+      </p:grpSp>
+      <p:sp>
+        <p:nvSpPr>
+          <p:cNvPr id="2" name="Title 1">
+            <a:extLst>
+              <a:ext uri="{FF2B5EF4-FFF2-40B4-BE49-F238E27FC236}">
+                <a16:creationId xmlns:a16="http://schemas.microsoft.com/office/drawing/2014/main" id="{521F6D6A-E197-29F3-1EA1-0BF94C09290F}"/>
+              </a:ext>
+            </a:extLst>
+          </p:cNvPr>
+          <p:cNvSpPr>
+            <a:spLocks noGrp="1"/>
+          </p:cNvSpPr>
+          <p:nvPr>
+            <p:ph type="title"/>
+          </p:nvPr>
+        </p:nvSpPr>
+        <p:spPr>
+          <a:xfrm>
+            <a:off x="909242" y="346555"/>
+            <a:ext cx="2663887" cy="1325563"/>
+          </a:xfrm>
+        </p:spPr>
+        <p:txBody>
+          <a:bodyPr/>
+          <a:lstStyle/>
+          <a:p>
+            <a:r>
+              <a:rPr lang="en-IN" b="1" dirty="0">
+                <a:solidFill>
+                  <a:srgbClr val="1B134C"/>
+                </a:solidFill>
+              </a:rPr>
+              <a:t>Objectives</a:t>
+            </a:r>
+          </a:p>
+        </p:txBody>
+      </p:sp>
+      <p:sp>
+        <p:nvSpPr>
+          <p:cNvPr id="3" name="Content Placeholder 2">
+            <a:extLst>
+              <a:ext uri="{FF2B5EF4-FFF2-40B4-BE49-F238E27FC236}">
+                <a16:creationId xmlns:a16="http://schemas.microsoft.com/office/drawing/2014/main" id="{F46B76FB-61AB-C85D-8CD7-6F7AAE5EB4B9}"/>
+              </a:ext>
+            </a:extLst>
+          </p:cNvPr>
+          <p:cNvSpPr>
+            <a:spLocks noGrp="1"/>
+          </p:cNvSpPr>
+          <p:nvPr>
+            <p:ph idx="1"/>
+          </p:nvPr>
+        </p:nvSpPr>
+        <p:spPr>
+          <a:xfrm>
+            <a:off x="838200" y="1825625"/>
+            <a:ext cx="6136755" cy="4351338"/>
+          </a:xfrm>
+        </p:spPr>
+        <p:txBody>
+          <a:bodyPr/>
+          <a:lstStyle/>
+          <a:p>
+            <a:r>
+              <a:rPr lang="en-US" dirty="0"/>
+              <a:t>- Help users build and track healthy habits</a:t>
+            </a:r>
+          </a:p>
+          <a:p>
+            <a:r>
+              <a:rPr lang="en-US" dirty="0"/>
+              <a:t>- Log wellness metrics (sleep, water intake, steps, mood)</a:t>
+            </a:r>
+          </a:p>
+          <a:p>
+            <a:r>
+              <a:rPr lang="en-US" dirty="0"/>
+              <a:t>- Provide reminders and motivational nudges</a:t>
+            </a:r>
+          </a:p>
+          <a:p>
+            <a:r>
+              <a:rPr lang="en-US" dirty="0"/>
+              <a:t>- Offer insights and analytics for self-improvement</a:t>
+            </a:r>
+          </a:p>
+          <a:p>
+            <a:endParaRPr lang="en-IN" dirty="0"/>
+          </a:p>
+        </p:txBody>
+      </p:sp>
+      <p:sp>
+        <p:nvSpPr>
+          <p:cNvPr id="4" name="Rectangle 3">
+            <a:extLst>
+              <a:ext uri="{FF2B5EF4-FFF2-40B4-BE49-F238E27FC236}">
+                <a16:creationId xmlns:a16="http://schemas.microsoft.com/office/drawing/2014/main" id="{E494D0F1-EED2-7992-653B-F98AE914BBA5}"/>
               </a:ext>
             </a:extLst>
           </p:cNvPr>
@@ -7225,84 +8019,64 @@
           </a:p>
         </p:txBody>
       </p:sp>
-      <p:pic>
-        <p:nvPicPr>
-          <p:cNvPr id="4" name="Picture 3">
-            <a:extLst>
-              <a:ext uri="{FF2B5EF4-FFF2-40B4-BE49-F238E27FC236}">
-                <a16:creationId xmlns:a16="http://schemas.microsoft.com/office/drawing/2014/main" id="{65646BE6-0CBF-0110-471E-8EE1CD1A3C70}"/>
-              </a:ext>
-            </a:extLst>
-          </p:cNvPr>
-          <p:cNvPicPr>
-            <a:picLocks noChangeAspect="1"/>
-          </p:cNvPicPr>
+      <p:sp>
+        <p:nvSpPr>
+          <p:cNvPr id="7" name="Rectangle 6">
+            <a:extLst>
+              <a:ext uri="{FF2B5EF4-FFF2-40B4-BE49-F238E27FC236}">
+                <a16:creationId xmlns:a16="http://schemas.microsoft.com/office/drawing/2014/main" id="{1106AAF6-A9B3-60C8-52B6-87A6FC0EF3ED}"/>
+              </a:ext>
+            </a:extLst>
+          </p:cNvPr>
+          <p:cNvSpPr/>
           <p:nvPr/>
-        </p:nvPicPr>
-        <p:blipFill>
-          <a:blip r:embed="rId4">
-            <a:extLst>
-              <a:ext uri="{28A0092B-C50C-407E-A947-70E740481C1C}">
-                <a14:useLocalDpi xmlns:a14="http://schemas.microsoft.com/office/drawing/2010/main" val="0"/>
-              </a:ext>
-            </a:extLst>
-          </a:blip>
-          <a:stretch>
-            <a:fillRect/>
-          </a:stretch>
-        </p:blipFill>
+        </p:nvSpPr>
         <p:spPr>
           <a:xfrm>
-            <a:off x="7200313" y="1305711"/>
-            <a:ext cx="3705225" cy="3939766"/>
+            <a:off x="10877550" y="4914900"/>
+            <a:ext cx="1314450" cy="1943100"/>
           </a:xfrm>
           <a:prstGeom prst="rect">
             <a:avLst/>
           </a:prstGeom>
+          <a:solidFill>
+            <a:srgbClr val="F39E34"/>
+          </a:solidFill>
+          <a:ln>
+            <a:noFill/>
+          </a:ln>
         </p:spPr>
-      </p:pic>
-    </p:spTree>
-    <p:extLst>
-      <p:ext uri="{BB962C8B-B14F-4D97-AF65-F5344CB8AC3E}">
-        <p14:creationId xmlns:p14="http://schemas.microsoft.com/office/powerpoint/2010/main" val="3368749316"/>
-      </p:ext>
-    </p:extLst>
-  </p:cSld>
-  <p:clrMapOvr>
-    <a:masterClrMapping/>
-  </p:clrMapOvr>
-</p:sld>
-</file>
-
-<file path=ppt/slides/slide3.xml><?xml version="1.0" encoding="utf-8"?>
-<p:sld xmlns:a="http://schemas.openxmlformats.org/drawingml/2006/main" xmlns:r="http://schemas.openxmlformats.org/officeDocument/2006/relationships" xmlns:p="http://schemas.openxmlformats.org/presentationml/2006/main">
-  <p:cSld>
-    <p:spTree>
-      <p:nvGrpSpPr>
-        <p:cNvPr id="1" name="">
-          <a:extLst>
-            <a:ext uri="{FF2B5EF4-FFF2-40B4-BE49-F238E27FC236}">
-              <a16:creationId xmlns:a16="http://schemas.microsoft.com/office/drawing/2014/main" id="{2BB088F8-073A-5FCF-7308-2EC60CDF3639}"/>
-            </a:ext>
-          </a:extLst>
-        </p:cNvPr>
-        <p:cNvGrpSpPr/>
-        <p:nvPr/>
-      </p:nvGrpSpPr>
-      <p:grpSpPr>
-        <a:xfrm>
-          <a:off x="0" y="0"/>
-          <a:ext cx="0" cy="0"/>
-          <a:chOff x="0" y="0"/>
-          <a:chExt cx="0" cy="0"/>
-        </a:xfrm>
-      </p:grpSpPr>
-      <p:sp>
-        <p:nvSpPr>
-          <p:cNvPr id="10" name="Rectangle 9">
-            <a:extLst>
-              <a:ext uri="{FF2B5EF4-FFF2-40B4-BE49-F238E27FC236}">
-                <a16:creationId xmlns:a16="http://schemas.microsoft.com/office/drawing/2014/main" id="{C7DA5EEB-CE11-BB00-B36B-FA135219FC20}"/>
+        <p:style>
+          <a:lnRef idx="2">
+            <a:schemeClr val="accent1">
+              <a:shade val="15000"/>
+            </a:schemeClr>
+          </a:lnRef>
+          <a:fillRef idx="1">
+            <a:schemeClr val="accent1"/>
+          </a:fillRef>
+          <a:effectRef idx="0">
+            <a:schemeClr val="accent1"/>
+          </a:effectRef>
+          <a:fontRef idx="minor">
+            <a:schemeClr val="lt1"/>
+          </a:fontRef>
+        </p:style>
+        <p:txBody>
+          <a:bodyPr rtlCol="0" anchor="ctr"/>
+          <a:lstStyle/>
+          <a:p>
+            <a:pPr algn="ctr"/>
+            <a:endParaRPr lang="en-US"/>
+          </a:p>
+        </p:txBody>
+      </p:sp>
+      <p:sp>
+        <p:nvSpPr>
+          <p:cNvPr id="9" name="Rectangle 8">
+            <a:extLst>
+              <a:ext uri="{FF2B5EF4-FFF2-40B4-BE49-F238E27FC236}">
+                <a16:creationId xmlns:a16="http://schemas.microsoft.com/office/drawing/2014/main" id="{629065A2-3C51-AD22-7ACE-B8FDBF549A6F}"/>
               </a:ext>
             </a:extLst>
           </p:cNvPr>
@@ -7311,8 +8085,8 @@
         </p:nvSpPr>
         <p:spPr>
           <a:xfrm>
-            <a:off x="9464654" y="4399540"/>
-            <a:ext cx="2258446" cy="1994053"/>
+            <a:off x="9154635" y="4146701"/>
+            <a:ext cx="1260000" cy="1260000"/>
           </a:xfrm>
           <a:prstGeom prst="rect">
             <a:avLst/>
@@ -7360,38 +8134,180 @@
       </p:sp>
       <p:sp>
         <p:nvSpPr>
-          <p:cNvPr id="6" name="Rectangle 5">
-            <a:extLst>
-              <a:ext uri="{FF2B5EF4-FFF2-40B4-BE49-F238E27FC236}">
-                <a16:creationId xmlns:a16="http://schemas.microsoft.com/office/drawing/2014/main" id="{054C0A1B-AD10-EA61-F694-B86EA26ACD13}"/>
-              </a:ext>
-            </a:extLst>
-          </p:cNvPr>
-          <p:cNvSpPr/>
+          <p:cNvPr id="12" name="TextBox 11">
+            <a:extLst>
+              <a:ext uri="{FF2B5EF4-FFF2-40B4-BE49-F238E27FC236}">
+                <a16:creationId xmlns:a16="http://schemas.microsoft.com/office/drawing/2014/main" id="{597D2288-F56E-B8A8-95B4-C1FD640823CC}"/>
+              </a:ext>
+            </a:extLst>
+          </p:cNvPr>
+          <p:cNvSpPr txBox="1"/>
           <p:nvPr/>
         </p:nvSpPr>
         <p:spPr>
           <a:xfrm>
-            <a:off x="6687203" y="464407"/>
-            <a:ext cx="3776344" cy="3427557"/>
+            <a:off x="7448545" y="1955238"/>
+            <a:ext cx="2679080" cy="3157454"/>
           </a:xfrm>
           <a:prstGeom prst="rect">
             <a:avLst/>
           </a:prstGeom>
           <a:solidFill>
             <a:schemeClr val="accent1">
-              <a:lumMod val="50000"/>
+              <a:lumMod val="40000"/>
+              <a:lumOff val="60000"/>
             </a:schemeClr>
+          </a:solidFill>
+        </p:spPr>
+        <p:txBody>
+          <a:bodyPr wrap="square" rtlCol="0">
+            <a:spAutoFit/>
+          </a:bodyPr>
+          <a:lstStyle/>
+          <a:p>
+            <a:endParaRPr lang="en-IN" dirty="0"/>
+          </a:p>
+        </p:txBody>
+      </p:sp>
+      <p:pic>
+        <p:nvPicPr>
+          <p:cNvPr id="15" name="Picture 14">
+            <a:extLst>
+              <a:ext uri="{FF2B5EF4-FFF2-40B4-BE49-F238E27FC236}">
+                <a16:creationId xmlns:a16="http://schemas.microsoft.com/office/drawing/2014/main" id="{9FCE269C-D468-E36E-7837-F33A02A39BD9}"/>
+              </a:ext>
+            </a:extLst>
+          </p:cNvPr>
+          <p:cNvPicPr>
+            <a:picLocks noChangeAspect="1"/>
+          </p:cNvPicPr>
+          <p:nvPr/>
+        </p:nvPicPr>
+        <p:blipFill>
+          <a:blip r:embed="rId5">
+            <a:extLst>
+              <a:ext uri="{28A0092B-C50C-407E-A947-70E740481C1C}">
+                <a14:useLocalDpi xmlns:a14="http://schemas.microsoft.com/office/drawing/2010/main" val="0"/>
+              </a:ext>
+            </a:extLst>
+          </a:blip>
+          <a:stretch>
+            <a:fillRect/>
+          </a:stretch>
+        </p:blipFill>
+        <p:spPr>
+          <a:xfrm>
+            <a:off x="7737549" y="2366917"/>
+            <a:ext cx="2374883" cy="2374883"/>
+          </a:xfrm>
+          <a:prstGeom prst="rect">
+            <a:avLst/>
+          </a:prstGeom>
+        </p:spPr>
+      </p:pic>
+      <p:pic>
+        <p:nvPicPr>
+          <p:cNvPr id="16" name="Picture 15">
+            <a:extLst>
+              <a:ext uri="{FF2B5EF4-FFF2-40B4-BE49-F238E27FC236}">
+                <a16:creationId xmlns:a16="http://schemas.microsoft.com/office/drawing/2014/main" id="{845F8012-FC0F-C45D-1F0B-3853885B3CD7}"/>
+              </a:ext>
+            </a:extLst>
+          </p:cNvPr>
+          <p:cNvPicPr>
+            <a:picLocks noChangeAspect="1"/>
+          </p:cNvPicPr>
+          <p:nvPr/>
+        </p:nvPicPr>
+        <p:blipFill>
+          <a:blip r:embed="rId6"/>
+          <a:stretch>
+            <a:fillRect/>
+          </a:stretch>
+        </p:blipFill>
+        <p:spPr>
+          <a:xfrm>
+            <a:off x="7177082" y="1669092"/>
+            <a:ext cx="542925" cy="1647825"/>
+          </a:xfrm>
+          <a:prstGeom prst="rect">
+            <a:avLst/>
+          </a:prstGeom>
+          <a:effectLst>
+            <a:outerShdw blurRad="50800" dist="38100" dir="13500000" algn="br" rotWithShape="0">
+              <a:prstClr val="black">
+                <a:alpha val="40000"/>
+              </a:prstClr>
+            </a:outerShdw>
+          </a:effectLst>
+        </p:spPr>
+      </p:pic>
+    </p:spTree>
+    <p:extLst>
+      <p:ext uri="{BB962C8B-B14F-4D97-AF65-F5344CB8AC3E}">
+        <p14:creationId xmlns:p14="http://schemas.microsoft.com/office/powerpoint/2010/main" val="3018656531"/>
+      </p:ext>
+    </p:extLst>
+  </p:cSld>
+  <p:clrMapOvr>
+    <a:masterClrMapping/>
+  </p:clrMapOvr>
+</p:sld>
+</file>
+
+<file path=ppt/slides/slide4.xml><?xml version="1.0" encoding="utf-8"?>
+<p:sld xmlns:a="http://schemas.openxmlformats.org/drawingml/2006/main" xmlns:r="http://schemas.openxmlformats.org/officeDocument/2006/relationships" xmlns:p="http://schemas.openxmlformats.org/presentationml/2006/main">
+  <p:cSld>
+    <p:spTree>
+      <p:nvGrpSpPr>
+        <p:cNvPr id="1" name="">
+          <a:extLst>
+            <a:ext uri="{FF2B5EF4-FFF2-40B4-BE49-F238E27FC236}">
+              <a16:creationId xmlns:a16="http://schemas.microsoft.com/office/drawing/2014/main" id="{2BB088F8-073A-5FCF-7308-2EC60CDF3639}"/>
+            </a:ext>
+          </a:extLst>
+        </p:cNvPr>
+        <p:cNvGrpSpPr/>
+        <p:nvPr/>
+      </p:nvGrpSpPr>
+      <p:grpSpPr>
+        <a:xfrm>
+          <a:off x="0" y="0"/>
+          <a:ext cx="0" cy="0"/>
+          <a:chOff x="0" y="0"/>
+          <a:chExt cx="0" cy="0"/>
+        </a:xfrm>
+      </p:grpSpPr>
+      <p:sp>
+        <p:nvSpPr>
+          <p:cNvPr id="10" name="Rectangle 9">
+            <a:extLst>
+              <a:ext uri="{FF2B5EF4-FFF2-40B4-BE49-F238E27FC236}">
+                <a16:creationId xmlns:a16="http://schemas.microsoft.com/office/drawing/2014/main" id="{C7DA5EEB-CE11-BB00-B36B-FA135219FC20}"/>
+              </a:ext>
+            </a:extLst>
+          </p:cNvPr>
+          <p:cNvSpPr/>
+          <p:nvPr/>
+        </p:nvSpPr>
+        <p:spPr>
+          <a:xfrm>
+            <a:off x="9637391" y="4233126"/>
+            <a:ext cx="1994400" cy="1994053"/>
+          </a:xfrm>
+          <a:prstGeom prst="rect">
+            <a:avLst/>
+          </a:prstGeom>
+          <a:solidFill>
+            <a:schemeClr val="accent4"/>
           </a:solidFill>
           <a:ln>
             <a:solidFill>
-              <a:schemeClr val="accent1">
-                <a:lumMod val="75000"/>
-              </a:schemeClr>
+              <a:schemeClr val="accent4"/>
             </a:solidFill>
           </a:ln>
           <a:effectLst>
-            <a:outerShdw blurRad="50800" dist="38100" dir="10800000" algn="r" rotWithShape="0">
+            <a:outerShdw blurRad="50800" dist="38100" dir="2700000" algn="tl" rotWithShape="0">
               <a:prstClr val="black">
                 <a:alpha val="40000"/>
               </a:prstClr>
@@ -7419,59 +8335,7 @@
           <a:lstStyle/>
           <a:p>
             <a:pPr algn="ctr"/>
-            <a:endParaRPr lang="en-US" dirty="0"/>
-          </a:p>
-        </p:txBody>
-      </p:sp>
-      <p:sp>
-        <p:nvSpPr>
-          <p:cNvPr id="8" name="TextBox 7">
-            <a:extLst>
-              <a:ext uri="{FF2B5EF4-FFF2-40B4-BE49-F238E27FC236}">
-                <a16:creationId xmlns:a16="http://schemas.microsoft.com/office/drawing/2014/main" id="{7BCCEC3B-C0D3-843C-32F3-72780EA21026}"/>
-              </a:ext>
-            </a:extLst>
-          </p:cNvPr>
-          <p:cNvSpPr txBox="1"/>
-          <p:nvPr/>
-        </p:nvSpPr>
-        <p:spPr>
-          <a:xfrm>
-            <a:off x="1073812" y="140271"/>
-            <a:ext cx="4381499" cy="596766"/>
-          </a:xfrm>
-          <a:prstGeom prst="rect">
-            <a:avLst/>
-          </a:prstGeom>
-          <a:noFill/>
-        </p:spPr>
-        <p:txBody>
-          <a:bodyPr wrap="square" lIns="91440" tIns="45720" rIns="91440" bIns="45720" rtlCol="0" anchor="t">
-            <a:spAutoFit/>
-          </a:bodyPr>
-          <a:lstStyle/>
-          <a:p>
-            <a:pPr>
-              <a:lnSpc>
-                <a:spcPct val="70000"/>
-              </a:lnSpc>
-            </a:pPr>
-            <a:r>
-              <a:rPr lang="en-US" sz="4400" b="1" spc="-300" dirty="0">
-                <a:solidFill>
-                  <a:srgbClr val="1B134C"/>
-                </a:solidFill>
-                <a:latin typeface="Calibri"/>
-                <a:ea typeface="Calibri"/>
-                <a:cs typeface="Calibri"/>
-              </a:rPr>
-              <a:t>Architecture</a:t>
-            </a:r>
-            <a:endParaRPr lang="en-US" b="1" dirty="0">
-              <a:solidFill>
-                <a:srgbClr val="1B134C"/>
-              </a:solidFill>
-            </a:endParaRPr>
+            <a:endParaRPr lang="en-US"/>
           </a:p>
         </p:txBody>
       </p:sp>
@@ -7562,8 +8426,8 @@
         </p:nvSpPr>
         <p:spPr>
           <a:xfrm>
-            <a:off x="1051748" y="623546"/>
-            <a:ext cx="5206665" cy="5986254"/>
+            <a:off x="983907" y="694505"/>
+            <a:ext cx="6042382" cy="6117059"/>
           </a:xfrm>
           <a:prstGeom prst="rect">
             <a:avLst/>
@@ -7579,228 +8443,182 @@
           <a:lstStyle/>
           <a:p>
             <a:r>
-              <a:rPr lang="en-US" sz="1200" dirty="0" err="1"/>
+              <a:rPr lang="en-US" sz="1400" dirty="0" err="1"/>
               <a:t>wellness_habit_tracker</a:t>
             </a:r>
             <a:r>
-              <a:rPr lang="en-US" sz="1200" dirty="0"/>
+              <a:rPr lang="en-US" sz="1400" dirty="0"/>
               <a:t>/</a:t>
             </a:r>
           </a:p>
           <a:p>
             <a:r>
-              <a:rPr lang="en-US" sz="1200" dirty="0"/>
+              <a:rPr lang="en-US" sz="1400" dirty="0"/>
               <a:t>│── app/</a:t>
             </a:r>
           </a:p>
           <a:p>
             <a:r>
-              <a:rPr lang="en-US" sz="1200" dirty="0"/>
+              <a:rPr lang="en-US" sz="1400" dirty="0"/>
               <a:t>│   │── main.py                 # </a:t>
             </a:r>
             <a:r>
-              <a:rPr lang="en-US" sz="1200" dirty="0" err="1"/>
+              <a:rPr lang="en-US" sz="1400" dirty="0" err="1"/>
               <a:t>FastAPI</a:t>
             </a:r>
             <a:r>
-              <a:rPr lang="en-US" sz="1200" dirty="0"/>
+              <a:rPr lang="en-US" sz="1400" dirty="0"/>
               <a:t> entry point</a:t>
             </a:r>
           </a:p>
           <a:p>
             <a:r>
-              <a:rPr lang="en-US" sz="1200" dirty="0"/>
+              <a:rPr lang="en-US" sz="1400" dirty="0"/>
               <a:t>│   │── database.py             # MongoDB connection (Motor client)</a:t>
             </a:r>
           </a:p>
           <a:p>
             <a:r>
-              <a:rPr lang="en-US" sz="1200" dirty="0"/>
-              <a:t>│   │── celery_worker.py        # Celery app (for reminders/notifications)</a:t>
-            </a:r>
-          </a:p>
-          <a:p>
-            <a:r>
-              <a:rPr lang="en-US" sz="1200" dirty="0"/>
+              <a:rPr lang="en-US" sz="1400" dirty="0"/>
               <a:t>│   │</a:t>
             </a:r>
           </a:p>
           <a:p>
             <a:r>
-              <a:rPr lang="en-US" sz="1200" dirty="0"/>
-              <a:t>│   ├── models/                 # </a:t>
-            </a:r>
-            <a:r>
-              <a:rPr lang="en-US" sz="1200" dirty="0" err="1"/>
+              <a:rPr lang="en-US" sz="1400" dirty="0"/>
+              <a:t>│   |── models/                 # </a:t>
+            </a:r>
+            <a:r>
+              <a:rPr lang="en-US" sz="1400" dirty="0" err="1"/>
               <a:t>Pydantic</a:t>
             </a:r>
             <a:r>
-              <a:rPr lang="en-US" sz="1200" dirty="0"/>
+              <a:rPr lang="en-US" sz="1400" dirty="0"/>
               <a:t> models (schemas)</a:t>
             </a:r>
           </a:p>
           <a:p>
             <a:r>
-              <a:rPr lang="en-US" sz="1200" dirty="0"/>
+              <a:rPr lang="en-US" sz="1400" dirty="0"/>
               <a:t>│   │   │── user.py             # User schemas</a:t>
             </a:r>
           </a:p>
           <a:p>
             <a:r>
-              <a:rPr lang="en-US" sz="1200" dirty="0"/>
+              <a:rPr lang="en-US" sz="1400" dirty="0"/>
               <a:t>│   │   │── habit.py            # Habit schemas</a:t>
             </a:r>
           </a:p>
           <a:p>
             <a:r>
-              <a:rPr lang="en-US" sz="1200" dirty="0"/>
+              <a:rPr lang="en-US" sz="1400" dirty="0"/>
               <a:t>│   │   │── wellness.py         # Wellness log schemas</a:t>
             </a:r>
           </a:p>
           <a:p>
             <a:r>
-              <a:rPr lang="en-US" sz="1200" dirty="0"/>
+              <a:rPr lang="en-US" sz="1400" dirty="0"/>
               <a:t>│   │   │── reminder.py         # Reminder schemas</a:t>
             </a:r>
           </a:p>
           <a:p>
             <a:r>
-              <a:rPr lang="en-US" sz="1200" dirty="0"/>
+              <a:rPr lang="en-US" sz="1400" dirty="0"/>
               <a:t>│   │</a:t>
             </a:r>
           </a:p>
           <a:p>
             <a:r>
-              <a:rPr lang="en-US" sz="1200" dirty="0"/>
-              <a:t>│   ├── routes/                 # API endpoints</a:t>
-            </a:r>
-          </a:p>
-          <a:p>
-            <a:r>
-              <a:rPr lang="en-US" sz="1200" dirty="0"/>
+              <a:rPr lang="en-US" sz="1400" dirty="0"/>
+              <a:t>│   |── routes/                 # API endpoints</a:t>
+            </a:r>
+          </a:p>
+          <a:p>
+            <a:r>
+              <a:rPr lang="en-US" sz="1400" dirty="0"/>
               <a:t>│   │   │── auth.py             # Register, login, logout</a:t>
             </a:r>
           </a:p>
           <a:p>
             <a:r>
-              <a:rPr lang="en-US" sz="1200" dirty="0"/>
+              <a:rPr lang="en-US" sz="1400" dirty="0"/>
               <a:t>│   │   │── users.py            # User profile, update profile, change password</a:t>
             </a:r>
           </a:p>
           <a:p>
             <a:r>
-              <a:rPr lang="en-US" sz="1200" dirty="0"/>
+              <a:rPr lang="en-US" sz="1400" dirty="0"/>
               <a:t>│   │   │── habits.py           # Habit CRUD + logging</a:t>
             </a:r>
           </a:p>
           <a:p>
             <a:r>
-              <a:rPr lang="en-US" sz="1200" dirty="0"/>
+              <a:rPr lang="en-US" sz="1400" dirty="0"/>
               <a:t>│   │   │── wellness.py         # Wellness logging CRUD</a:t>
             </a:r>
           </a:p>
           <a:p>
             <a:r>
-              <a:rPr lang="en-US" sz="1200" dirty="0"/>
+              <a:rPr lang="en-US" sz="1400" dirty="0"/>
               <a:t>│   │   │── reminders.py        # Reminder CRUD</a:t>
             </a:r>
           </a:p>
           <a:p>
             <a:r>
-              <a:rPr lang="en-US" sz="1200" dirty="0"/>
+              <a:rPr lang="en-US" sz="1400" dirty="0"/>
               <a:t>│   │   │── analytics.py        # Analytics/insights endpoints</a:t>
             </a:r>
           </a:p>
           <a:p>
             <a:r>
-              <a:rPr lang="en-US" sz="1200" dirty="0"/>
+              <a:rPr lang="en-US" sz="1400" dirty="0"/>
               <a:t>│   │</a:t>
             </a:r>
           </a:p>
           <a:p>
             <a:r>
-              <a:rPr lang="en-US" sz="1200" dirty="0"/>
-              <a:t>│   ├── utils/                  # Helper utilities</a:t>
-            </a:r>
-          </a:p>
-          <a:p>
-            <a:r>
-              <a:rPr lang="en-US" sz="1200" dirty="0"/>
+              <a:rPr lang="en-US" sz="1400" dirty="0"/>
+              <a:t>│   |── utils/                  # Helper utilities</a:t>
+            </a:r>
+          </a:p>
+          <a:p>
+            <a:r>
+              <a:rPr lang="en-US" sz="1400" dirty="0"/>
               <a:t>│   │   │── security.py         # JWT utils, password hashing utils</a:t>
             </a:r>
           </a:p>
           <a:p>
             <a:r>
-              <a:rPr lang="en-US" sz="1200" dirty="0"/>
-              <a:t>│   │   │── scheduler.py        # Celery tasks, background jobs</a:t>
-            </a:r>
-          </a:p>
-          <a:p>
-            <a:r>
-              <a:rPr lang="en-US" sz="1200" dirty="0"/>
+              <a:rPr lang="en-US" sz="1400" dirty="0"/>
               <a:t>│   │   │── mongo_helper.py           # Logging config</a:t>
             </a:r>
           </a:p>
           <a:p>
             <a:r>
-              <a:rPr lang="en-US" sz="1200" dirty="0"/>
+              <a:rPr lang="en-US" sz="1400" dirty="0"/>
               <a:t>│   │</a:t>
             </a:r>
           </a:p>
           <a:p>
             <a:r>
-              <a:rPr lang="en-US" sz="1200" dirty="0"/>
-              <a:t>│</a:t>
-            </a:r>
-          </a:p>
-          <a:p>
-            <a:r>
-              <a:rPr lang="en-US" sz="1200" dirty="0"/>
+              <a:rPr lang="en-US" sz="1400" dirty="0"/>
               <a:t>│── requirements.txt            # All dependencies</a:t>
             </a:r>
           </a:p>
           <a:p>
             <a:r>
-              <a:rPr lang="en-US" sz="1200" dirty="0"/>
+              <a:rPr lang="en-US" sz="1400" dirty="0"/>
               <a:t>│── .env                        # Environment variables (DB URI, JWT secret, etc.)</a:t>
             </a:r>
           </a:p>
           <a:p>
             <a:r>
-              <a:rPr lang="en-US" sz="1200" dirty="0"/>
-              <a:t>│── </a:t>
-            </a:r>
-            <a:r>
-              <a:rPr lang="en-US" sz="1200" dirty="0" err="1"/>
-              <a:t>Dockerfile</a:t>
-            </a:r>
-            <a:r>
-              <a:rPr lang="en-US" sz="1200" dirty="0"/>
-              <a:t>                  # For containerization</a:t>
-            </a:r>
-          </a:p>
-          <a:p>
-            <a:r>
-              <a:rPr lang="en-US" sz="1200" dirty="0"/>
-              <a:t>│── docker-</a:t>
-            </a:r>
-            <a:r>
-              <a:rPr lang="en-US" sz="1200" dirty="0" err="1"/>
-              <a:t>compose.yml</a:t>
-            </a:r>
-            <a:r>
-              <a:rPr lang="en-US" sz="1200" dirty="0"/>
-              <a:t>          # (optional) MongoDB + Redis + App setup</a:t>
-            </a:r>
-          </a:p>
-          <a:p>
-            <a:r>
-              <a:rPr lang="en-US" sz="1200" dirty="0"/>
+              <a:rPr lang="en-US" sz="1400" dirty="0"/>
               <a:t>│── README.md                   # Project documentation</a:t>
             </a:r>
           </a:p>
           <a:p>
-            <a:endParaRPr lang="en-US" sz="1100" dirty="0"/>
+            <a:endParaRPr lang="en-US" sz="1400" dirty="0"/>
           </a:p>
         </p:txBody>
       </p:sp>
@@ -7938,48 +8756,12 @@
           </p:style>
         </p:cxnSp>
       </p:grpSp>
-    </p:spTree>
-    <p:extLst>
-      <p:ext uri="{BB962C8B-B14F-4D97-AF65-F5344CB8AC3E}">
-        <p14:creationId xmlns:p14="http://schemas.microsoft.com/office/powerpoint/2010/main" val="2853014144"/>
-      </p:ext>
-    </p:extLst>
-  </p:cSld>
-  <p:clrMapOvr>
-    <a:masterClrMapping/>
-  </p:clrMapOvr>
-</p:sld>
-</file>
-
-<file path=ppt/slides/slide4.xml><?xml version="1.0" encoding="utf-8"?>
-<p:sld xmlns:a="http://schemas.openxmlformats.org/drawingml/2006/main" xmlns:r="http://schemas.openxmlformats.org/officeDocument/2006/relationships" xmlns:p="http://schemas.openxmlformats.org/presentationml/2006/main">
-  <p:cSld>
-    <p:spTree>
-      <p:nvGrpSpPr>
-        <p:cNvPr id="1" name="">
-          <a:extLst>
-            <a:ext uri="{FF2B5EF4-FFF2-40B4-BE49-F238E27FC236}">
-              <a16:creationId xmlns:a16="http://schemas.microsoft.com/office/drawing/2014/main" id="{346C5D6E-75BE-3BF8-DDFF-AEFFFAB726E9}"/>
-            </a:ext>
-          </a:extLst>
-        </p:cNvPr>
-        <p:cNvGrpSpPr/>
-        <p:nvPr/>
-      </p:nvGrpSpPr>
-      <p:grpSpPr>
-        <a:xfrm>
-          <a:off x="0" y="0"/>
-          <a:ext cx="0" cy="0"/>
-          <a:chOff x="0" y="0"/>
-          <a:chExt cx="0" cy="0"/>
-        </a:xfrm>
-      </p:grpSpPr>
-      <p:sp>
-        <p:nvSpPr>
-          <p:cNvPr id="5" name="Rectangle 4">
-            <a:extLst>
-              <a:ext uri="{FF2B5EF4-FFF2-40B4-BE49-F238E27FC236}">
-                <a16:creationId xmlns:a16="http://schemas.microsoft.com/office/drawing/2014/main" id="{D57251C9-50E1-D6E7-1A31-0100DAF93BD5}"/>
+      <p:sp>
+        <p:nvSpPr>
+          <p:cNvPr id="6" name="Rectangle 5">
+            <a:extLst>
+              <a:ext uri="{FF2B5EF4-FFF2-40B4-BE49-F238E27FC236}">
+                <a16:creationId xmlns:a16="http://schemas.microsoft.com/office/drawing/2014/main" id="{054C0A1B-AD10-EA61-F694-B86EA26ACD13}"/>
               </a:ext>
             </a:extLst>
           </p:cNvPr>
@@ -7988,280 +8770,8 @@
         </p:nvSpPr>
         <p:spPr>
           <a:xfrm>
-            <a:off x="0" y="5871188"/>
-            <a:ext cx="3428206" cy="697405"/>
-          </a:xfrm>
-          <a:prstGeom prst="rect">
-            <a:avLst/>
-          </a:prstGeom>
-          <a:solidFill>
-            <a:schemeClr val="bg1"/>
-          </a:solidFill>
-          <a:ln>
-            <a:noFill/>
-          </a:ln>
-        </p:spPr>
-        <p:style>
-          <a:lnRef idx="2">
-            <a:schemeClr val="accent1">
-              <a:shade val="15000"/>
-            </a:schemeClr>
-          </a:lnRef>
-          <a:fillRef idx="1">
-            <a:schemeClr val="accent1"/>
-          </a:fillRef>
-          <a:effectRef idx="0">
-            <a:schemeClr val="accent1"/>
-          </a:effectRef>
-          <a:fontRef idx="minor">
-            <a:schemeClr val="lt1"/>
-          </a:fontRef>
-        </p:style>
-        <p:txBody>
-          <a:bodyPr rtlCol="0" anchor="ctr"/>
-          <a:lstStyle/>
-          <a:p>
-            <a:pPr algn="ctr"/>
-            <a:endParaRPr lang="en-US" sz="1100"/>
-          </a:p>
-        </p:txBody>
-      </p:sp>
-      <p:grpSp>
-        <p:nvGrpSpPr>
-          <p:cNvPr id="19" name="Group 18">
-            <a:extLst>
-              <a:ext uri="{FF2B5EF4-FFF2-40B4-BE49-F238E27FC236}">
-                <a16:creationId xmlns:a16="http://schemas.microsoft.com/office/drawing/2014/main" id="{5337761C-828E-FF7C-E1DA-E59A8E2AF68F}"/>
-              </a:ext>
-            </a:extLst>
-          </p:cNvPr>
-          <p:cNvGrpSpPr/>
-          <p:nvPr/>
-        </p:nvGrpSpPr>
-        <p:grpSpPr>
-          <a:xfrm>
-            <a:off x="732633" y="6026099"/>
-            <a:ext cx="4886323" cy="388987"/>
-            <a:chOff x="618333" y="6026099"/>
-            <a:chExt cx="4886323" cy="388987"/>
-          </a:xfrm>
-        </p:grpSpPr>
-        <p:sp>
-          <p:nvSpPr>
-            <p:cNvPr id="6" name="TextBox 5">
-              <a:extLst>
-                <a:ext uri="{FF2B5EF4-FFF2-40B4-BE49-F238E27FC236}">
-                  <a16:creationId xmlns:a16="http://schemas.microsoft.com/office/drawing/2014/main" id="{7B643686-7E6A-4CFC-EB4B-F0BC1CE50BFB}"/>
-                </a:ext>
-              </a:extLst>
-            </p:cNvPr>
-            <p:cNvSpPr txBox="1"/>
-            <p:nvPr/>
-          </p:nvSpPr>
-          <p:spPr>
-            <a:xfrm>
-              <a:off x="1123157" y="6050614"/>
-              <a:ext cx="4381499" cy="338554"/>
-            </a:xfrm>
-            <a:prstGeom prst="rect">
-              <a:avLst/>
-            </a:prstGeom>
-            <a:noFill/>
-          </p:spPr>
-          <p:txBody>
-            <a:bodyPr wrap="square" rtlCol="0">
-              <a:spAutoFit/>
-            </a:bodyPr>
-            <a:lstStyle/>
-            <a:p>
-              <a:r>
-                <a:rPr lang="en-US" sz="1600" dirty="0">
-                  <a:solidFill>
-                    <a:srgbClr val="1B134C"/>
-                  </a:solidFill>
-                  <a:latin typeface="Poppins" panose="00000500000000000000" pitchFamily="2" charset="0"/>
-                  <a:cs typeface="Poppins" panose="00000500000000000000" pitchFamily="2" charset="0"/>
-                </a:rPr>
-                <a:t>Wellness and Habit Tracker</a:t>
-              </a:r>
-            </a:p>
-          </p:txBody>
-        </p:sp>
-        <p:pic>
-          <p:nvPicPr>
-            <p:cNvPr id="8" name="Graphic 7">
-              <a:extLst>
-                <a:ext uri="{FF2B5EF4-FFF2-40B4-BE49-F238E27FC236}">
-                  <a16:creationId xmlns:a16="http://schemas.microsoft.com/office/drawing/2014/main" id="{DB8019E4-3052-E355-AC05-A6B236742CB6}"/>
-                </a:ext>
-              </a:extLst>
-            </p:cNvPr>
-            <p:cNvPicPr>
-              <a:picLocks noChangeAspect="1"/>
-            </p:cNvPicPr>
-            <p:nvPr/>
-          </p:nvPicPr>
-          <p:blipFill>
-            <a:blip r:embed="rId3">
-              <a:extLst>
-                <a:ext uri="{96DAC541-7B7A-43D3-8B79-37D633B846F1}">
-                  <asvg:svgBlip xmlns:asvg="http://schemas.microsoft.com/office/drawing/2016/SVG/main" r:embed="rId4"/>
-                </a:ext>
-              </a:extLst>
-            </a:blip>
-            <a:stretch>
-              <a:fillRect/>
-            </a:stretch>
-          </p:blipFill>
-          <p:spPr>
-            <a:xfrm>
-              <a:off x="618333" y="6026099"/>
-              <a:ext cx="353218" cy="388987"/>
-            </a:xfrm>
-            <a:prstGeom prst="rect">
-              <a:avLst/>
-            </a:prstGeom>
-          </p:spPr>
-        </p:pic>
-        <p:cxnSp>
-          <p:nvCxnSpPr>
-            <p:cNvPr id="10" name="Straight Connector 9">
-              <a:extLst>
-                <a:ext uri="{FF2B5EF4-FFF2-40B4-BE49-F238E27FC236}">
-                  <a16:creationId xmlns:a16="http://schemas.microsoft.com/office/drawing/2014/main" id="{0EA24FC2-CF6A-5B4D-1C5F-4C0CC5ABE0AB}"/>
-                </a:ext>
-              </a:extLst>
-            </p:cNvPr>
-            <p:cNvCxnSpPr/>
-            <p:nvPr/>
-          </p:nvCxnSpPr>
-          <p:spPr>
-            <a:xfrm>
-              <a:off x="1123157" y="6026099"/>
-              <a:ext cx="0" cy="388987"/>
-            </a:xfrm>
-            <a:prstGeom prst="line">
-              <a:avLst/>
-            </a:prstGeom>
-          </p:spPr>
-          <p:style>
-            <a:lnRef idx="3">
-              <a:schemeClr val="dk1"/>
-            </a:lnRef>
-            <a:fillRef idx="0">
-              <a:schemeClr val="dk1"/>
-            </a:fillRef>
-            <a:effectRef idx="2">
-              <a:schemeClr val="dk1"/>
-            </a:effectRef>
-            <a:fontRef idx="minor">
-              <a:schemeClr val="tx1"/>
-            </a:fontRef>
-          </p:style>
-        </p:cxnSp>
-      </p:grpSp>
-      <p:sp>
-        <p:nvSpPr>
-          <p:cNvPr id="2" name="Title 1">
-            <a:extLst>
-              <a:ext uri="{FF2B5EF4-FFF2-40B4-BE49-F238E27FC236}">
-                <a16:creationId xmlns:a16="http://schemas.microsoft.com/office/drawing/2014/main" id="{521F6D6A-E197-29F3-1EA1-0BF94C09290F}"/>
-              </a:ext>
-            </a:extLst>
-          </p:cNvPr>
-          <p:cNvSpPr>
-            <a:spLocks noGrp="1"/>
-          </p:cNvSpPr>
-          <p:nvPr>
-            <p:ph type="title"/>
-          </p:nvPr>
-        </p:nvSpPr>
-        <p:spPr/>
-        <p:txBody>
-          <a:bodyPr/>
-          <a:lstStyle/>
-          <a:p>
-            <a:r>
-              <a:rPr lang="en-IN" b="1" dirty="0">
-                <a:solidFill>
-                  <a:srgbClr val="1B134C"/>
-                </a:solidFill>
-              </a:rPr>
-              <a:t>Objectives</a:t>
-            </a:r>
-          </a:p>
-        </p:txBody>
-      </p:sp>
-      <p:sp>
-        <p:nvSpPr>
-          <p:cNvPr id="3" name="Content Placeholder 2">
-            <a:extLst>
-              <a:ext uri="{FF2B5EF4-FFF2-40B4-BE49-F238E27FC236}">
-                <a16:creationId xmlns:a16="http://schemas.microsoft.com/office/drawing/2014/main" id="{F46B76FB-61AB-C85D-8CD7-6F7AAE5EB4B9}"/>
-              </a:ext>
-            </a:extLst>
-          </p:cNvPr>
-          <p:cNvSpPr>
-            <a:spLocks noGrp="1"/>
-          </p:cNvSpPr>
-          <p:nvPr>
-            <p:ph idx="1"/>
-          </p:nvPr>
-        </p:nvSpPr>
-        <p:spPr>
-          <a:xfrm>
-            <a:off x="838200" y="1825625"/>
-            <a:ext cx="6136755" cy="4351338"/>
-          </a:xfrm>
-        </p:spPr>
-        <p:txBody>
-          <a:bodyPr/>
-          <a:lstStyle/>
-          <a:p>
-            <a:r>
-              <a:rPr lang="en-US" dirty="0"/>
-              <a:t>- Help users build and track healthy habits</a:t>
-            </a:r>
-          </a:p>
-          <a:p>
-            <a:r>
-              <a:rPr lang="en-US" dirty="0"/>
-              <a:t>- Log wellness metrics (sleep, water intake, steps, mood)</a:t>
-            </a:r>
-          </a:p>
-          <a:p>
-            <a:r>
-              <a:rPr lang="en-US" dirty="0"/>
-              <a:t>- Provide reminders and motivational nudges</a:t>
-            </a:r>
-          </a:p>
-          <a:p>
-            <a:r>
-              <a:rPr lang="en-US" dirty="0"/>
-              <a:t>- Offer insights and analytics for self-improvement</a:t>
-            </a:r>
-          </a:p>
-          <a:p>
-            <a:endParaRPr lang="en-IN" dirty="0"/>
-          </a:p>
-        </p:txBody>
-      </p:sp>
-      <p:sp>
-        <p:nvSpPr>
-          <p:cNvPr id="4" name="Rectangle 3">
-            <a:extLst>
-              <a:ext uri="{FF2B5EF4-FFF2-40B4-BE49-F238E27FC236}">
-                <a16:creationId xmlns:a16="http://schemas.microsoft.com/office/drawing/2014/main" id="{E494D0F1-EED2-7992-653B-F98AE914BBA5}"/>
-              </a:ext>
-            </a:extLst>
-          </p:cNvPr>
-          <p:cNvSpPr/>
-          <p:nvPr/>
-        </p:nvSpPr>
-        <p:spPr>
-          <a:xfrm>
-            <a:off x="0" y="0"/>
-            <a:ext cx="542925" cy="1647826"/>
+            <a:off x="7158299" y="842366"/>
+            <a:ext cx="543600" cy="1648800"/>
           </a:xfrm>
           <a:prstGeom prst="rect">
             <a:avLst/>
@@ -8270,112 +8780,8 @@
             <a:srgbClr val="23AAAD"/>
           </a:solidFill>
           <a:ln>
-            <a:noFill/>
-          </a:ln>
-        </p:spPr>
-        <p:style>
-          <a:lnRef idx="2">
-            <a:schemeClr val="accent1">
-              <a:shade val="15000"/>
-            </a:schemeClr>
-          </a:lnRef>
-          <a:fillRef idx="1">
-            <a:schemeClr val="accent1"/>
-          </a:fillRef>
-          <a:effectRef idx="0">
-            <a:schemeClr val="accent1"/>
-          </a:effectRef>
-          <a:fontRef idx="minor">
-            <a:schemeClr val="lt1"/>
-          </a:fontRef>
-        </p:style>
-        <p:txBody>
-          <a:bodyPr rtlCol="0" anchor="ctr"/>
-          <a:lstStyle/>
-          <a:p>
-            <a:pPr algn="ctr"/>
-            <a:endParaRPr lang="en-US"/>
-          </a:p>
-        </p:txBody>
-      </p:sp>
-      <p:sp>
-        <p:nvSpPr>
-          <p:cNvPr id="7" name="Rectangle 6">
-            <a:extLst>
-              <a:ext uri="{FF2B5EF4-FFF2-40B4-BE49-F238E27FC236}">
-                <a16:creationId xmlns:a16="http://schemas.microsoft.com/office/drawing/2014/main" id="{1106AAF6-A9B3-60C8-52B6-87A6FC0EF3ED}"/>
-              </a:ext>
-            </a:extLst>
-          </p:cNvPr>
-          <p:cNvSpPr/>
-          <p:nvPr/>
-        </p:nvSpPr>
-        <p:spPr>
-          <a:xfrm>
-            <a:off x="10877550" y="4914900"/>
-            <a:ext cx="1314450" cy="1943100"/>
-          </a:xfrm>
-          <a:prstGeom prst="rect">
-            <a:avLst/>
-          </a:prstGeom>
-          <a:solidFill>
-            <a:srgbClr val="F39E34"/>
-          </a:solidFill>
-          <a:ln>
-            <a:noFill/>
-          </a:ln>
-        </p:spPr>
-        <p:style>
-          <a:lnRef idx="2">
-            <a:schemeClr val="accent1">
-              <a:shade val="15000"/>
-            </a:schemeClr>
-          </a:lnRef>
-          <a:fillRef idx="1">
-            <a:schemeClr val="accent1"/>
-          </a:fillRef>
-          <a:effectRef idx="0">
-            <a:schemeClr val="accent1"/>
-          </a:effectRef>
-          <a:fontRef idx="minor">
-            <a:schemeClr val="lt1"/>
-          </a:fontRef>
-        </p:style>
-        <p:txBody>
-          <a:bodyPr rtlCol="0" anchor="ctr"/>
-          <a:lstStyle/>
-          <a:p>
-            <a:pPr algn="ctr"/>
-            <a:endParaRPr lang="en-US"/>
-          </a:p>
-        </p:txBody>
-      </p:sp>
-      <p:sp>
-        <p:nvSpPr>
-          <p:cNvPr id="9" name="Rectangle 8">
-            <a:extLst>
-              <a:ext uri="{FF2B5EF4-FFF2-40B4-BE49-F238E27FC236}">
-                <a16:creationId xmlns:a16="http://schemas.microsoft.com/office/drawing/2014/main" id="{629065A2-3C51-AD22-7ACE-B8FDBF549A6F}"/>
-              </a:ext>
-            </a:extLst>
-          </p:cNvPr>
-          <p:cNvSpPr/>
-          <p:nvPr/>
-        </p:nvSpPr>
-        <p:spPr>
-          <a:xfrm>
-            <a:off x="9009029" y="4812267"/>
-            <a:ext cx="1593140" cy="1364696"/>
-          </a:xfrm>
-          <a:prstGeom prst="rect">
-            <a:avLst/>
-          </a:prstGeom>
-          <a:solidFill>
-            <a:schemeClr val="accent4"/>
-          </a:solidFill>
-          <a:ln>
             <a:solidFill>
-              <a:schemeClr val="accent4"/>
+              <a:srgbClr val="23AAAD"/>
             </a:solidFill>
           </a:ln>
           <a:effectLst>
@@ -8407,152 +8813,58 @@
           <a:lstStyle/>
           <a:p>
             <a:pPr algn="ctr"/>
-            <a:endParaRPr lang="en-US"/>
-          </a:p>
-        </p:txBody>
-      </p:sp>
-      <p:sp>
-        <p:nvSpPr>
-          <p:cNvPr id="11" name="Rectangle 10">
-            <a:extLst>
-              <a:ext uri="{FF2B5EF4-FFF2-40B4-BE49-F238E27FC236}">
-                <a16:creationId xmlns:a16="http://schemas.microsoft.com/office/drawing/2014/main" id="{1811A2C5-C6F3-683E-8CD4-85A866E6CF3B}"/>
-              </a:ext>
-            </a:extLst>
-          </p:cNvPr>
-          <p:cNvSpPr/>
-          <p:nvPr/>
+            <a:endParaRPr lang="en-US" dirty="0"/>
+          </a:p>
+        </p:txBody>
+      </p:sp>
+      <p:sp>
+        <p:nvSpPr>
+          <p:cNvPr id="3" name="Title 2">
+            <a:extLst>
+              <a:ext uri="{FF2B5EF4-FFF2-40B4-BE49-F238E27FC236}">
+                <a16:creationId xmlns:a16="http://schemas.microsoft.com/office/drawing/2014/main" id="{AC8B7E9F-0C6B-CC5E-C8D6-944EF09C0E35}"/>
+              </a:ext>
+            </a:extLst>
+          </p:cNvPr>
+          <p:cNvSpPr>
+            <a:spLocks noGrp="1"/>
+          </p:cNvSpPr>
+          <p:nvPr>
+            <p:ph type="title"/>
+          </p:nvPr>
         </p:nvSpPr>
         <p:spPr>
           <a:xfrm>
-            <a:off x="6660325" y="790355"/>
-            <a:ext cx="2663887" cy="2301119"/>
-          </a:xfrm>
-          <a:prstGeom prst="rect">
-            <a:avLst/>
-          </a:prstGeom>
-          <a:solidFill>
-            <a:schemeClr val="accent1">
-              <a:lumMod val="50000"/>
-            </a:schemeClr>
-          </a:solidFill>
-          <a:ln>
-            <a:solidFill>
-              <a:schemeClr val="accent1">
-                <a:lumMod val="75000"/>
-              </a:schemeClr>
-            </a:solidFill>
-          </a:ln>
-          <a:effectLst>
-            <a:outerShdw blurRad="50800" dist="38100" dir="10800000" algn="r" rotWithShape="0">
-              <a:prstClr val="black">
-                <a:alpha val="40000"/>
-              </a:prstClr>
-            </a:outerShdw>
-          </a:effectLst>
+            <a:off x="983907" y="228448"/>
+            <a:ext cx="2798135" cy="466057"/>
+          </a:xfrm>
         </p:spPr>
-        <p:style>
-          <a:lnRef idx="2">
-            <a:schemeClr val="accent1">
-              <a:shade val="15000"/>
-            </a:schemeClr>
-          </a:lnRef>
-          <a:fillRef idx="1">
-            <a:schemeClr val="accent1"/>
-          </a:fillRef>
-          <a:effectRef idx="0">
-            <a:schemeClr val="accent1"/>
-          </a:effectRef>
-          <a:fontRef idx="minor">
-            <a:schemeClr val="lt1"/>
-          </a:fontRef>
-        </p:style>
-        <p:txBody>
-          <a:bodyPr rtlCol="0" anchor="ctr"/>
-          <a:lstStyle/>
-          <a:p>
-            <a:pPr algn="ctr"/>
-            <a:endParaRPr lang="en-US" dirty="0"/>
-          </a:p>
-        </p:txBody>
-      </p:sp>
-      <p:sp>
-        <p:nvSpPr>
-          <p:cNvPr id="12" name="TextBox 11">
-            <a:extLst>
-              <a:ext uri="{FF2B5EF4-FFF2-40B4-BE49-F238E27FC236}">
-                <a16:creationId xmlns:a16="http://schemas.microsoft.com/office/drawing/2014/main" id="{597D2288-F56E-B8A8-95B4-C1FD640823CC}"/>
-              </a:ext>
-            </a:extLst>
-          </p:cNvPr>
-          <p:cNvSpPr txBox="1"/>
-          <p:nvPr/>
-        </p:nvSpPr>
-        <p:spPr>
-          <a:xfrm>
-            <a:off x="7396072" y="2200996"/>
-            <a:ext cx="2679080" cy="3157454"/>
-          </a:xfrm>
-          <a:prstGeom prst="rect">
-            <a:avLst/>
-          </a:prstGeom>
-          <a:solidFill>
-            <a:schemeClr val="accent1">
-              <a:lumMod val="40000"/>
-              <a:lumOff val="60000"/>
-            </a:schemeClr>
-          </a:solidFill>
-        </p:spPr>
-        <p:txBody>
-          <a:bodyPr wrap="square" rtlCol="0">
-            <a:spAutoFit/>
+        <p:txBody>
+          <a:bodyPr>
+            <a:normAutofit fontScale="90000"/>
           </a:bodyPr>
           <a:lstStyle/>
           <a:p>
-            <a:endParaRPr lang="en-IN" dirty="0"/>
-          </a:p>
-        </p:txBody>
-      </p:sp>
-      <p:pic>
-        <p:nvPicPr>
-          <p:cNvPr id="15" name="Picture 14">
-            <a:extLst>
-              <a:ext uri="{FF2B5EF4-FFF2-40B4-BE49-F238E27FC236}">
-                <a16:creationId xmlns:a16="http://schemas.microsoft.com/office/drawing/2014/main" id="{9FCE269C-D468-E36E-7837-F33A02A39BD9}"/>
-              </a:ext>
-            </a:extLst>
-          </p:cNvPr>
-          <p:cNvPicPr>
-            <a:picLocks noChangeAspect="1"/>
-          </p:cNvPicPr>
-          <p:nvPr/>
-        </p:nvPicPr>
-        <p:blipFill>
-          <a:blip r:embed="rId5">
-            <a:extLst>
-              <a:ext uri="{28A0092B-C50C-407E-A947-70E740481C1C}">
-                <a14:useLocalDpi xmlns:a14="http://schemas.microsoft.com/office/drawing/2010/main" val="0"/>
-              </a:ext>
-            </a:extLst>
-          </a:blip>
-          <a:stretch>
-            <a:fillRect/>
-          </a:stretch>
-        </p:blipFill>
-        <p:spPr>
-          <a:xfrm>
-            <a:off x="7625146" y="2534647"/>
-            <a:ext cx="2374883" cy="2374883"/>
-          </a:xfrm>
-          <a:prstGeom prst="rect">
-            <a:avLst/>
-          </a:prstGeom>
-        </p:spPr>
-      </p:pic>
+            <a:r>
+              <a:rPr lang="en-US" b="1" dirty="0">
+                <a:solidFill>
+                  <a:srgbClr val="1B134C"/>
+                </a:solidFill>
+              </a:rPr>
+              <a:t>Architecture</a:t>
+            </a:r>
+            <a:endParaRPr lang="en-IN" b="1" dirty="0">
+              <a:solidFill>
+                <a:srgbClr val="1B134C"/>
+              </a:solidFill>
+            </a:endParaRPr>
+          </a:p>
+        </p:txBody>
+      </p:sp>
     </p:spTree>
     <p:extLst>
       <p:ext uri="{BB962C8B-B14F-4D97-AF65-F5344CB8AC3E}">
-        <p14:creationId xmlns:p14="http://schemas.microsoft.com/office/powerpoint/2010/main" val="3018656531"/>
+        <p14:creationId xmlns:p14="http://schemas.microsoft.com/office/powerpoint/2010/main" val="2853014144"/>
       </p:ext>
     </p:extLst>
   </p:cSld>
@@ -8648,50 +8960,30 @@
           <a:p>
             <a:r>
               <a:rPr lang="en-IN" dirty="0"/>
-              <a:t>- Backend: Python (</a:t>
-            </a:r>
-            <a:r>
-              <a:rPr lang="en-IN" dirty="0" err="1"/>
-              <a:t>FastAPI</a:t>
-            </a:r>
+              <a:t>Backend: Python (FastAPI)</a:t>
+            </a:r>
+          </a:p>
+          <a:p>
             <a:r>
               <a:rPr lang="en-IN" dirty="0"/>
-              <a:t>)</a:t>
+              <a:t>Database: MongoDB</a:t>
             </a:r>
           </a:p>
           <a:p>
             <a:r>
               <a:rPr lang="en-IN" dirty="0"/>
-              <a:t>- Database: MongoDB</a:t>
+              <a:t>Authentication: JWT</a:t>
             </a:r>
           </a:p>
           <a:p>
             <a:r>
               <a:rPr lang="en-IN" dirty="0"/>
-              <a:t>- Authentication: JWT</a:t>
-            </a:r>
-          </a:p>
-          <a:p>
-            <a:r>
-              <a:rPr lang="en-IN" dirty="0"/>
-              <a:t>- Scheduling: Used(</a:t>
-            </a:r>
-            <a:r>
-              <a:rPr lang="en-IN" dirty="0" err="1"/>
-              <a:t>BackgroundTask</a:t>
-            </a:r>
-            <a:r>
-              <a:rPr lang="en-IN" dirty="0"/>
-              <a:t>)/Celery + Redis</a:t>
-            </a:r>
-          </a:p>
-          <a:p>
-            <a:r>
-              <a:rPr lang="en-IN" dirty="0"/>
-              <a:t>- Deployment: Docker + Cloud (AWS/GCP/Azure)</a:t>
-            </a:r>
-          </a:p>
-          <a:p>
+              <a:t>Scheduling: Used(BackgroundTask)/Future Scope (Celery + </a:t>
+            </a:r>
+            <a:r>
+              <a:rPr lang="en-IN"/>
+              <a:t>Redis)</a:t>
+            </a:r>
             <a:endParaRPr lang="en-IN" dirty="0"/>
           </a:p>
         </p:txBody>
@@ -8948,8 +9240,8 @@
         </p:nvSpPr>
         <p:spPr>
           <a:xfrm>
-            <a:off x="8960378" y="4757608"/>
-            <a:ext cx="1593140" cy="1364696"/>
+            <a:off x="9189372" y="4521754"/>
+            <a:ext cx="1364400" cy="1364696"/>
           </a:xfrm>
           <a:prstGeom prst="rect">
             <a:avLst/>
@@ -8963,7 +9255,7 @@
             </a:solidFill>
           </a:ln>
           <a:effectLst>
-            <a:outerShdw blurRad="50800" dist="38100" dir="10800000" algn="r" rotWithShape="0">
+            <a:outerShdw blurRad="50800" dist="38100" dir="2700000" algn="tl" rotWithShape="0">
               <a:prstClr val="black">
                 <a:alpha val="40000"/>
               </a:prstClr>
@@ -8997,71 +9289,6 @@
       </p:sp>
       <p:sp>
         <p:nvSpPr>
-          <p:cNvPr id="11" name="Rectangle 10">
-            <a:extLst>
-              <a:ext uri="{FF2B5EF4-FFF2-40B4-BE49-F238E27FC236}">
-                <a16:creationId xmlns:a16="http://schemas.microsoft.com/office/drawing/2014/main" id="{8EC889B2-3255-AEEF-0FD7-66FA17478152}"/>
-              </a:ext>
-            </a:extLst>
-          </p:cNvPr>
-          <p:cNvSpPr/>
-          <p:nvPr/>
-        </p:nvSpPr>
-        <p:spPr>
-          <a:xfrm>
-            <a:off x="6611674" y="735696"/>
-            <a:ext cx="2663887" cy="2301119"/>
-          </a:xfrm>
-          <a:prstGeom prst="rect">
-            <a:avLst/>
-          </a:prstGeom>
-          <a:solidFill>
-            <a:schemeClr val="accent1">
-              <a:lumMod val="50000"/>
-            </a:schemeClr>
-          </a:solidFill>
-          <a:ln>
-            <a:solidFill>
-              <a:schemeClr val="accent1">
-                <a:lumMod val="75000"/>
-              </a:schemeClr>
-            </a:solidFill>
-          </a:ln>
-          <a:effectLst>
-            <a:outerShdw blurRad="50800" dist="38100" dir="10800000" algn="r" rotWithShape="0">
-              <a:prstClr val="black">
-                <a:alpha val="40000"/>
-              </a:prstClr>
-            </a:outerShdw>
-          </a:effectLst>
-        </p:spPr>
-        <p:style>
-          <a:lnRef idx="2">
-            <a:schemeClr val="accent1">
-              <a:shade val="15000"/>
-            </a:schemeClr>
-          </a:lnRef>
-          <a:fillRef idx="1">
-            <a:schemeClr val="accent1"/>
-          </a:fillRef>
-          <a:effectRef idx="0">
-            <a:schemeClr val="accent1"/>
-          </a:effectRef>
-          <a:fontRef idx="minor">
-            <a:schemeClr val="lt1"/>
-          </a:fontRef>
-        </p:style>
-        <p:txBody>
-          <a:bodyPr rtlCol="0" anchor="ctr"/>
-          <a:lstStyle/>
-          <a:p>
-            <a:pPr algn="ctr"/>
-            <a:endParaRPr lang="en-US" dirty="0"/>
-          </a:p>
-        </p:txBody>
-      </p:sp>
-      <p:sp>
-        <p:nvSpPr>
           <p:cNvPr id="12" name="TextBox 11">
             <a:extLst>
               <a:ext uri="{FF2B5EF4-FFF2-40B4-BE49-F238E27FC236}">
@@ -9131,6 +9358,43 @@
           <a:prstGeom prst="rect">
             <a:avLst/>
           </a:prstGeom>
+        </p:spPr>
+      </p:pic>
+      <p:pic>
+        <p:nvPicPr>
+          <p:cNvPr id="13" name="Picture 12">
+            <a:extLst>
+              <a:ext uri="{FF2B5EF4-FFF2-40B4-BE49-F238E27FC236}">
+                <a16:creationId xmlns:a16="http://schemas.microsoft.com/office/drawing/2014/main" id="{085947A9-8956-90E3-B9DD-4231F35DA9A3}"/>
+              </a:ext>
+            </a:extLst>
+          </p:cNvPr>
+          <p:cNvPicPr>
+            <a:picLocks noChangeAspect="1"/>
+          </p:cNvPicPr>
+          <p:nvPr/>
+        </p:nvPicPr>
+        <p:blipFill>
+          <a:blip r:embed="rId5"/>
+          <a:stretch>
+            <a:fillRect/>
+          </a:stretch>
+        </p:blipFill>
+        <p:spPr>
+          <a:xfrm>
+            <a:off x="6876049" y="1280318"/>
+            <a:ext cx="542925" cy="1647825"/>
+          </a:xfrm>
+          <a:prstGeom prst="rect">
+            <a:avLst/>
+          </a:prstGeom>
+          <a:effectLst>
+            <a:outerShdw blurRad="50800" dist="38100" dir="13500000" algn="br" rotWithShape="0">
+              <a:prstClr val="black">
+                <a:alpha val="40000"/>
+              </a:prstClr>
+            </a:outerShdw>
+          </a:effectLst>
         </p:spPr>
       </p:pic>
     </p:spTree>
@@ -9512,8 +9776,8 @@
         </p:nvSpPr>
         <p:spPr>
           <a:xfrm>
-            <a:off x="8551772" y="4706443"/>
-            <a:ext cx="1593140" cy="1364696"/>
+            <a:off x="8808192" y="4510723"/>
+            <a:ext cx="1364400" cy="1364696"/>
           </a:xfrm>
           <a:prstGeom prst="rect">
             <a:avLst/>
@@ -9527,7 +9791,7 @@
             </a:solidFill>
           </a:ln>
           <a:effectLst>
-            <a:outerShdw blurRad="50800" dist="38100" dir="10800000" algn="r" rotWithShape="0">
+            <a:outerShdw blurRad="50800" dist="38100" dir="2700000" algn="tl" rotWithShape="0">
               <a:prstClr val="black">
                 <a:alpha val="40000"/>
               </a:prstClr>
@@ -9561,71 +9825,6 @@
       </p:sp>
       <p:sp>
         <p:nvSpPr>
-          <p:cNvPr id="11" name="Rectangle 10">
-            <a:extLst>
-              <a:ext uri="{FF2B5EF4-FFF2-40B4-BE49-F238E27FC236}">
-                <a16:creationId xmlns:a16="http://schemas.microsoft.com/office/drawing/2014/main" id="{F4DC4D48-E8F0-8F1F-2419-CF4E53D3C37C}"/>
-              </a:ext>
-            </a:extLst>
-          </p:cNvPr>
-          <p:cNvSpPr/>
-          <p:nvPr/>
-        </p:nvSpPr>
-        <p:spPr>
-          <a:xfrm>
-            <a:off x="6203068" y="684531"/>
-            <a:ext cx="2663887" cy="2301119"/>
-          </a:xfrm>
-          <a:prstGeom prst="rect">
-            <a:avLst/>
-          </a:prstGeom>
-          <a:solidFill>
-            <a:schemeClr val="accent1">
-              <a:lumMod val="50000"/>
-            </a:schemeClr>
-          </a:solidFill>
-          <a:ln>
-            <a:solidFill>
-              <a:schemeClr val="accent1">
-                <a:lumMod val="75000"/>
-              </a:schemeClr>
-            </a:solidFill>
-          </a:ln>
-          <a:effectLst>
-            <a:outerShdw blurRad="50800" dist="38100" dir="10800000" algn="r" rotWithShape="0">
-              <a:prstClr val="black">
-                <a:alpha val="40000"/>
-              </a:prstClr>
-            </a:outerShdw>
-          </a:effectLst>
-        </p:spPr>
-        <p:style>
-          <a:lnRef idx="2">
-            <a:schemeClr val="accent1">
-              <a:shade val="15000"/>
-            </a:schemeClr>
-          </a:lnRef>
-          <a:fillRef idx="1">
-            <a:schemeClr val="accent1"/>
-          </a:fillRef>
-          <a:effectRef idx="0">
-            <a:schemeClr val="accent1"/>
-          </a:effectRef>
-          <a:fontRef idx="minor">
-            <a:schemeClr val="lt1"/>
-          </a:fontRef>
-        </p:style>
-        <p:txBody>
-          <a:bodyPr rtlCol="0" anchor="ctr"/>
-          <a:lstStyle/>
-          <a:p>
-            <a:pPr algn="ctr"/>
-            <a:endParaRPr lang="en-US" dirty="0"/>
-          </a:p>
-        </p:txBody>
-      </p:sp>
-      <p:sp>
-        <p:nvSpPr>
           <p:cNvPr id="12" name="TextBox 11">
             <a:extLst>
               <a:ext uri="{FF2B5EF4-FFF2-40B4-BE49-F238E27FC236}">
@@ -9695,6 +9894,43 @@
           <a:prstGeom prst="rect">
             <a:avLst/>
           </a:prstGeom>
+        </p:spPr>
+      </p:pic>
+      <p:pic>
+        <p:nvPicPr>
+          <p:cNvPr id="13" name="Picture 12">
+            <a:extLst>
+              <a:ext uri="{FF2B5EF4-FFF2-40B4-BE49-F238E27FC236}">
+                <a16:creationId xmlns:a16="http://schemas.microsoft.com/office/drawing/2014/main" id="{CD864F68-35E2-6E12-ACB0-BF83A7EEDB61}"/>
+              </a:ext>
+            </a:extLst>
+          </p:cNvPr>
+          <p:cNvPicPr>
+            <a:picLocks noChangeAspect="1"/>
+          </p:cNvPicPr>
+          <p:nvPr/>
+        </p:nvPicPr>
+        <p:blipFill>
+          <a:blip r:embed="rId5"/>
+          <a:stretch>
+            <a:fillRect/>
+          </a:stretch>
+        </p:blipFill>
+        <p:spPr>
+          <a:xfrm>
+            <a:off x="6458028" y="1283312"/>
+            <a:ext cx="542925" cy="1647825"/>
+          </a:xfrm>
+          <a:prstGeom prst="rect">
+            <a:avLst/>
+          </a:prstGeom>
+          <a:effectLst>
+            <a:outerShdw blurRad="50800" dist="38100" dir="13500000" algn="br" rotWithShape="0">
+              <a:prstClr val="black">
+                <a:alpha val="40000"/>
+              </a:prstClr>
+            </a:outerShdw>
+          </a:effectLst>
         </p:spPr>
       </p:pic>
     </p:spTree>
@@ -9766,36 +10002,6 @@
           </a:p>
         </p:txBody>
       </p:sp>
-      <p:pic>
-        <p:nvPicPr>
-          <p:cNvPr id="4" name="Content Placeholder 4">
-            <a:extLst>
-              <a:ext uri="{FF2B5EF4-FFF2-40B4-BE49-F238E27FC236}">
-                <a16:creationId xmlns:a16="http://schemas.microsoft.com/office/drawing/2014/main" id="{77DC72D5-B95B-BECD-8493-B27DE3CEE1D2}"/>
-              </a:ext>
-            </a:extLst>
-          </p:cNvPr>
-          <p:cNvPicPr>
-            <a:picLocks noChangeAspect="1"/>
-          </p:cNvPicPr>
-          <p:nvPr/>
-        </p:nvPicPr>
-        <p:blipFill>
-          <a:blip r:embed="rId2"/>
-          <a:stretch>
-            <a:fillRect/>
-          </a:stretch>
-        </p:blipFill>
-        <p:spPr>
-          <a:xfrm>
-            <a:off x="4763977" y="694908"/>
-            <a:ext cx="5802286" cy="5468182"/>
-          </a:xfrm>
-          <a:prstGeom prst="rect">
-            <a:avLst/>
-          </a:prstGeom>
-        </p:spPr>
-      </p:pic>
       <p:grpSp>
         <p:nvGrpSpPr>
           <p:cNvPr id="5" name="Group 4">
@@ -9872,10 +10078,10 @@
             <p:nvPr/>
           </p:nvPicPr>
           <p:blipFill>
-            <a:blip r:embed="rId3">
+            <a:blip r:embed="rId2">
               <a:extLst>
                 <a:ext uri="{96DAC541-7B7A-43D3-8B79-37D633B846F1}">
-                  <asvg:svgBlip xmlns:asvg="http://schemas.microsoft.com/office/drawing/2016/SVG/main" r:embed="rId4"/>
+                  <asvg:svgBlip xmlns:asvg="http://schemas.microsoft.com/office/drawing/2016/SVG/main" r:embed="rId3"/>
                 </a:ext>
               </a:extLst>
             </a:blip>
@@ -10034,6 +10240,42 @@
           </a:p>
         </p:txBody>
       </p:sp>
+      <p:pic>
+        <p:nvPicPr>
+          <p:cNvPr id="4" name="Picture 3">
+            <a:extLst>
+              <a:ext uri="{FF2B5EF4-FFF2-40B4-BE49-F238E27FC236}">
+                <a16:creationId xmlns:a16="http://schemas.microsoft.com/office/drawing/2014/main" id="{85A597CB-D869-9D82-2B0D-35DBAF24EE2F}"/>
+              </a:ext>
+            </a:extLst>
+          </p:cNvPr>
+          <p:cNvPicPr>
+            <a:picLocks noChangeAspect="1"/>
+          </p:cNvPicPr>
+          <p:nvPr/>
+        </p:nvPicPr>
+        <p:blipFill>
+          <a:blip r:embed="rId4">
+            <a:extLst>
+              <a:ext uri="{28A0092B-C50C-407E-A947-70E740481C1C}">
+                <a14:useLocalDpi xmlns:a14="http://schemas.microsoft.com/office/drawing/2010/main" val="0"/>
+              </a:ext>
+            </a:extLst>
+          </a:blip>
+          <a:stretch>
+            <a:fillRect/>
+          </a:stretch>
+        </p:blipFill>
+        <p:spPr>
+          <a:xfrm>
+            <a:off x="4652127" y="253404"/>
+            <a:ext cx="6882648" cy="6364181"/>
+          </a:xfrm>
+          <a:prstGeom prst="rect">
+            <a:avLst/>
+          </a:prstGeom>
+        </p:spPr>
+      </p:pic>
     </p:spTree>
     <p:extLst>
       <p:ext uri="{BB962C8B-B14F-4D97-AF65-F5344CB8AC3E}">
@@ -10439,36 +10681,6 @@
           </a:p>
         </p:txBody>
       </p:sp>
-      <p:pic>
-        <p:nvPicPr>
-          <p:cNvPr id="4" name="Content Placeholder 4">
-            <a:extLst>
-              <a:ext uri="{FF2B5EF4-FFF2-40B4-BE49-F238E27FC236}">
-                <a16:creationId xmlns:a16="http://schemas.microsoft.com/office/drawing/2014/main" id="{8AEA6BED-E4F4-0F8B-0172-636A32C50D50}"/>
-              </a:ext>
-            </a:extLst>
-          </p:cNvPr>
-          <p:cNvPicPr>
-            <a:picLocks noChangeAspect="1"/>
-          </p:cNvPicPr>
-          <p:nvPr/>
-        </p:nvPicPr>
-        <p:blipFill>
-          <a:blip r:embed="rId2"/>
-          <a:stretch>
-            <a:fillRect/>
-          </a:stretch>
-        </p:blipFill>
-        <p:spPr>
-          <a:xfrm>
-            <a:off x="5865536" y="106325"/>
-            <a:ext cx="3242918" cy="6645349"/>
-          </a:xfrm>
-          <a:prstGeom prst="rect">
-            <a:avLst/>
-          </a:prstGeom>
-        </p:spPr>
-      </p:pic>
       <p:grpSp>
         <p:nvGrpSpPr>
           <p:cNvPr id="5" name="Group 4">
@@ -10545,10 +10757,10 @@
             <p:nvPr/>
           </p:nvPicPr>
           <p:blipFill>
-            <a:blip r:embed="rId3">
+            <a:blip r:embed="rId2">
               <a:extLst>
                 <a:ext uri="{96DAC541-7B7A-43D3-8B79-37D633B846F1}">
-                  <asvg:svgBlip xmlns:asvg="http://schemas.microsoft.com/office/drawing/2016/SVG/main" r:embed="rId4"/>
+                  <asvg:svgBlip xmlns:asvg="http://schemas.microsoft.com/office/drawing/2016/SVG/main" r:embed="rId3"/>
                 </a:ext>
               </a:extLst>
             </a:blip>
@@ -10707,6 +10919,42 @@
           </a:p>
         </p:txBody>
       </p:sp>
+      <p:pic>
+        <p:nvPicPr>
+          <p:cNvPr id="11" name="Picture 10">
+            <a:extLst>
+              <a:ext uri="{FF2B5EF4-FFF2-40B4-BE49-F238E27FC236}">
+                <a16:creationId xmlns:a16="http://schemas.microsoft.com/office/drawing/2014/main" id="{A8F7EADF-DF37-5DAD-6FCC-BCEE6A2869F4}"/>
+              </a:ext>
+            </a:extLst>
+          </p:cNvPr>
+          <p:cNvPicPr>
+            <a:picLocks noChangeAspect="1"/>
+          </p:cNvPicPr>
+          <p:nvPr/>
+        </p:nvPicPr>
+        <p:blipFill>
+          <a:blip r:embed="rId4">
+            <a:extLst>
+              <a:ext uri="{28A0092B-C50C-407E-A947-70E740481C1C}">
+                <a14:useLocalDpi xmlns:a14="http://schemas.microsoft.com/office/drawing/2010/main" val="0"/>
+              </a:ext>
+            </a:extLst>
+          </a:blip>
+          <a:stretch>
+            <a:fillRect/>
+          </a:stretch>
+        </p:blipFill>
+        <p:spPr>
+          <a:xfrm>
+            <a:off x="5930637" y="186070"/>
+            <a:ext cx="3036829" cy="6485860"/>
+          </a:xfrm>
+          <a:prstGeom prst="rect">
+            <a:avLst/>
+          </a:prstGeom>
+        </p:spPr>
+      </p:pic>
     </p:spTree>
     <p:extLst>
       <p:ext uri="{BB962C8B-B14F-4D97-AF65-F5344CB8AC3E}">
@@ -11005,7 +11253,64 @@
       </a:bgFillStyleLst>
     </a:fmtScheme>
   </a:themeElements>
-  <a:objectDefaults/>
+  <a:objectDefaults>
+    <a:spDef>
+      <a:spPr>
+        <a:solidFill>
+          <a:schemeClr val="accent4"/>
+        </a:solidFill>
+        <a:ln>
+          <a:solidFill>
+            <a:schemeClr val="accent4"/>
+          </a:solidFill>
+        </a:ln>
+        <a:effectLst>
+          <a:outerShdw blurRad="50800" dist="38100" dir="10800000" algn="r" rotWithShape="0">
+            <a:prstClr val="black">
+              <a:alpha val="40000"/>
+            </a:prstClr>
+          </a:outerShdw>
+        </a:effectLst>
+      </a:spPr>
+      <a:bodyPr rtlCol="0" anchor="ctr"/>
+      <a:lstStyle>
+        <a:defPPr algn="ctr">
+          <a:defRPr/>
+        </a:defPPr>
+      </a:lstStyle>
+      <a:style>
+        <a:lnRef idx="2">
+          <a:schemeClr val="accent1">
+            <a:shade val="15000"/>
+          </a:schemeClr>
+        </a:lnRef>
+        <a:fillRef idx="1">
+          <a:schemeClr val="accent1"/>
+        </a:fillRef>
+        <a:effectRef idx="0">
+          <a:schemeClr val="accent1"/>
+        </a:effectRef>
+        <a:fontRef idx="minor">
+          <a:schemeClr val="lt1"/>
+        </a:fontRef>
+      </a:style>
+    </a:spDef>
+    <a:txDef>
+      <a:spPr>
+        <a:solidFill>
+          <a:schemeClr val="bg1"/>
+        </a:solidFill>
+      </a:spPr>
+      <a:bodyPr wrap="square" rtlCol="0">
+        <a:spAutoFit/>
+      </a:bodyPr>
+      <a:lstStyle>
+        <a:defPPr algn="l">
+          <a:defRPr sz="1350" dirty="0" err="1"/>
+        </a:defPPr>
+      </a:lstStyle>
+    </a:txDef>
+  </a:objectDefaults>
   <a:extraClrSchemeLst/>
   <a:extLst>
     <a:ext uri="{05A4C25C-085E-4340-85A3-A5531E510DB2}">

</xml_diff>

<commit_message>
Notification displaying in terminal using APScheduler
</commit_message>
<xml_diff>
--- a/ZennialPro_Project_PPT.pptx
+++ b/ZennialPro_Project_PPT.pptx
@@ -223,7 +223,7 @@
           <a:p>
             <a:fld id="{BD8DE5F0-F600-46C3-AE4D-5148C69FFBAD}" type="datetimeFigureOut">
               <a:rPr lang="en-US" smtClean="0"/>
-              <a:t>9/18/2025</a:t>
+              <a:t>9/26/2025</a:t>
             </a:fld>
             <a:endParaRPr lang="en-US"/>
           </a:p>
@@ -805,7 +805,7 @@
           <a:p>
             <a:fld id="{8CFBE4D0-E68C-4FB2-8B3A-AA41DAF039F9}" type="datetimeFigureOut">
               <a:rPr lang="en-US" smtClean="0"/>
-              <a:t>9/18/2025</a:t>
+              <a:t>9/26/2025</a:t>
             </a:fld>
             <a:endParaRPr lang="en-US"/>
           </a:p>
@@ -1003,7 +1003,7 @@
           <a:p>
             <a:fld id="{8CFBE4D0-E68C-4FB2-8B3A-AA41DAF039F9}" type="datetimeFigureOut">
               <a:rPr lang="en-US" smtClean="0"/>
-              <a:t>9/18/2025</a:t>
+              <a:t>9/26/2025</a:t>
             </a:fld>
             <a:endParaRPr lang="en-US"/>
           </a:p>
@@ -1211,7 +1211,7 @@
           <a:p>
             <a:fld id="{8CFBE4D0-E68C-4FB2-8B3A-AA41DAF039F9}" type="datetimeFigureOut">
               <a:rPr lang="en-US" smtClean="0"/>
-              <a:t>9/18/2025</a:t>
+              <a:t>9/26/2025</a:t>
             </a:fld>
             <a:endParaRPr lang="en-US"/>
           </a:p>
@@ -1409,7 +1409,7 @@
           <a:p>
             <a:fld id="{8CFBE4D0-E68C-4FB2-8B3A-AA41DAF039F9}" type="datetimeFigureOut">
               <a:rPr lang="en-US" smtClean="0"/>
-              <a:t>9/18/2025</a:t>
+              <a:t>9/26/2025</a:t>
             </a:fld>
             <a:endParaRPr lang="en-US"/>
           </a:p>
@@ -1684,7 +1684,7 @@
           <a:p>
             <a:fld id="{8CFBE4D0-E68C-4FB2-8B3A-AA41DAF039F9}" type="datetimeFigureOut">
               <a:rPr lang="en-US" smtClean="0"/>
-              <a:t>9/18/2025</a:t>
+              <a:t>9/26/2025</a:t>
             </a:fld>
             <a:endParaRPr lang="en-US"/>
           </a:p>
@@ -1949,7 +1949,7 @@
           <a:p>
             <a:fld id="{8CFBE4D0-E68C-4FB2-8B3A-AA41DAF039F9}" type="datetimeFigureOut">
               <a:rPr lang="en-US" smtClean="0"/>
-              <a:t>9/18/2025</a:t>
+              <a:t>9/26/2025</a:t>
             </a:fld>
             <a:endParaRPr lang="en-US"/>
           </a:p>
@@ -2361,7 +2361,7 @@
           <a:p>
             <a:fld id="{8CFBE4D0-E68C-4FB2-8B3A-AA41DAF039F9}" type="datetimeFigureOut">
               <a:rPr lang="en-US" smtClean="0"/>
-              <a:t>9/18/2025</a:t>
+              <a:t>9/26/2025</a:t>
             </a:fld>
             <a:endParaRPr lang="en-US"/>
           </a:p>
@@ -2502,7 +2502,7 @@
           <a:p>
             <a:fld id="{8CFBE4D0-E68C-4FB2-8B3A-AA41DAF039F9}" type="datetimeFigureOut">
               <a:rPr lang="en-US" smtClean="0"/>
-              <a:t>9/18/2025</a:t>
+              <a:t>9/26/2025</a:t>
             </a:fld>
             <a:endParaRPr lang="en-US"/>
           </a:p>
@@ -2615,7 +2615,7 @@
           <a:p>
             <a:fld id="{8CFBE4D0-E68C-4FB2-8B3A-AA41DAF039F9}" type="datetimeFigureOut">
               <a:rPr lang="en-US" smtClean="0"/>
-              <a:t>9/18/2025</a:t>
+              <a:t>9/26/2025</a:t>
             </a:fld>
             <a:endParaRPr lang="en-US"/>
           </a:p>
@@ -2926,7 +2926,7 @@
           <a:p>
             <a:fld id="{8CFBE4D0-E68C-4FB2-8B3A-AA41DAF039F9}" type="datetimeFigureOut">
               <a:rPr lang="en-US" smtClean="0"/>
-              <a:t>9/18/2025</a:t>
+              <a:t>9/26/2025</a:t>
             </a:fld>
             <a:endParaRPr lang="en-US"/>
           </a:p>
@@ -3214,7 +3214,7 @@
           <a:p>
             <a:fld id="{8CFBE4D0-E68C-4FB2-8B3A-AA41DAF039F9}" type="datetimeFigureOut">
               <a:rPr lang="en-US" smtClean="0"/>
-              <a:t>9/18/2025</a:t>
+              <a:t>9/26/2025</a:t>
             </a:fld>
             <a:endParaRPr lang="en-US"/>
           </a:p>
@@ -3455,7 +3455,7 @@
           <a:p>
             <a:fld id="{8CFBE4D0-E68C-4FB2-8B3A-AA41DAF039F9}" type="datetimeFigureOut">
               <a:rPr lang="en-US" smtClean="0"/>
-              <a:t>9/18/2025</a:t>
+              <a:t>9/26/2025</a:t>
             </a:fld>
             <a:endParaRPr lang="en-US"/>
           </a:p>
@@ -6650,7 +6650,7 @@
         </p:spPr>
         <p:txBody>
           <a:bodyPr>
-            <a:normAutofit fontScale="92500" lnSpcReduction="20000"/>
+            <a:normAutofit lnSpcReduction="10000"/>
           </a:bodyPr>
           <a:lstStyle/>
           <a:p>
@@ -6669,12 +6669,6 @@
             <a:r>
               <a:rPr lang="en-US" dirty="0"/>
               <a:t>Provides reminders, analytics and personalized insights for self-improvement</a:t>
-            </a:r>
-          </a:p>
-          <a:p>
-            <a:r>
-              <a:rPr lang="en-US" dirty="0"/>
-              <a:t>Ensures scalability and flexibility with containerized development (Docker + Cloud)</a:t>
             </a:r>
           </a:p>
           <a:p>
@@ -8427,7 +8421,7 @@
         <p:spPr>
           <a:xfrm>
             <a:off x="983907" y="694505"/>
-            <a:ext cx="6042382" cy="6117059"/>
+            <a:ext cx="6042382" cy="6078587"/>
           </a:xfrm>
           <a:prstGeom prst="rect">
             <a:avLst/>
@@ -8443,178 +8437,172 @@
           <a:lstStyle/>
           <a:p>
             <a:r>
-              <a:rPr lang="en-US" sz="1400" dirty="0" err="1"/>
+              <a:rPr lang="en-US" sz="1500" dirty="0" err="1"/>
               <a:t>wellness_habit_tracker</a:t>
             </a:r>
             <a:r>
-              <a:rPr lang="en-US" sz="1400" dirty="0"/>
+              <a:rPr lang="en-US" sz="1500" dirty="0"/>
               <a:t>/</a:t>
             </a:r>
           </a:p>
           <a:p>
             <a:r>
-              <a:rPr lang="en-US" sz="1400" dirty="0"/>
+              <a:rPr lang="en-US" sz="1500" dirty="0"/>
               <a:t>│── app/</a:t>
             </a:r>
           </a:p>
           <a:p>
             <a:r>
-              <a:rPr lang="en-US" sz="1400" dirty="0"/>
+              <a:rPr lang="en-US" sz="1500" dirty="0"/>
               <a:t>│   │── main.py                 # </a:t>
             </a:r>
             <a:r>
-              <a:rPr lang="en-US" sz="1400" dirty="0" err="1"/>
+              <a:rPr lang="en-US" sz="1500" dirty="0" err="1"/>
               <a:t>FastAPI</a:t>
             </a:r>
             <a:r>
-              <a:rPr lang="en-US" sz="1400" dirty="0"/>
+              <a:rPr lang="en-US" sz="1500" dirty="0"/>
               <a:t> entry point</a:t>
             </a:r>
           </a:p>
           <a:p>
             <a:r>
-              <a:rPr lang="en-US" sz="1400" dirty="0"/>
+              <a:rPr lang="en-US" sz="1500" dirty="0"/>
               <a:t>│   │── database.py             # MongoDB connection (Motor client)</a:t>
             </a:r>
           </a:p>
           <a:p>
             <a:r>
-              <a:rPr lang="en-US" sz="1400" dirty="0"/>
+              <a:rPr lang="en-US" sz="1500" dirty="0"/>
               <a:t>│   │</a:t>
             </a:r>
           </a:p>
           <a:p>
             <a:r>
-              <a:rPr lang="en-US" sz="1400" dirty="0"/>
+              <a:rPr lang="en-US" sz="1500" dirty="0"/>
               <a:t>│   |── models/                 # </a:t>
             </a:r>
             <a:r>
-              <a:rPr lang="en-US" sz="1400" dirty="0" err="1"/>
+              <a:rPr lang="en-US" sz="1500" dirty="0" err="1"/>
               <a:t>Pydantic</a:t>
             </a:r>
             <a:r>
-              <a:rPr lang="en-US" sz="1400" dirty="0"/>
+              <a:rPr lang="en-US" sz="1500" dirty="0"/>
               <a:t> models (schemas)</a:t>
             </a:r>
           </a:p>
           <a:p>
             <a:r>
-              <a:rPr lang="en-US" sz="1400" dirty="0"/>
+              <a:rPr lang="en-US" sz="1500" dirty="0"/>
               <a:t>│   │   │── user.py             # User schemas</a:t>
             </a:r>
           </a:p>
           <a:p>
             <a:r>
-              <a:rPr lang="en-US" sz="1400" dirty="0"/>
+              <a:rPr lang="en-US" sz="1500" dirty="0"/>
               <a:t>│   │   │── habit.py            # Habit schemas</a:t>
             </a:r>
           </a:p>
           <a:p>
             <a:r>
-              <a:rPr lang="en-US" sz="1400" dirty="0"/>
+              <a:rPr lang="en-US" sz="1500" dirty="0"/>
               <a:t>│   │   │── wellness.py         # Wellness log schemas</a:t>
             </a:r>
           </a:p>
           <a:p>
             <a:r>
-              <a:rPr lang="en-US" sz="1400" dirty="0"/>
+              <a:rPr lang="en-US" sz="1500" dirty="0"/>
               <a:t>│   │   │── reminder.py         # Reminder schemas</a:t>
             </a:r>
           </a:p>
           <a:p>
             <a:r>
-              <a:rPr lang="en-US" sz="1400" dirty="0"/>
+              <a:rPr lang="en-US" sz="1500" dirty="0"/>
               <a:t>│   │</a:t>
             </a:r>
           </a:p>
           <a:p>
             <a:r>
-              <a:rPr lang="en-US" sz="1400" dirty="0"/>
+              <a:rPr lang="en-US" sz="1500" dirty="0"/>
               <a:t>│   |── routes/                 # API endpoints</a:t>
             </a:r>
           </a:p>
           <a:p>
             <a:r>
-              <a:rPr lang="en-US" sz="1400" dirty="0"/>
+              <a:rPr lang="en-US" sz="1500" dirty="0"/>
               <a:t>│   │   │── auth.py             # Register, login, logout</a:t>
             </a:r>
           </a:p>
           <a:p>
             <a:r>
-              <a:rPr lang="en-US" sz="1400" dirty="0"/>
+              <a:rPr lang="en-US" sz="1500" dirty="0"/>
               <a:t>│   │   │── users.py            # User profile, update profile, change password</a:t>
             </a:r>
           </a:p>
           <a:p>
             <a:r>
-              <a:rPr lang="en-US" sz="1400" dirty="0"/>
+              <a:rPr lang="en-US" sz="1500" dirty="0"/>
               <a:t>│   │   │── habits.py           # Habit CRUD + logging</a:t>
             </a:r>
           </a:p>
           <a:p>
             <a:r>
-              <a:rPr lang="en-US" sz="1400" dirty="0"/>
+              <a:rPr lang="en-US" sz="1500" dirty="0"/>
               <a:t>│   │   │── wellness.py         # Wellness logging CRUD</a:t>
             </a:r>
           </a:p>
           <a:p>
             <a:r>
-              <a:rPr lang="en-US" sz="1400" dirty="0"/>
+              <a:rPr lang="en-US" sz="1500" dirty="0"/>
               <a:t>│   │   │── reminders.py        # Reminder CRUD</a:t>
             </a:r>
           </a:p>
           <a:p>
             <a:r>
-              <a:rPr lang="en-US" sz="1400" dirty="0"/>
+              <a:rPr lang="en-US" sz="1500" dirty="0"/>
               <a:t>│   │   │── analytics.py        # Analytics/insights endpoints</a:t>
             </a:r>
           </a:p>
           <a:p>
             <a:r>
-              <a:rPr lang="en-US" sz="1400" dirty="0"/>
+              <a:rPr lang="en-US" sz="1500" dirty="0"/>
               <a:t>│   │</a:t>
             </a:r>
           </a:p>
           <a:p>
             <a:r>
-              <a:rPr lang="en-US" sz="1400" dirty="0"/>
+              <a:rPr lang="en-US" sz="1500" dirty="0"/>
               <a:t>│   |── utils/                  # Helper utilities</a:t>
             </a:r>
           </a:p>
           <a:p>
             <a:r>
-              <a:rPr lang="en-US" sz="1400" dirty="0"/>
+              <a:rPr lang="en-US" sz="1500" dirty="0"/>
               <a:t>│   │   │── security.py         # JWT utils, password hashing utils</a:t>
             </a:r>
           </a:p>
           <a:p>
             <a:r>
-              <a:rPr lang="en-US" sz="1400" dirty="0"/>
+              <a:rPr lang="en-US" sz="1500" dirty="0"/>
               <a:t>│   │   │── mongo_helper.py           # Logging config</a:t>
             </a:r>
           </a:p>
           <a:p>
             <a:r>
-              <a:rPr lang="en-US" sz="1400" dirty="0"/>
+              <a:rPr lang="en-US" sz="1500" dirty="0"/>
               <a:t>│   │</a:t>
             </a:r>
           </a:p>
           <a:p>
             <a:r>
-              <a:rPr lang="en-US" sz="1400" dirty="0"/>
+              <a:rPr lang="en-US" sz="1500" dirty="0"/>
               <a:t>│── requirements.txt            # All dependencies</a:t>
             </a:r>
           </a:p>
           <a:p>
             <a:r>
-              <a:rPr lang="en-US" sz="1400" dirty="0"/>
+              <a:rPr lang="en-US" sz="1500" dirty="0"/>
               <a:t>│── .env                        # Environment variables (DB URI, JWT secret, etc.)</a:t>
-            </a:r>
-          </a:p>
-          <a:p>
-            <a:r>
-              <a:rPr lang="en-US" sz="1400" dirty="0"/>
-              <a:t>│── README.md                   # Project documentation</a:t>
             </a:r>
           </a:p>
           <a:p>
@@ -10345,35 +10333,6 @@
           </a:p>
         </p:txBody>
       </p:sp>
-      <p:pic>
-        <p:nvPicPr>
-          <p:cNvPr id="4" name="Content Placeholder 4">
-            <a:extLst>
-              <a:ext uri="{FF2B5EF4-FFF2-40B4-BE49-F238E27FC236}">
-                <a16:creationId xmlns:a16="http://schemas.microsoft.com/office/drawing/2014/main" id="{305880A8-07BE-53AB-661D-317782735394}"/>
-              </a:ext>
-            </a:extLst>
-          </p:cNvPr>
-          <p:cNvPicPr>
-            <a:picLocks noGrp="1" noChangeAspect="1"/>
-          </p:cNvPicPr>
-          <p:nvPr>
-            <p:ph idx="1"/>
-          </p:nvPr>
-        </p:nvPicPr>
-        <p:blipFill>
-          <a:blip r:embed="rId2"/>
-          <a:stretch>
-            <a:fillRect/>
-          </a:stretch>
-        </p:blipFill>
-        <p:spPr>
-          <a:xfrm>
-            <a:off x="4364796" y="290465"/>
-            <a:ext cx="5650405" cy="6277068"/>
-          </a:xfrm>
-        </p:spPr>
-      </p:pic>
       <p:grpSp>
         <p:nvGrpSpPr>
           <p:cNvPr id="5" name="Group 4">
@@ -10450,10 +10409,10 @@
             <p:nvPr/>
           </p:nvPicPr>
           <p:blipFill>
-            <a:blip r:embed="rId3">
+            <a:blip r:embed="rId2">
               <a:extLst>
                 <a:ext uri="{96DAC541-7B7A-43D3-8B79-37D633B846F1}">
-                  <asvg:svgBlip xmlns:asvg="http://schemas.microsoft.com/office/drawing/2016/SVG/main" r:embed="rId4"/>
+                  <asvg:svgBlip xmlns:asvg="http://schemas.microsoft.com/office/drawing/2016/SVG/main" r:embed="rId3"/>
                 </a:ext>
               </a:extLst>
             </a:blip>
@@ -10612,6 +10571,41 @@
           </a:p>
         </p:txBody>
       </p:sp>
+      <p:pic>
+        <p:nvPicPr>
+          <p:cNvPr id="13" name="Content Placeholder 12">
+            <a:extLst>
+              <a:ext uri="{FF2B5EF4-FFF2-40B4-BE49-F238E27FC236}">
+                <a16:creationId xmlns:a16="http://schemas.microsoft.com/office/drawing/2014/main" id="{2DADAB51-953C-40B3-1724-792C375E044F}"/>
+              </a:ext>
+            </a:extLst>
+          </p:cNvPr>
+          <p:cNvPicPr>
+            <a:picLocks noGrp="1" noChangeAspect="1"/>
+          </p:cNvPicPr>
+          <p:nvPr>
+            <p:ph idx="1"/>
+          </p:nvPr>
+        </p:nvPicPr>
+        <p:blipFill>
+          <a:blip r:embed="rId4">
+            <a:extLst>
+              <a:ext uri="{28A0092B-C50C-407E-A947-70E740481C1C}">
+                <a14:useLocalDpi xmlns:a14="http://schemas.microsoft.com/office/drawing/2010/main" val="0"/>
+              </a:ext>
+            </a:extLst>
+          </a:blip>
+          <a:stretch>
+            <a:fillRect/>
+          </a:stretch>
+        </p:blipFill>
+        <p:spPr>
+          <a:xfrm>
+            <a:off x="4566958" y="235565"/>
+            <a:ext cx="5793855" cy="6424552"/>
+          </a:xfrm>
+        </p:spPr>
+      </p:pic>
     </p:spTree>
     <p:extLst>
       <p:ext uri="{BB962C8B-B14F-4D97-AF65-F5344CB8AC3E}">

</xml_diff>